<commit_message>
Added more detail for pipelines and history
</commit_message>
<xml_diff>
--- a/BasicPowerShell.pptx
+++ b/BasicPowerShell.pptx
@@ -5,10 +5,10 @@
     <p:sldMasterId id="2147483648" r:id="rId5"/>
   </p:sldMasterIdLst>
   <p:notesMasterIdLst>
-    <p:notesMasterId r:id="rId51"/>
+    <p:notesMasterId r:id="rId52"/>
   </p:notesMasterIdLst>
   <p:handoutMasterIdLst>
-    <p:handoutMasterId r:id="rId52"/>
+    <p:handoutMasterId r:id="rId53"/>
   </p:handoutMasterIdLst>
   <p:sldIdLst>
     <p:sldId id="274" r:id="rId6"/>
@@ -19,43 +19,44 @@
     <p:sldId id="388" r:id="rId11"/>
     <p:sldId id="389" r:id="rId12"/>
     <p:sldId id="384" r:id="rId13"/>
-    <p:sldId id="390" r:id="rId14"/>
-    <p:sldId id="385" r:id="rId15"/>
-    <p:sldId id="386" r:id="rId16"/>
-    <p:sldId id="359" r:id="rId17"/>
-    <p:sldId id="370" r:id="rId18"/>
-    <p:sldId id="375" r:id="rId19"/>
-    <p:sldId id="362" r:id="rId20"/>
-    <p:sldId id="373" r:id="rId21"/>
-    <p:sldId id="365" r:id="rId22"/>
-    <p:sldId id="363" r:id="rId23"/>
-    <p:sldId id="366" r:id="rId24"/>
-    <p:sldId id="367" r:id="rId25"/>
-    <p:sldId id="368" r:id="rId26"/>
-    <p:sldId id="337" r:id="rId27"/>
-    <p:sldId id="336" r:id="rId28"/>
-    <p:sldId id="272" r:id="rId29"/>
-    <p:sldId id="369" r:id="rId30"/>
-    <p:sldId id="371" r:id="rId31"/>
-    <p:sldId id="332" r:id="rId32"/>
-    <p:sldId id="334" r:id="rId33"/>
-    <p:sldId id="331" r:id="rId34"/>
-    <p:sldId id="294" r:id="rId35"/>
-    <p:sldId id="335" r:id="rId36"/>
-    <p:sldId id="293" r:id="rId37"/>
-    <p:sldId id="285" r:id="rId38"/>
-    <p:sldId id="290" r:id="rId39"/>
-    <p:sldId id="350" r:id="rId40"/>
-    <p:sldId id="355" r:id="rId41"/>
-    <p:sldId id="372" r:id="rId42"/>
-    <p:sldId id="347" r:id="rId43"/>
-    <p:sldId id="287" r:id="rId44"/>
-    <p:sldId id="348" r:id="rId45"/>
-    <p:sldId id="288" r:id="rId46"/>
-    <p:sldId id="349" r:id="rId47"/>
-    <p:sldId id="289" r:id="rId48"/>
-    <p:sldId id="258" r:id="rId49"/>
-    <p:sldId id="339" r:id="rId50"/>
+    <p:sldId id="391" r:id="rId14"/>
+    <p:sldId id="390" r:id="rId15"/>
+    <p:sldId id="385" r:id="rId16"/>
+    <p:sldId id="386" r:id="rId17"/>
+    <p:sldId id="359" r:id="rId18"/>
+    <p:sldId id="370" r:id="rId19"/>
+    <p:sldId id="375" r:id="rId20"/>
+    <p:sldId id="362" r:id="rId21"/>
+    <p:sldId id="373" r:id="rId22"/>
+    <p:sldId id="365" r:id="rId23"/>
+    <p:sldId id="363" r:id="rId24"/>
+    <p:sldId id="366" r:id="rId25"/>
+    <p:sldId id="367" r:id="rId26"/>
+    <p:sldId id="368" r:id="rId27"/>
+    <p:sldId id="337" r:id="rId28"/>
+    <p:sldId id="336" r:id="rId29"/>
+    <p:sldId id="272" r:id="rId30"/>
+    <p:sldId id="369" r:id="rId31"/>
+    <p:sldId id="371" r:id="rId32"/>
+    <p:sldId id="332" r:id="rId33"/>
+    <p:sldId id="334" r:id="rId34"/>
+    <p:sldId id="331" r:id="rId35"/>
+    <p:sldId id="294" r:id="rId36"/>
+    <p:sldId id="335" r:id="rId37"/>
+    <p:sldId id="293" r:id="rId38"/>
+    <p:sldId id="285" r:id="rId39"/>
+    <p:sldId id="290" r:id="rId40"/>
+    <p:sldId id="350" r:id="rId41"/>
+    <p:sldId id="355" r:id="rId42"/>
+    <p:sldId id="372" r:id="rId43"/>
+    <p:sldId id="347" r:id="rId44"/>
+    <p:sldId id="287" r:id="rId45"/>
+    <p:sldId id="348" r:id="rId46"/>
+    <p:sldId id="288" r:id="rId47"/>
+    <p:sldId id="349" r:id="rId48"/>
+    <p:sldId id="289" r:id="rId49"/>
+    <p:sldId id="258" r:id="rId50"/>
+    <p:sldId id="339" r:id="rId51"/>
   </p:sldIdLst>
   <p:sldSz cx="9144000" cy="6858000" type="screen4x3"/>
   <p:notesSz cx="6858000" cy="9144000"/>
@@ -314,7 +315,7 @@
               <a:pPr>
                 <a:defRPr/>
               </a:pPr>
-              <a:t>2017/09/12</a:t>
+              <a:t>2017/09/13</a:t>
             </a:fld>
             <a:endParaRPr lang="en-ZA"/>
           </a:p>
@@ -534,7 +535,7 @@
               <a:pPr>
                 <a:defRPr/>
               </a:pPr>
-              <a:t>2017/09/12</a:t>
+              <a:t>2017/09/13</a:t>
             </a:fld>
             <a:endParaRPr lang="en-ZA"/>
           </a:p>
@@ -1645,41 +1646,12 @@
           <a:p>
             <a:pPr lvl="1"/>
             <a:r>
+              <a:rPr lang="en-US" baseline="0" dirty="0"/>
+              <a:t>Installable: </a:t>
+            </a:r>
+            <a:r>
               <a:rPr lang="en-US" dirty="0"/>
-              <a:t>Default:</a:t>
-            </a:r>
-            <a:r>
-              <a:rPr lang="en-US" baseline="0" dirty="0"/>
-              <a:t> Server 2008</a:t>
-            </a:r>
-          </a:p>
-          <a:p>
-            <a:pPr lvl="1"/>
-            <a:r>
-              <a:rPr lang="en-US" baseline="0" dirty="0"/>
-              <a:t>Installable</a:t>
-            </a:r>
-            <a:endParaRPr lang="en-US" dirty="0"/>
-          </a:p>
-          <a:p>
-            <a:pPr lvl="2"/>
-            <a:r>
-              <a:rPr lang="en-US" dirty="0"/>
-              <a:t>XP</a:t>
-            </a:r>
-          </a:p>
-          <a:p>
-            <a:pPr lvl="2"/>
-            <a:r>
-              <a:rPr lang="en-US" dirty="0"/>
-              <a:t>Vista</a:t>
-            </a:r>
-          </a:p>
-          <a:p>
-            <a:pPr lvl="2"/>
-            <a:r>
-              <a:rPr lang="en-US" dirty="0"/>
-              <a:t>Server</a:t>
+              <a:t>XP, Vista, Server</a:t>
             </a:r>
             <a:r>
               <a:rPr lang="en-US" baseline="0" dirty="0"/>
@@ -1704,49 +1676,7 @@
             <a:pPr lvl="1"/>
             <a:r>
               <a:rPr lang="en-US" baseline="0" dirty="0"/>
-              <a:t>Default: </a:t>
-            </a:r>
-          </a:p>
-          <a:p>
-            <a:pPr lvl="2"/>
-            <a:r>
-              <a:rPr lang="en-US" baseline="0" dirty="0"/>
-              <a:t>Win 7</a:t>
-            </a:r>
-          </a:p>
-          <a:p>
-            <a:pPr lvl="2"/>
-            <a:r>
-              <a:rPr lang="en-US" baseline="0" dirty="0"/>
-              <a:t>Server 2008 R2</a:t>
-            </a:r>
-          </a:p>
-          <a:p>
-            <a:pPr lvl="1"/>
-            <a:r>
-              <a:rPr lang="en-US" baseline="0" dirty="0"/>
-              <a:t>Installable:</a:t>
-            </a:r>
-          </a:p>
-          <a:p>
-            <a:pPr lvl="2"/>
-            <a:r>
-              <a:rPr lang="en-US" baseline="0" dirty="0"/>
-              <a:t>XP</a:t>
-            </a:r>
-          </a:p>
-          <a:p>
-            <a:pPr lvl="2"/>
-            <a:r>
-              <a:rPr lang="en-US" baseline="0" dirty="0"/>
-              <a:t>Vista</a:t>
-            </a:r>
-          </a:p>
-          <a:p>
-            <a:pPr lvl="2"/>
-            <a:r>
-              <a:rPr lang="en-US" baseline="0" dirty="0"/>
-              <a:t>Server 2003 + 2008</a:t>
+              <a:t>Installable: XP, Vista, Server 2003 + 2008</a:t>
             </a:r>
           </a:p>
           <a:p>
@@ -1760,42 +1690,7 @@
             <a:pPr lvl="1"/>
             <a:r>
               <a:rPr lang="en-US" baseline="0" dirty="0"/>
-              <a:t>Default:</a:t>
-            </a:r>
-          </a:p>
-          <a:p>
-            <a:pPr lvl="2"/>
-            <a:r>
-              <a:rPr lang="en-US" baseline="0" dirty="0"/>
-              <a:t>Win 8</a:t>
-            </a:r>
-          </a:p>
-          <a:p>
-            <a:pPr lvl="2"/>
-            <a:r>
-              <a:rPr lang="en-US" baseline="0" dirty="0"/>
-              <a:t>Server 2012</a:t>
-            </a:r>
-          </a:p>
-          <a:p>
-            <a:pPr lvl="1"/>
-            <a:r>
-              <a:rPr lang="en-US" baseline="0" dirty="0"/>
-              <a:t>Installable:</a:t>
-            </a:r>
-          </a:p>
-          <a:p>
-            <a:pPr lvl="2"/>
-            <a:r>
-              <a:rPr lang="en-US" baseline="0" dirty="0"/>
-              <a:t>Win 7</a:t>
-            </a:r>
-          </a:p>
-          <a:p>
-            <a:pPr lvl="2"/>
-            <a:r>
-              <a:rPr lang="en-US" baseline="0" dirty="0"/>
-              <a:t>Server 2008 R2</a:t>
+              <a:t>Installable: Win 7, Server 2008 R2</a:t>
             </a:r>
           </a:p>
           <a:p>
@@ -1809,49 +1704,7 @@
             <a:pPr lvl="1"/>
             <a:r>
               <a:rPr lang="en-US" baseline="0" dirty="0"/>
-              <a:t>Default:</a:t>
-            </a:r>
-          </a:p>
-          <a:p>
-            <a:pPr lvl="2"/>
-            <a:r>
-              <a:rPr lang="en-US" baseline="0" dirty="0"/>
-              <a:t>Win 8.1</a:t>
-            </a:r>
-          </a:p>
-          <a:p>
-            <a:pPr lvl="2"/>
-            <a:r>
-              <a:rPr lang="en-US" baseline="0" dirty="0"/>
-              <a:t>Server 2012 R2</a:t>
-            </a:r>
-          </a:p>
-          <a:p>
-            <a:pPr lvl="1"/>
-            <a:r>
-              <a:rPr lang="en-US" baseline="0" dirty="0"/>
-              <a:t>Installable:</a:t>
-            </a:r>
-          </a:p>
-          <a:p>
-            <a:pPr lvl="2"/>
-            <a:r>
-              <a:rPr lang="en-US" baseline="0" dirty="0"/>
-              <a:t>Win 7</a:t>
-            </a:r>
-          </a:p>
-          <a:p>
-            <a:pPr lvl="2"/>
-            <a:r>
-              <a:rPr lang="en-US" baseline="0" dirty="0"/>
-              <a:t>Server 2008 R2</a:t>
-            </a:r>
-          </a:p>
-          <a:p>
-            <a:pPr lvl="2"/>
-            <a:r>
-              <a:rPr lang="en-US" baseline="0" dirty="0"/>
-              <a:t>Server 2012</a:t>
+              <a:t>Installable: Win 7, Server 2008 R2, Server 2012</a:t>
             </a:r>
           </a:p>
           <a:p>
@@ -1865,35 +1718,7 @@
             <a:pPr lvl="1"/>
             <a:r>
               <a:rPr lang="en-US" baseline="0" dirty="0"/>
-              <a:t>Default:</a:t>
-            </a:r>
-          </a:p>
-          <a:p>
-            <a:pPr lvl="2"/>
-            <a:r>
-              <a:rPr lang="en-US" baseline="0" dirty="0"/>
-              <a:t>Win 10</a:t>
-            </a:r>
-          </a:p>
-          <a:p>
-            <a:pPr lvl="1"/>
-            <a:r>
-              <a:rPr lang="en-US" baseline="0" dirty="0"/>
-              <a:t>Installable:</a:t>
-            </a:r>
-          </a:p>
-          <a:p>
-            <a:pPr lvl="2"/>
-            <a:r>
-              <a:rPr lang="en-US" baseline="0" dirty="0"/>
-              <a:t>Win 8.1</a:t>
-            </a:r>
-          </a:p>
-          <a:p>
-            <a:pPr lvl="2"/>
-            <a:r>
-              <a:rPr lang="en-US" baseline="0" dirty="0"/>
-              <a:t>Server 2012 R2</a:t>
+              <a:t>Installable: Win 8.1, Server 2012 R2</a:t>
             </a:r>
           </a:p>
           <a:p>
@@ -1949,11 +1774,7 @@
             <a:pPr lvl="1"/>
             <a:r>
               <a:rPr lang="en-US" baseline="0" dirty="0"/>
-              <a:t>Forward =&gt; as long the script has the required modules and functions </a:t>
-            </a:r>
-            <a:r>
-              <a:rPr lang="en-US" baseline="0" dirty="0" err="1"/>
-              <a:t>accessable</a:t>
+              <a:t>Forward =&gt; as long the script has the required modules and functions accessible</a:t>
             </a:r>
             <a:br>
               <a:rPr lang="en-US" baseline="0" dirty="0"/>
@@ -2723,7 +2544,7 @@
                 <a:buNone/>
                 <a:defRPr/>
               </a:pPr>
-              <a:t>12 September 2017</a:t>
+              <a:t>13 September 2017</a:t>
             </a:fld>
             <a:endParaRPr lang="en-US" sz="1400">
               <a:solidFill>
@@ -3957,7 +3778,7 @@
                 </a:spcAft>
                 <a:defRPr/>
               </a:pPr>
-              <a:t>12 September 2017</a:t>
+              <a:t>13 September 2017</a:t>
             </a:fld>
             <a:endParaRPr lang="en-ZA">
               <a:solidFill>
@@ -4472,7 +4293,7 @@
                 </a:spcAft>
                 <a:defRPr/>
               </a:pPr>
-              <a:t>12 September 2017</a:t>
+              <a:t>13 September 2017</a:t>
             </a:fld>
             <a:endParaRPr lang="en-ZA">
               <a:solidFill>
@@ -5961,7 +5782,7 @@
                 <a:buNone/>
                 <a:defRPr/>
               </a:pPr>
-              <a:t>12 September 2017</a:t>
+              <a:t>13 September 2017</a:t>
             </a:fld>
             <a:endParaRPr lang="en-US" sz="1400">
               <a:solidFill>
@@ -6557,7 +6378,7 @@
                 </a:spcAft>
                 <a:defRPr/>
               </a:pPr>
-              <a:t>12 September 2017</a:t>
+              <a:t>13 September 2017</a:t>
             </a:fld>
             <a:endParaRPr lang="en-ZA">
               <a:solidFill>
@@ -7220,7 +7041,7 @@
                 </a:spcAft>
                 <a:defRPr/>
               </a:pPr>
-              <a:t>12 September 2017</a:t>
+              <a:t>13 September 2017</a:t>
             </a:fld>
             <a:endParaRPr lang="en-ZA">
               <a:solidFill>
@@ -8586,7 +8407,7 @@
                 </a:spcAft>
                 <a:defRPr/>
               </a:pPr>
-              <a:t>12 September 2017</a:t>
+              <a:t>13 September 2017</a:t>
             </a:fld>
             <a:endParaRPr lang="en-ZA">
               <a:solidFill>
@@ -9430,7 +9251,7 @@
                 </a:spcAft>
                 <a:defRPr/>
               </a:pPr>
-              <a:t>12 September 2017</a:t>
+              <a:t>13 September 2017</a:t>
             </a:fld>
             <a:endParaRPr lang="en-ZA">
               <a:solidFill>
@@ -10220,7 +10041,7 @@
                 </a:spcAft>
                 <a:defRPr/>
               </a:pPr>
-              <a:t>12 September 2017</a:t>
+              <a:t>13 September 2017</a:t>
             </a:fld>
             <a:endParaRPr lang="en-ZA">
               <a:solidFill>
@@ -10994,8 +10815,9 @@
           <a:p>
             <a:r>
               <a:rPr lang="en-US" dirty="0"/>
-              <a:t>Useful Tools</a:t>
-            </a:r>
+              <a:t>Modules</a:t>
+            </a:r>
+            <a:endParaRPr lang="en-BE" dirty="0"/>
           </a:p>
         </p:txBody>
       </p:sp>
@@ -11014,14 +10836,14 @@
           <a:bodyPr/>
           <a:lstStyle/>
           <a:p>
-            <a:endParaRPr lang="en-US"/>
+            <a:endParaRPr lang="en-BE"/>
           </a:p>
         </p:txBody>
       </p:sp>
     </p:spTree>
     <p:extLst>
       <p:ext uri="{BB962C8B-B14F-4D97-AF65-F5344CB8AC3E}">
-        <p14:creationId xmlns:p14="http://schemas.microsoft.com/office/powerpoint/2010/main" val="435000849"/>
+        <p14:creationId xmlns:p14="http://schemas.microsoft.com/office/powerpoint/2010/main" val="1476788318"/>
       </p:ext>
     </p:extLst>
   </p:cSld>
@@ -11065,6 +10887,77 @@
           <a:p>
             <a:r>
               <a:rPr lang="en-US" dirty="0"/>
+              <a:t>Useful Tools</a:t>
+            </a:r>
+          </a:p>
+        </p:txBody>
+      </p:sp>
+      <p:sp>
+        <p:nvSpPr>
+          <p:cNvPr id="3" name="Content Placeholder 2"/>
+          <p:cNvSpPr>
+            <a:spLocks noGrp="1"/>
+          </p:cNvSpPr>
+          <p:nvPr>
+            <p:ph idx="1"/>
+          </p:nvPr>
+        </p:nvSpPr>
+        <p:spPr/>
+        <p:txBody>
+          <a:bodyPr/>
+          <a:lstStyle/>
+          <a:p>
+            <a:endParaRPr lang="en-US"/>
+          </a:p>
+        </p:txBody>
+      </p:sp>
+    </p:spTree>
+    <p:extLst>
+      <p:ext uri="{BB962C8B-B14F-4D97-AF65-F5344CB8AC3E}">
+        <p14:creationId xmlns:p14="http://schemas.microsoft.com/office/powerpoint/2010/main" val="435000849"/>
+      </p:ext>
+    </p:extLst>
+  </p:cSld>
+  <p:clrMapOvr>
+    <a:masterClrMapping/>
+  </p:clrMapOvr>
+</p:sld>
+</file>
+
+<file path=ppt/slides/slide12.xml><?xml version="1.0" encoding="utf-8"?>
+<p:sld xmlns:a="http://schemas.openxmlformats.org/drawingml/2006/main" xmlns:r="http://schemas.openxmlformats.org/officeDocument/2006/relationships" xmlns:p="http://schemas.openxmlformats.org/presentationml/2006/main">
+  <p:cSld>
+    <p:spTree>
+      <p:nvGrpSpPr>
+        <p:cNvPr id="1" name=""/>
+        <p:cNvGrpSpPr/>
+        <p:nvPr/>
+      </p:nvGrpSpPr>
+      <p:grpSpPr>
+        <a:xfrm>
+          <a:off x="0" y="0"/>
+          <a:ext cx="0" cy="0"/>
+          <a:chOff x="0" y="0"/>
+          <a:chExt cx="0" cy="0"/>
+        </a:xfrm>
+      </p:grpSpPr>
+      <p:sp>
+        <p:nvSpPr>
+          <p:cNvPr id="2" name="Title 1"/>
+          <p:cNvSpPr>
+            <a:spLocks noGrp="1"/>
+          </p:cNvSpPr>
+          <p:nvPr>
+            <p:ph type="title"/>
+          </p:nvPr>
+        </p:nvSpPr>
+        <p:spPr/>
+        <p:txBody>
+          <a:bodyPr/>
+          <a:lstStyle/>
+          <a:p>
+            <a:r>
+              <a:rPr lang="en-US" dirty="0"/>
               <a:t>PowerShell Core</a:t>
             </a:r>
           </a:p>
@@ -11102,7 +10995,7 @@
 </p:sld>
 </file>
 
-<file path=ppt/slides/slide12.xml><?xml version="1.0" encoding="utf-8"?>
+<file path=ppt/slides/slide13.xml><?xml version="1.0" encoding="utf-8"?>
 <p:sld xmlns:a="http://schemas.openxmlformats.org/drawingml/2006/main" xmlns:r="http://schemas.openxmlformats.org/officeDocument/2006/relationships" xmlns:p="http://schemas.openxmlformats.org/presentationml/2006/main">
   <p:cSld>
     <p:spTree>
@@ -12387,7 +12280,7 @@
 </p:sld>
 </file>
 
-<file path=ppt/slides/slide13.xml><?xml version="1.0" encoding="utf-8"?>
+<file path=ppt/slides/slide14.xml><?xml version="1.0" encoding="utf-8"?>
 <p:sld xmlns:a="http://schemas.openxmlformats.org/drawingml/2006/main" xmlns:r="http://schemas.openxmlformats.org/officeDocument/2006/relationships" xmlns:p="http://schemas.openxmlformats.org/presentationml/2006/main">
   <p:cSld>
     <p:spTree>
@@ -13704,7 +13597,7 @@
 </p:sld>
 </file>
 
-<file path=ppt/slides/slide14.xml><?xml version="1.0" encoding="utf-8"?>
+<file path=ppt/slides/slide15.xml><?xml version="1.0" encoding="utf-8"?>
 <p:sld xmlns:a="http://schemas.openxmlformats.org/drawingml/2006/main" xmlns:r="http://schemas.openxmlformats.org/officeDocument/2006/relationships" xmlns:p="http://schemas.openxmlformats.org/presentationml/2006/main">
   <p:cSld>
     <p:spTree>
@@ -15025,7 +14918,7 @@
 </p:sld>
 </file>
 
-<file path=ppt/slides/slide15.xml><?xml version="1.0" encoding="utf-8"?>
+<file path=ppt/slides/slide16.xml><?xml version="1.0" encoding="utf-8"?>
 <p:sld xmlns:a="http://schemas.openxmlformats.org/drawingml/2006/main" xmlns:r="http://schemas.openxmlformats.org/officeDocument/2006/relationships" xmlns:p="http://schemas.openxmlformats.org/presentationml/2006/main">
   <p:cSld>
     <p:spTree>
@@ -15127,7 +15020,7 @@
 </p:sld>
 </file>
 
-<file path=ppt/slides/slide16.xml><?xml version="1.0" encoding="utf-8"?>
+<file path=ppt/slides/slide17.xml><?xml version="1.0" encoding="utf-8"?>
 <p:sld xmlns:a="http://schemas.openxmlformats.org/drawingml/2006/main" xmlns:r="http://schemas.openxmlformats.org/officeDocument/2006/relationships" xmlns:p="http://schemas.openxmlformats.org/presentationml/2006/main">
   <p:cSld>
     <p:spTree>
@@ -15212,7 +15105,7 @@
           <a:graphicData uri="http://schemas.openxmlformats.org/presentationml/2006/ole">
             <mc:AlternateContent xmlns:mc="http://schemas.openxmlformats.org/markup-compatibility/2006">
               <mc:Choice xmlns:v="urn:schemas-microsoft-com:vml" Requires="v">
-                <p:oleObj spid="_x0000_s34843" r:id="rId3" imgW="8039959" imgH="4681341" progId="Excel.Chart.8">
+                <p:oleObj spid="_x0000_s34847" r:id="rId3" imgW="8039959" imgH="4681341" progId="Excel.Chart.8">
                   <p:embed/>
                 </p:oleObj>
               </mc:Choice>
@@ -15448,7 +15341,7 @@
 </p:sld>
 </file>
 
-<file path=ppt/slides/slide17.xml><?xml version="1.0" encoding="utf-8"?>
+<file path=ppt/slides/slide18.xml><?xml version="1.0" encoding="utf-8"?>
 <p:sld xmlns:a="http://schemas.openxmlformats.org/drawingml/2006/main" xmlns:r="http://schemas.openxmlformats.org/officeDocument/2006/relationships" xmlns:p="http://schemas.openxmlformats.org/presentationml/2006/main">
   <p:cSld>
     <p:spTree>
@@ -15576,7 +15469,7 @@
           <a:graphicData uri="http://schemas.openxmlformats.org/presentationml/2006/ole">
             <mc:AlternateContent xmlns:mc="http://schemas.openxmlformats.org/markup-compatibility/2006">
               <mc:Choice xmlns:v="urn:schemas-microsoft-com:vml" Requires="v">
-                <p:oleObj spid="_x0000_s35868" r:id="rId3" imgW="8033864" imgH="4681341" progId="Excel.Chart.8">
+                <p:oleObj spid="_x0000_s35872" r:id="rId3" imgW="8033864" imgH="4681341" progId="Excel.Chart.8">
                   <p:embed/>
                 </p:oleObj>
               </mc:Choice>
@@ -15812,7 +15705,7 @@
 </p:sld>
 </file>
 
-<file path=ppt/slides/slide18.xml><?xml version="1.0" encoding="utf-8"?>
+<file path=ppt/slides/slide19.xml><?xml version="1.0" encoding="utf-8"?>
 <p:sld xmlns:a="http://schemas.openxmlformats.org/drawingml/2006/main" xmlns:r="http://schemas.openxmlformats.org/officeDocument/2006/relationships" xmlns:p="http://schemas.openxmlformats.org/presentationml/2006/main">
   <p:cSld>
     <p:spTree>
@@ -15897,7 +15790,7 @@
           <a:graphicData uri="http://schemas.openxmlformats.org/presentationml/2006/ole">
             <mc:AlternateContent xmlns:mc="http://schemas.openxmlformats.org/markup-compatibility/2006">
               <mc:Choice xmlns:v="urn:schemas-microsoft-com:vml" Requires="v">
-                <p:oleObj spid="_x0000_s36891" r:id="rId3" imgW="8039959" imgH="4681341" progId="Excel.Chart.8">
+                <p:oleObj spid="_x0000_s36895" r:id="rId3" imgW="8039959" imgH="4681341" progId="Excel.Chart.8">
                   <p:embed/>
                 </p:oleObj>
               </mc:Choice>
@@ -16133,7 +16026,145 @@
 </p:sld>
 </file>
 
-<file path=ppt/slides/slide19.xml><?xml version="1.0" encoding="utf-8"?>
+<file path=ppt/slides/slide2.xml><?xml version="1.0" encoding="utf-8"?>
+<p:sld xmlns:a="http://schemas.openxmlformats.org/drawingml/2006/main" xmlns:r="http://schemas.openxmlformats.org/officeDocument/2006/relationships" xmlns:p="http://schemas.openxmlformats.org/presentationml/2006/main">
+  <p:cSld>
+    <p:spTree>
+      <p:nvGrpSpPr>
+        <p:cNvPr id="1" name=""/>
+        <p:cNvGrpSpPr/>
+        <p:nvPr/>
+      </p:nvGrpSpPr>
+      <p:grpSpPr>
+        <a:xfrm>
+          <a:off x="0" y="0"/>
+          <a:ext cx="0" cy="0"/>
+          <a:chOff x="0" y="0"/>
+          <a:chExt cx="0" cy="0"/>
+        </a:xfrm>
+      </p:grpSpPr>
+      <p:sp>
+        <p:nvSpPr>
+          <p:cNvPr id="2" name="Title 1"/>
+          <p:cNvSpPr>
+            <a:spLocks noGrp="1"/>
+          </p:cNvSpPr>
+          <p:nvPr>
+            <p:ph type="title"/>
+          </p:nvPr>
+        </p:nvSpPr>
+        <p:spPr/>
+        <p:txBody>
+          <a:bodyPr/>
+          <a:lstStyle/>
+          <a:p>
+            <a:r>
+              <a:rPr lang="en-US" dirty="0"/>
+              <a:t>Basic PowerShell</a:t>
+            </a:r>
+          </a:p>
+        </p:txBody>
+      </p:sp>
+      <p:sp>
+        <p:nvSpPr>
+          <p:cNvPr id="3" name="Content Placeholder 2"/>
+          <p:cNvSpPr>
+            <a:spLocks noGrp="1"/>
+          </p:cNvSpPr>
+          <p:nvPr>
+            <p:ph idx="1"/>
+          </p:nvPr>
+        </p:nvSpPr>
+        <p:spPr/>
+        <p:txBody>
+          <a:bodyPr/>
+          <a:lstStyle/>
+          <a:p>
+            <a:pPr>
+              <a:buFont typeface="Arial" charset="0"/>
+              <a:buChar char="•"/>
+            </a:pPr>
+            <a:r>
+              <a:rPr lang="en-US" dirty="0"/>
+              <a:t>What</a:t>
+            </a:r>
+          </a:p>
+          <a:p>
+            <a:pPr>
+              <a:buFont typeface="Arial" charset="0"/>
+              <a:buChar char="•"/>
+            </a:pPr>
+            <a:r>
+              <a:rPr lang="en-US" dirty="0"/>
+              <a:t>History</a:t>
+            </a:r>
+          </a:p>
+          <a:p>
+            <a:pPr>
+              <a:buFont typeface="Arial" charset="0"/>
+              <a:buChar char="•"/>
+            </a:pPr>
+            <a:r>
+              <a:rPr lang="en-US" dirty="0"/>
+              <a:t>Basic usage</a:t>
+            </a:r>
+          </a:p>
+          <a:p>
+            <a:pPr>
+              <a:buFont typeface="Arial" charset="0"/>
+              <a:buChar char="•"/>
+            </a:pPr>
+            <a:r>
+              <a:rPr lang="en-US" dirty="0"/>
+              <a:t>Functions and Modules</a:t>
+            </a:r>
+          </a:p>
+          <a:p>
+            <a:pPr>
+              <a:buFont typeface="Arial" charset="0"/>
+              <a:buChar char="•"/>
+            </a:pPr>
+            <a:r>
+              <a:rPr lang="en-US" dirty="0"/>
+              <a:t>Useful Tools</a:t>
+            </a:r>
+          </a:p>
+          <a:p>
+            <a:pPr>
+              <a:buFont typeface="Arial" charset="0"/>
+              <a:buChar char="•"/>
+            </a:pPr>
+            <a:r>
+              <a:rPr lang="en-US" dirty="0"/>
+              <a:t>PowerShell Core</a:t>
+            </a:r>
+          </a:p>
+          <a:p>
+            <a:pPr>
+              <a:buFont typeface="Arial" charset="0"/>
+              <a:buChar char="•"/>
+            </a:pPr>
+            <a:r>
+              <a:rPr lang="en-US" dirty="0"/>
+              <a:t>Q &amp; A</a:t>
+            </a:r>
+          </a:p>
+        </p:txBody>
+      </p:sp>
+    </p:spTree>
+    <p:extLst>
+      <p:ext uri="{BB962C8B-B14F-4D97-AF65-F5344CB8AC3E}">
+        <p14:creationId xmlns:p14="http://schemas.microsoft.com/office/powerpoint/2010/main" val="962515605"/>
+      </p:ext>
+    </p:extLst>
+  </p:cSld>
+  <p:clrMapOvr>
+    <a:masterClrMapping/>
+  </p:clrMapOvr>
+</p:sld>
+</file>
+
+<file path=ppt/slides/slide20.xml><?xml version="1.0" encoding="utf-8"?>
 <p:sld xmlns:a="http://schemas.openxmlformats.org/drawingml/2006/main" xmlns:r="http://schemas.openxmlformats.org/officeDocument/2006/relationships" xmlns:p="http://schemas.openxmlformats.org/presentationml/2006/main">
   <p:cSld>
     <p:spTree>
@@ -16261,7 +16292,7 @@
           <a:graphicData uri="http://schemas.openxmlformats.org/presentationml/2006/ole">
             <mc:AlternateContent xmlns:mc="http://schemas.openxmlformats.org/markup-compatibility/2006">
               <mc:Choice xmlns:v="urn:schemas-microsoft-com:vml" Requires="v">
-                <p:oleObj spid="_x0000_s37916" r:id="rId3" imgW="8033864" imgH="4681341" progId="Excel.Chart.8">
+                <p:oleObj spid="_x0000_s37920" r:id="rId3" imgW="8033864" imgH="4681341" progId="Excel.Chart.8">
                   <p:embed/>
                 </p:oleObj>
               </mc:Choice>
@@ -16497,145 +16528,7 @@
 </p:sld>
 </file>
 
-<file path=ppt/slides/slide2.xml><?xml version="1.0" encoding="utf-8"?>
-<p:sld xmlns:a="http://schemas.openxmlformats.org/drawingml/2006/main" xmlns:r="http://schemas.openxmlformats.org/officeDocument/2006/relationships" xmlns:p="http://schemas.openxmlformats.org/presentationml/2006/main">
-  <p:cSld>
-    <p:spTree>
-      <p:nvGrpSpPr>
-        <p:cNvPr id="1" name=""/>
-        <p:cNvGrpSpPr/>
-        <p:nvPr/>
-      </p:nvGrpSpPr>
-      <p:grpSpPr>
-        <a:xfrm>
-          <a:off x="0" y="0"/>
-          <a:ext cx="0" cy="0"/>
-          <a:chOff x="0" y="0"/>
-          <a:chExt cx="0" cy="0"/>
-        </a:xfrm>
-      </p:grpSpPr>
-      <p:sp>
-        <p:nvSpPr>
-          <p:cNvPr id="2" name="Title 1"/>
-          <p:cNvSpPr>
-            <a:spLocks noGrp="1"/>
-          </p:cNvSpPr>
-          <p:nvPr>
-            <p:ph type="title"/>
-          </p:nvPr>
-        </p:nvSpPr>
-        <p:spPr/>
-        <p:txBody>
-          <a:bodyPr/>
-          <a:lstStyle/>
-          <a:p>
-            <a:r>
-              <a:rPr lang="en-US" dirty="0"/>
-              <a:t>Basic PowerShell</a:t>
-            </a:r>
-          </a:p>
-        </p:txBody>
-      </p:sp>
-      <p:sp>
-        <p:nvSpPr>
-          <p:cNvPr id="3" name="Content Placeholder 2"/>
-          <p:cNvSpPr>
-            <a:spLocks noGrp="1"/>
-          </p:cNvSpPr>
-          <p:nvPr>
-            <p:ph idx="1"/>
-          </p:nvPr>
-        </p:nvSpPr>
-        <p:spPr/>
-        <p:txBody>
-          <a:bodyPr/>
-          <a:lstStyle/>
-          <a:p>
-            <a:pPr>
-              <a:buFont typeface="Arial" charset="0"/>
-              <a:buChar char="•"/>
-            </a:pPr>
-            <a:r>
-              <a:rPr lang="en-US" dirty="0"/>
-              <a:t>What</a:t>
-            </a:r>
-          </a:p>
-          <a:p>
-            <a:pPr>
-              <a:buFont typeface="Arial" charset="0"/>
-              <a:buChar char="•"/>
-            </a:pPr>
-            <a:r>
-              <a:rPr lang="en-US" dirty="0"/>
-              <a:t>History</a:t>
-            </a:r>
-          </a:p>
-          <a:p>
-            <a:pPr>
-              <a:buFont typeface="Arial" charset="0"/>
-              <a:buChar char="•"/>
-            </a:pPr>
-            <a:r>
-              <a:rPr lang="en-US" dirty="0"/>
-              <a:t>Basic usage</a:t>
-            </a:r>
-          </a:p>
-          <a:p>
-            <a:pPr>
-              <a:buFont typeface="Arial" charset="0"/>
-              <a:buChar char="•"/>
-            </a:pPr>
-            <a:r>
-              <a:rPr lang="en-US" dirty="0"/>
-              <a:t>Functions and Modules</a:t>
-            </a:r>
-          </a:p>
-          <a:p>
-            <a:pPr>
-              <a:buFont typeface="Arial" charset="0"/>
-              <a:buChar char="•"/>
-            </a:pPr>
-            <a:r>
-              <a:rPr lang="en-US" dirty="0"/>
-              <a:t>Useful Tools</a:t>
-            </a:r>
-          </a:p>
-          <a:p>
-            <a:pPr>
-              <a:buFont typeface="Arial" charset="0"/>
-              <a:buChar char="•"/>
-            </a:pPr>
-            <a:r>
-              <a:rPr lang="en-US" dirty="0"/>
-              <a:t>PowerShell Core</a:t>
-            </a:r>
-          </a:p>
-          <a:p>
-            <a:pPr>
-              <a:buFont typeface="Arial" charset="0"/>
-              <a:buChar char="•"/>
-            </a:pPr>
-            <a:r>
-              <a:rPr lang="en-US" dirty="0"/>
-              <a:t>Q &amp; A</a:t>
-            </a:r>
-          </a:p>
-        </p:txBody>
-      </p:sp>
-    </p:spTree>
-    <p:extLst>
-      <p:ext uri="{BB962C8B-B14F-4D97-AF65-F5344CB8AC3E}">
-        <p14:creationId xmlns:p14="http://schemas.microsoft.com/office/powerpoint/2010/main" val="962515605"/>
-      </p:ext>
-    </p:extLst>
-  </p:cSld>
-  <p:clrMapOvr>
-    <a:masterClrMapping/>
-  </p:clrMapOvr>
-</p:sld>
-</file>
-
-<file path=ppt/slides/slide20.xml><?xml version="1.0" encoding="utf-8"?>
+<file path=ppt/slides/slide21.xml><?xml version="1.0" encoding="utf-8"?>
 <p:sld xmlns:a="http://schemas.openxmlformats.org/drawingml/2006/main" xmlns:r="http://schemas.openxmlformats.org/officeDocument/2006/relationships" xmlns:p="http://schemas.openxmlformats.org/presentationml/2006/main">
   <p:cSld>
     <p:spTree>
@@ -16763,7 +16656,7 @@
           <a:graphicData uri="http://schemas.openxmlformats.org/presentationml/2006/ole">
             <mc:AlternateContent xmlns:mc="http://schemas.openxmlformats.org/markup-compatibility/2006">
               <mc:Choice xmlns:v="urn:schemas-microsoft-com:vml" Requires="v">
-                <p:oleObj spid="_x0000_s38940" r:id="rId3" imgW="8033864" imgH="4681341" progId="Excel.Chart.8">
+                <p:oleObj spid="_x0000_s38944" r:id="rId3" imgW="8033864" imgH="4681341" progId="Excel.Chart.8">
                   <p:embed/>
                 </p:oleObj>
               </mc:Choice>
@@ -16999,7 +16892,7 @@
 </p:sld>
 </file>
 
-<file path=ppt/slides/slide21.xml><?xml version="1.0" encoding="utf-8"?>
+<file path=ppt/slides/slide22.xml><?xml version="1.0" encoding="utf-8"?>
 <p:sld xmlns:a="http://schemas.openxmlformats.org/drawingml/2006/main" xmlns:r="http://schemas.openxmlformats.org/officeDocument/2006/relationships" xmlns:p="http://schemas.openxmlformats.org/presentationml/2006/main">
   <p:cSld>
     <p:spTree>
@@ -17127,7 +17020,7 @@
           <a:graphicData uri="http://schemas.openxmlformats.org/presentationml/2006/ole">
             <mc:AlternateContent xmlns:mc="http://schemas.openxmlformats.org/markup-compatibility/2006">
               <mc:Choice xmlns:v="urn:schemas-microsoft-com:vml" Requires="v">
-                <p:oleObj spid="_x0000_s39964" r:id="rId3" imgW="8033864" imgH="4681341" progId="Excel.Chart.8">
+                <p:oleObj spid="_x0000_s39968" r:id="rId3" imgW="8033864" imgH="4681341" progId="Excel.Chart.8">
                   <p:embed/>
                 </p:oleObj>
               </mc:Choice>
@@ -17363,236 +17256,6 @@
 </p:sld>
 </file>
 
-<file path=ppt/slides/slide22.xml><?xml version="1.0" encoding="utf-8"?>
-<p:sld xmlns:a="http://schemas.openxmlformats.org/drawingml/2006/main" xmlns:r="http://schemas.openxmlformats.org/officeDocument/2006/relationships" xmlns:p="http://schemas.openxmlformats.org/presentationml/2006/main">
-  <p:cSld>
-    <p:spTree>
-      <p:nvGrpSpPr>
-        <p:cNvPr id="1" name=""/>
-        <p:cNvGrpSpPr/>
-        <p:nvPr/>
-      </p:nvGrpSpPr>
-      <p:grpSpPr>
-        <a:xfrm>
-          <a:off x="0" y="0"/>
-          <a:ext cx="0" cy="0"/>
-          <a:chOff x="0" y="0"/>
-          <a:chExt cx="0" cy="0"/>
-        </a:xfrm>
-      </p:grpSpPr>
-      <p:sp>
-        <p:nvSpPr>
-          <p:cNvPr id="40962" name="Title 3"/>
-          <p:cNvSpPr>
-            <a:spLocks noGrp="1"/>
-          </p:cNvSpPr>
-          <p:nvPr>
-            <p:ph type="title"/>
-          </p:nvPr>
-        </p:nvSpPr>
-        <p:spPr/>
-        <p:txBody>
-          <a:bodyPr/>
-          <a:lstStyle/>
-          <a:p>
-            <a:pPr eaLnBrk="1" hangingPunct="1"/>
-            <a:r>
-              <a:rPr lang="en-ZA">
-                <a:ea typeface="ＭＳ Ｐゴシック" pitchFamily="34" charset="-128"/>
-              </a:rPr>
-              <a:t>To set graph as default for new graphs:</a:t>
-            </a:r>
-          </a:p>
-        </p:txBody>
-      </p:sp>
-      <p:sp>
-        <p:nvSpPr>
-          <p:cNvPr id="40963" name="Content Placeholder 4"/>
-          <p:cNvSpPr>
-            <a:spLocks noGrp="1"/>
-          </p:cNvSpPr>
-          <p:nvPr>
-            <p:ph idx="1"/>
-          </p:nvPr>
-        </p:nvSpPr>
-        <p:spPr/>
-        <p:txBody>
-          <a:bodyPr/>
-          <a:lstStyle/>
-          <a:p>
-            <a:pPr lvl="1" eaLnBrk="1" hangingPunct="1"/>
-            <a:r>
-              <a:rPr lang="en-ZA">
-                <a:ea typeface="ＭＳ Ｐゴシック" pitchFamily="34" charset="-128"/>
-              </a:rPr>
-              <a:t>Select example graph on following page</a:t>
-            </a:r>
-          </a:p>
-          <a:p>
-            <a:pPr lvl="1" eaLnBrk="1" hangingPunct="1"/>
-            <a:r>
-              <a:rPr lang="en-ZA">
-                <a:ea typeface="ＭＳ Ｐゴシック" pitchFamily="34" charset="-128"/>
-              </a:rPr>
-              <a:t>Click on </a:t>
-            </a:r>
-            <a:r>
-              <a:rPr lang="en-ZA">
-                <a:solidFill>
-                  <a:schemeClr val="accent1"/>
-                </a:solidFill>
-                <a:ea typeface="ＭＳ Ｐゴシック" pitchFamily="34" charset="-128"/>
-              </a:rPr>
-              <a:t>chart tools&gt;design </a:t>
-            </a:r>
-            <a:r>
-              <a:rPr lang="en-ZA">
-                <a:ea typeface="ＭＳ Ｐゴシック" pitchFamily="34" charset="-128"/>
-              </a:rPr>
-              <a:t>tab and select </a:t>
-            </a:r>
-            <a:r>
-              <a:rPr lang="en-ZA" altLang="en-US">
-                <a:ea typeface="ＭＳ Ｐゴシック" pitchFamily="34" charset="-128"/>
-              </a:rPr>
-              <a:t>“</a:t>
-            </a:r>
-            <a:r>
-              <a:rPr lang="en-ZA">
-                <a:ea typeface="ＭＳ Ｐゴシック" pitchFamily="34" charset="-128"/>
-              </a:rPr>
-              <a:t>save as template</a:t>
-            </a:r>
-            <a:r>
-              <a:rPr lang="en-ZA" altLang="en-US">
-                <a:ea typeface="ＭＳ Ｐゴシック" pitchFamily="34" charset="-128"/>
-              </a:rPr>
-              <a:t>”</a:t>
-            </a:r>
-            <a:br>
-              <a:rPr lang="en-ZA">
-                <a:ea typeface="ＭＳ Ｐゴシック" pitchFamily="34" charset="-128"/>
-              </a:rPr>
-            </a:br>
-            <a:r>
-              <a:rPr lang="en-ZA">
-                <a:ea typeface="ＭＳ Ｐゴシック" pitchFamily="34" charset="-128"/>
-              </a:rPr>
-              <a:t>Choose a name for your default</a:t>
-            </a:r>
-          </a:p>
-          <a:p>
-            <a:pPr lvl="1" eaLnBrk="1" hangingPunct="1"/>
-            <a:r>
-              <a:rPr lang="en-ZA">
-                <a:ea typeface="ＭＳ Ｐゴシック" pitchFamily="34" charset="-128"/>
-              </a:rPr>
-              <a:t>On next page, click on the graph icon</a:t>
-            </a:r>
-          </a:p>
-          <a:p>
-            <a:pPr lvl="1" eaLnBrk="1" hangingPunct="1"/>
-            <a:r>
-              <a:rPr lang="en-ZA">
-                <a:ea typeface="ＭＳ Ｐゴシック" pitchFamily="34" charset="-128"/>
-              </a:rPr>
-              <a:t>Add your data</a:t>
-            </a:r>
-          </a:p>
-          <a:p>
-            <a:pPr lvl="1" eaLnBrk="1" hangingPunct="1"/>
-            <a:r>
-              <a:rPr lang="en-ZA">
-                <a:ea typeface="ＭＳ Ｐゴシック" pitchFamily="34" charset="-128"/>
-              </a:rPr>
-              <a:t>Select the graph and click on </a:t>
-            </a:r>
-            <a:r>
-              <a:rPr lang="en-ZA">
-                <a:solidFill>
-                  <a:schemeClr val="accent1"/>
-                </a:solidFill>
-                <a:ea typeface="ＭＳ Ｐゴシック" pitchFamily="34" charset="-128"/>
-              </a:rPr>
-              <a:t>chart tools&gt;design </a:t>
-            </a:r>
-            <a:r>
-              <a:rPr lang="en-ZA">
-                <a:ea typeface="ＭＳ Ｐゴシック" pitchFamily="34" charset="-128"/>
-              </a:rPr>
-              <a:t>tab, then select </a:t>
-            </a:r>
-            <a:r>
-              <a:rPr lang="en-ZA" altLang="en-US">
-                <a:ea typeface="ＭＳ Ｐゴシック" pitchFamily="34" charset="-128"/>
-              </a:rPr>
-              <a:t>“</a:t>
-            </a:r>
-            <a:r>
-              <a:rPr lang="en-ZA" altLang="ja-JP">
-                <a:ea typeface="ＭＳ Ｐゴシック" pitchFamily="34" charset="-128"/>
-              </a:rPr>
-              <a:t>change chart type</a:t>
-            </a:r>
-            <a:r>
-              <a:rPr lang="en-ZA" altLang="en-US">
-                <a:ea typeface="ＭＳ Ｐゴシック" pitchFamily="34" charset="-128"/>
-              </a:rPr>
-              <a:t>”</a:t>
-            </a:r>
-            <a:endParaRPr lang="en-ZA" altLang="ja-JP">
-              <a:ea typeface="ＭＳ Ｐゴシック" pitchFamily="34" charset="-128"/>
-            </a:endParaRPr>
-          </a:p>
-          <a:p>
-            <a:pPr lvl="1" eaLnBrk="1" hangingPunct="1"/>
-            <a:r>
-              <a:rPr lang="en-ZA">
-                <a:ea typeface="ＭＳ Ｐゴシック" pitchFamily="34" charset="-128"/>
-              </a:rPr>
-              <a:t>Select </a:t>
-            </a:r>
-            <a:r>
-              <a:rPr lang="en-ZA" altLang="en-US">
-                <a:ea typeface="ＭＳ Ｐゴシック" pitchFamily="34" charset="-128"/>
-              </a:rPr>
-              <a:t>“</a:t>
-            </a:r>
-            <a:r>
-              <a:rPr lang="en-ZA">
-                <a:ea typeface="ＭＳ Ｐゴシック" pitchFamily="34" charset="-128"/>
-              </a:rPr>
-              <a:t>templates</a:t>
-            </a:r>
-            <a:r>
-              <a:rPr lang="en-ZA" altLang="en-US">
-                <a:ea typeface="ＭＳ Ｐゴシック" pitchFamily="34" charset="-128"/>
-              </a:rPr>
-              <a:t>”</a:t>
-            </a:r>
-            <a:r>
-              <a:rPr lang="en-ZA">
-                <a:ea typeface="ＭＳ Ｐゴシック" pitchFamily="34" charset="-128"/>
-              </a:rPr>
-              <a:t> and click on your saved template</a:t>
-            </a:r>
-          </a:p>
-          <a:p>
-            <a:pPr lvl="1" eaLnBrk="1" hangingPunct="1"/>
-            <a:endParaRPr lang="en-ZA">
-              <a:ea typeface="ＭＳ Ｐゴシック" pitchFamily="34" charset="-128"/>
-            </a:endParaRPr>
-          </a:p>
-        </p:txBody>
-      </p:sp>
-    </p:spTree>
-  </p:cSld>
-  <p:clrMapOvr>
-    <a:masterClrMapping/>
-  </p:clrMapOvr>
-</p:sld>
-</file>
-
 <file path=ppt/slides/slide23.xml><?xml version="1.0" encoding="utf-8"?>
 <p:sld xmlns:a="http://schemas.openxmlformats.org/drawingml/2006/main" xmlns:r="http://schemas.openxmlformats.org/officeDocument/2006/relationships" xmlns:p="http://schemas.openxmlformats.org/presentationml/2006/main">
   <p:cSld>
@@ -17612,29 +17275,7 @@
       </p:grpSpPr>
       <p:sp>
         <p:nvSpPr>
-          <p:cNvPr id="41987" name="Text Placeholder 3"/>
-          <p:cNvSpPr>
-            <a:spLocks noGrp="1"/>
-          </p:cNvSpPr>
-          <p:nvPr>
-            <p:ph type="body" sz="quarter" idx="12"/>
-          </p:nvPr>
-        </p:nvSpPr>
-        <p:spPr/>
-        <p:txBody>
-          <a:bodyPr/>
-          <a:lstStyle/>
-          <a:p>
-            <a:pPr marL="0" indent="0" eaLnBrk="1" hangingPunct="1"/>
-            <a:endParaRPr lang="en-ZA">
-              <a:ea typeface="ＭＳ Ｐゴシック" pitchFamily="34" charset="-128"/>
-            </a:endParaRPr>
-          </a:p>
-        </p:txBody>
-      </p:sp>
-      <p:sp>
-        <p:nvSpPr>
-          <p:cNvPr id="41988" name="Title 1"/>
+          <p:cNvPr id="40962" name="Title 3"/>
           <p:cNvSpPr>
             <a:spLocks noGrp="1"/>
           </p:cNvSpPr>
@@ -17652,7 +17293,74 @@
               <a:rPr lang="en-ZA">
                 <a:ea typeface="ＭＳ Ｐゴシック" pitchFamily="34" charset="-128"/>
               </a:rPr>
-              <a:t>Click on graph icon and add data</a:t>
+              <a:t>To set graph as default for new graphs:</a:t>
+            </a:r>
+          </a:p>
+        </p:txBody>
+      </p:sp>
+      <p:sp>
+        <p:nvSpPr>
+          <p:cNvPr id="40963" name="Content Placeholder 4"/>
+          <p:cNvSpPr>
+            <a:spLocks noGrp="1"/>
+          </p:cNvSpPr>
+          <p:nvPr>
+            <p:ph idx="1"/>
+          </p:nvPr>
+        </p:nvSpPr>
+        <p:spPr/>
+        <p:txBody>
+          <a:bodyPr/>
+          <a:lstStyle/>
+          <a:p>
+            <a:pPr lvl="1" eaLnBrk="1" hangingPunct="1"/>
+            <a:r>
+              <a:rPr lang="en-ZA">
+                <a:ea typeface="ＭＳ Ｐゴシック" pitchFamily="34" charset="-128"/>
+              </a:rPr>
+              <a:t>Select example graph on following page</a:t>
+            </a:r>
+          </a:p>
+          <a:p>
+            <a:pPr lvl="1" eaLnBrk="1" hangingPunct="1"/>
+            <a:r>
+              <a:rPr lang="en-ZA">
+                <a:ea typeface="ＭＳ Ｐゴシック" pitchFamily="34" charset="-128"/>
+              </a:rPr>
+              <a:t>Click on </a:t>
+            </a:r>
+            <a:r>
+              <a:rPr lang="en-ZA">
+                <a:solidFill>
+                  <a:schemeClr val="accent1"/>
+                </a:solidFill>
+                <a:ea typeface="ＭＳ Ｐゴシック" pitchFamily="34" charset="-128"/>
+              </a:rPr>
+              <a:t>chart tools&gt;design </a:t>
+            </a:r>
+            <a:r>
+              <a:rPr lang="en-ZA">
+                <a:ea typeface="ＭＳ Ｐゴシック" pitchFamily="34" charset="-128"/>
+              </a:rPr>
+              <a:t>tab and select </a:t>
+            </a:r>
+            <a:r>
+              <a:rPr lang="en-ZA" altLang="en-US">
+                <a:ea typeface="ＭＳ Ｐゴシック" pitchFamily="34" charset="-128"/>
+              </a:rPr>
+              <a:t>“</a:t>
+            </a:r>
+            <a:r>
+              <a:rPr lang="en-ZA">
+                <a:ea typeface="ＭＳ Ｐゴシック" pitchFamily="34" charset="-128"/>
+              </a:rPr>
+              <a:t>save as template</a:t>
+            </a:r>
+            <a:r>
+              <a:rPr lang="en-ZA" altLang="en-US">
+                <a:ea typeface="ＭＳ Ｐゴシック" pitchFamily="34" charset="-128"/>
+              </a:rPr>
+              <a:t>”</a:t>
             </a:r>
             <a:br>
               <a:rPr lang="en-ZA">
@@ -17663,36 +17371,112 @@
               <a:rPr lang="en-ZA">
                 <a:ea typeface="ＭＳ Ｐゴシック" pitchFamily="34" charset="-128"/>
               </a:rPr>
-              <a:t>Please see instruction on previous page</a:t>
-            </a:r>
-          </a:p>
-        </p:txBody>
-      </p:sp>
-      <p:sp>
-        <p:nvSpPr>
-          <p:cNvPr id="41989" name="Chart Placeholder 2"/>
-          <p:cNvSpPr>
-            <a:spLocks noGrp="1" noTextEdit="1"/>
-          </p:cNvSpPr>
-          <p:nvPr>
-            <p:ph type="chart" sz="quarter" idx="11"/>
-          </p:nvPr>
-        </p:nvSpPr>
-        <p:spPr>
-          <a:ln w="9525"/>
-          <a:extLst>
-            <a:ext uri="{91240B29-F687-4F45-9708-019B960494DF}">
-              <a14:hiddenLine xmlns:a14="http://schemas.microsoft.com/office/drawing/2010/main" w="25400" cap="flat">
-                <a:solidFill>
-                  <a:srgbClr val="000000"/>
-                </a:solidFill>
-                <a:round/>
-                <a:headEnd/>
-                <a:tailEnd/>
-              </a14:hiddenLine>
-            </a:ext>
-          </a:extLst>
-        </p:spPr>
+              <a:t>Choose a name for your default</a:t>
+            </a:r>
+          </a:p>
+          <a:p>
+            <a:pPr lvl="1" eaLnBrk="1" hangingPunct="1"/>
+            <a:r>
+              <a:rPr lang="en-ZA">
+                <a:ea typeface="ＭＳ Ｐゴシック" pitchFamily="34" charset="-128"/>
+              </a:rPr>
+              <a:t>On next page, click on the graph icon</a:t>
+            </a:r>
+          </a:p>
+          <a:p>
+            <a:pPr lvl="1" eaLnBrk="1" hangingPunct="1"/>
+            <a:r>
+              <a:rPr lang="en-ZA">
+                <a:ea typeface="ＭＳ Ｐゴシック" pitchFamily="34" charset="-128"/>
+              </a:rPr>
+              <a:t>Add your data</a:t>
+            </a:r>
+          </a:p>
+          <a:p>
+            <a:pPr lvl="1" eaLnBrk="1" hangingPunct="1"/>
+            <a:r>
+              <a:rPr lang="en-ZA">
+                <a:ea typeface="ＭＳ Ｐゴシック" pitchFamily="34" charset="-128"/>
+              </a:rPr>
+              <a:t>Select the graph and click on </a:t>
+            </a:r>
+            <a:r>
+              <a:rPr lang="en-ZA">
+                <a:solidFill>
+                  <a:schemeClr val="accent1"/>
+                </a:solidFill>
+                <a:ea typeface="ＭＳ Ｐゴシック" pitchFamily="34" charset="-128"/>
+              </a:rPr>
+              <a:t>chart tools&gt;design </a:t>
+            </a:r>
+            <a:r>
+              <a:rPr lang="en-ZA">
+                <a:ea typeface="ＭＳ Ｐゴシック" pitchFamily="34" charset="-128"/>
+              </a:rPr>
+              <a:t>tab, then select </a:t>
+            </a:r>
+            <a:r>
+              <a:rPr lang="en-ZA" altLang="en-US">
+                <a:ea typeface="ＭＳ Ｐゴシック" pitchFamily="34" charset="-128"/>
+              </a:rPr>
+              <a:t>“</a:t>
+            </a:r>
+            <a:r>
+              <a:rPr lang="en-ZA" altLang="ja-JP">
+                <a:ea typeface="ＭＳ Ｐゴシック" pitchFamily="34" charset="-128"/>
+              </a:rPr>
+              <a:t>change chart type</a:t>
+            </a:r>
+            <a:r>
+              <a:rPr lang="en-ZA" altLang="en-US">
+                <a:ea typeface="ＭＳ Ｐゴシック" pitchFamily="34" charset="-128"/>
+              </a:rPr>
+              <a:t>”</a:t>
+            </a:r>
+            <a:endParaRPr lang="en-ZA" altLang="ja-JP">
+              <a:ea typeface="ＭＳ Ｐゴシック" pitchFamily="34" charset="-128"/>
+            </a:endParaRPr>
+          </a:p>
+          <a:p>
+            <a:pPr lvl="1" eaLnBrk="1" hangingPunct="1"/>
+            <a:r>
+              <a:rPr lang="en-ZA">
+                <a:ea typeface="ＭＳ Ｐゴシック" pitchFamily="34" charset="-128"/>
+              </a:rPr>
+              <a:t>Select </a:t>
+            </a:r>
+            <a:r>
+              <a:rPr lang="en-ZA" altLang="en-US">
+                <a:ea typeface="ＭＳ Ｐゴシック" pitchFamily="34" charset="-128"/>
+              </a:rPr>
+              <a:t>“</a:t>
+            </a:r>
+            <a:r>
+              <a:rPr lang="en-ZA">
+                <a:ea typeface="ＭＳ Ｐゴシック" pitchFamily="34" charset="-128"/>
+              </a:rPr>
+              <a:t>templates</a:t>
+            </a:r>
+            <a:r>
+              <a:rPr lang="en-ZA" altLang="en-US">
+                <a:ea typeface="ＭＳ Ｐゴシック" pitchFamily="34" charset="-128"/>
+              </a:rPr>
+              <a:t>”</a:t>
+            </a:r>
+            <a:r>
+              <a:rPr lang="en-ZA">
+                <a:ea typeface="ＭＳ Ｐゴシック" pitchFamily="34" charset="-128"/>
+              </a:rPr>
+              <a:t> and click on your saved template</a:t>
+            </a:r>
+          </a:p>
+          <a:p>
+            <a:pPr lvl="1" eaLnBrk="1" hangingPunct="1"/>
+            <a:endParaRPr lang="en-ZA">
+              <a:ea typeface="ＭＳ Ｐゴシック" pitchFamily="34" charset="-128"/>
+            </a:endParaRPr>
+          </a:p>
+        </p:txBody>
       </p:sp>
     </p:spTree>
   </p:cSld>
@@ -17721,7 +17505,7 @@
       </p:grpSpPr>
       <p:sp>
         <p:nvSpPr>
-          <p:cNvPr id="43010" name="Text Placeholder 2"/>
+          <p:cNvPr id="41987" name="Text Placeholder 3"/>
           <p:cNvSpPr>
             <a:spLocks noGrp="1"/>
           </p:cNvSpPr>
@@ -17743,7 +17527,7 @@
       </p:sp>
       <p:sp>
         <p:nvSpPr>
-          <p:cNvPr id="43011" name="Title 1"/>
+          <p:cNvPr id="41988" name="Title 1"/>
           <p:cNvSpPr>
             <a:spLocks noGrp="1"/>
           </p:cNvSpPr>
@@ -17761,96 +17545,48 @@
               <a:rPr lang="en-ZA">
                 <a:ea typeface="ＭＳ Ｐゴシック" pitchFamily="34" charset="-128"/>
               </a:rPr>
-              <a:t>Example of pie chart: 2 colours only</a:t>
-            </a:r>
-          </a:p>
-        </p:txBody>
-      </p:sp>
-      <p:graphicFrame>
-        <p:nvGraphicFramePr>
-          <p:cNvPr id="43012" name="Chart Placeholder 3"/>
-          <p:cNvGraphicFramePr>
-            <a:graphicFrameLocks noGrp="1"/>
-          </p:cNvGraphicFramePr>
+              <a:t>Click on graph icon and add data</a:t>
+            </a:r>
+            <a:br>
+              <a:rPr lang="en-ZA">
+                <a:ea typeface="ＭＳ Ｐゴシック" pitchFamily="34" charset="-128"/>
+              </a:rPr>
+            </a:br>
+            <a:r>
+              <a:rPr lang="en-ZA">
+                <a:ea typeface="ＭＳ Ｐゴシック" pitchFamily="34" charset="-128"/>
+              </a:rPr>
+              <a:t>Please see instruction on previous page</a:t>
+            </a:r>
+          </a:p>
+        </p:txBody>
+      </p:sp>
+      <p:sp>
+        <p:nvSpPr>
+          <p:cNvPr id="41989" name="Chart Placeholder 2"/>
+          <p:cNvSpPr>
+            <a:spLocks noGrp="1" noTextEdit="1"/>
+          </p:cNvSpPr>
           <p:nvPr>
             <p:ph type="chart" sz="quarter" idx="11"/>
           </p:nvPr>
-        </p:nvGraphicFramePr>
-        <p:xfrm>
-          <a:off x="639763" y="1673225"/>
-          <a:ext cx="7866062" cy="4579938"/>
-        </p:xfrm>
-        <a:graphic>
-          <a:graphicData uri="http://schemas.openxmlformats.org/presentationml/2006/ole">
-            <mc:AlternateContent xmlns:mc="http://schemas.openxmlformats.org/markup-compatibility/2006">
-              <mc:Choice xmlns:v="urn:schemas-microsoft-com:vml" Requires="v">
-                <p:oleObj spid="_x0000_s43034" r:id="rId3" imgW="8039959" imgH="4681341" progId="Excel.Chart.8">
-                  <p:embed/>
-                </p:oleObj>
-              </mc:Choice>
-              <mc:Fallback>
-                <p:oleObj r:id="rId3" imgW="8039959" imgH="4681341" progId="Excel.Chart.8">
-                  <p:embed/>
-                  <p:pic>
-                    <p:nvPicPr>
-                      <p:cNvPr id="0" name="Chart Placeholder 3"/>
-                      <p:cNvPicPr>
-                        <a:picLocks noGrp="1" noChangeArrowheads="1"/>
-                      </p:cNvPicPr>
-                      <p:nvPr/>
-                    </p:nvPicPr>
-                    <p:blipFill>
-                      <a:blip r:embed="rId4">
-                        <a:extLst>
-                          <a:ext uri="{28A0092B-C50C-407E-A947-70E740481C1C}">
-                            <a14:useLocalDpi xmlns:a14="http://schemas.microsoft.com/office/drawing/2010/main" val="0"/>
-                          </a:ext>
-                        </a:extLst>
-                      </a:blip>
-                      <a:srcRect/>
-                      <a:stretch>
-                        <a:fillRect/>
-                      </a:stretch>
-                    </p:blipFill>
-                    <p:spPr bwMode="auto">
-                      <a:xfrm>
-                        <a:off x="639763" y="1673225"/>
-                        <a:ext cx="7866062" cy="4579938"/>
-                      </a:xfrm>
-                      <a:prstGeom prst="rect">
-                        <a:avLst/>
-                      </a:prstGeom>
-                      <a:noFill/>
-                      <a:ln>
-                        <a:noFill/>
-                      </a:ln>
-                      <a:extLst>
-                        <a:ext uri="{909E8E84-426E-40DD-AFC4-6F175D3DCCD1}">
-                          <a14:hiddenFill xmlns:a14="http://schemas.microsoft.com/office/drawing/2010/main">
-                            <a:solidFill>
-                              <a:srgbClr val="FFFFFF"/>
-                            </a:solidFill>
-                          </a14:hiddenFill>
-                        </a:ext>
-                        <a:ext uri="{91240B29-F687-4F45-9708-019B960494DF}">
-                          <a14:hiddenLine xmlns:a14="http://schemas.microsoft.com/office/drawing/2010/main" w="9525">
-                            <a:solidFill>
-                              <a:srgbClr val="000000"/>
-                            </a:solidFill>
-                            <a:miter lim="800000"/>
-                            <a:headEnd/>
-                            <a:tailEnd/>
-                          </a14:hiddenLine>
-                        </a:ext>
-                      </a:extLst>
-                    </p:spPr>
-                  </p:pic>
-                </p:oleObj>
-              </mc:Fallback>
-            </mc:AlternateContent>
-          </a:graphicData>
-        </a:graphic>
-      </p:graphicFrame>
+        </p:nvSpPr>
+        <p:spPr>
+          <a:ln w="9525"/>
+          <a:extLst>
+            <a:ext uri="{91240B29-F687-4F45-9708-019B960494DF}">
+              <a14:hiddenLine xmlns:a14="http://schemas.microsoft.com/office/drawing/2010/main" w="25400" cap="flat">
+                <a:solidFill>
+                  <a:srgbClr val="000000"/>
+                </a:solidFill>
+                <a:round/>
+                <a:headEnd/>
+                <a:tailEnd/>
+              </a14:hiddenLine>
+            </a:ext>
+          </a:extLst>
+        </p:spPr>
+      </p:sp>
     </p:spTree>
   </p:cSld>
   <p:clrMapOvr>
@@ -17878,7 +17614,7 @@
       </p:grpSpPr>
       <p:sp>
         <p:nvSpPr>
-          <p:cNvPr id="44034" name="Text Placeholder 2"/>
+          <p:cNvPr id="43010" name="Text Placeholder 2"/>
           <p:cNvSpPr>
             <a:spLocks noGrp="1"/>
           </p:cNvSpPr>
@@ -17900,7 +17636,7 @@
       </p:sp>
       <p:sp>
         <p:nvSpPr>
-          <p:cNvPr id="44035" name="Title 1"/>
+          <p:cNvPr id="43011" name="Title 1"/>
           <p:cNvSpPr>
             <a:spLocks noGrp="1"/>
           </p:cNvSpPr>
@@ -17918,14 +17654,14 @@
               <a:rPr lang="en-ZA">
                 <a:ea typeface="ＭＳ Ｐゴシック" pitchFamily="34" charset="-128"/>
               </a:rPr>
-              <a:t>Example of pie chart</a:t>
+              <a:t>Example of pie chart: 2 colours only</a:t>
             </a:r>
           </a:p>
         </p:txBody>
       </p:sp>
       <p:graphicFrame>
         <p:nvGraphicFramePr>
-          <p:cNvPr id="44036" name="Chart Placeholder 3"/>
+          <p:cNvPr id="43012" name="Chart Placeholder 3"/>
           <p:cNvGraphicFramePr>
             <a:graphicFrameLocks noGrp="1"/>
           </p:cNvGraphicFramePr>
@@ -17941,7 +17677,7 @@
           <a:graphicData uri="http://schemas.openxmlformats.org/presentationml/2006/ole">
             <mc:AlternateContent xmlns:mc="http://schemas.openxmlformats.org/markup-compatibility/2006">
               <mc:Choice xmlns:v="urn:schemas-microsoft-com:vml" Requires="v">
-                <p:oleObj spid="_x0000_s44058" r:id="rId3" imgW="8039959" imgH="4681341" progId="Excel.Chart.8">
+                <p:oleObj spid="_x0000_s43038" r:id="rId3" imgW="8039959" imgH="4681341" progId="Excel.Chart.8">
                   <p:embed/>
                 </p:oleObj>
               </mc:Choice>
@@ -18035,7 +17771,7 @@
       </p:grpSpPr>
       <p:sp>
         <p:nvSpPr>
-          <p:cNvPr id="45058" name="Text Placeholder 2"/>
+          <p:cNvPr id="44034" name="Text Placeholder 2"/>
           <p:cNvSpPr>
             <a:spLocks noGrp="1"/>
           </p:cNvSpPr>
@@ -18057,7 +17793,7 @@
       </p:sp>
       <p:sp>
         <p:nvSpPr>
-          <p:cNvPr id="45059" name="Title 1"/>
+          <p:cNvPr id="44035" name="Title 1"/>
           <p:cNvSpPr>
             <a:spLocks noGrp="1"/>
           </p:cNvSpPr>
@@ -18082,7 +17818,7 @@
       </p:sp>
       <p:graphicFrame>
         <p:nvGraphicFramePr>
-          <p:cNvPr id="45060" name="Chart Placeholder 3"/>
+          <p:cNvPr id="44036" name="Chart Placeholder 3"/>
           <p:cNvGraphicFramePr>
             <a:graphicFrameLocks noGrp="1"/>
           </p:cNvGraphicFramePr>
@@ -18098,7 +17834,7 @@
           <a:graphicData uri="http://schemas.openxmlformats.org/presentationml/2006/ole">
             <mc:AlternateContent xmlns:mc="http://schemas.openxmlformats.org/markup-compatibility/2006">
               <mc:Choice xmlns:v="urn:schemas-microsoft-com:vml" Requires="v">
-                <p:oleObj spid="_x0000_s45082" r:id="rId3" imgW="8039959" imgH="4681341" progId="Excel.Chart.8">
+                <p:oleObj spid="_x0000_s44062" r:id="rId3" imgW="8039959" imgH="4681341" progId="Excel.Chart.8">
                   <p:embed/>
                 </p:oleObj>
               </mc:Choice>
@@ -18174,6 +17910,163 @@
 </file>
 
 <file path=ppt/slides/slide27.xml><?xml version="1.0" encoding="utf-8"?>
+<p:sld xmlns:a="http://schemas.openxmlformats.org/drawingml/2006/main" xmlns:r="http://schemas.openxmlformats.org/officeDocument/2006/relationships" xmlns:p="http://schemas.openxmlformats.org/presentationml/2006/main">
+  <p:cSld>
+    <p:spTree>
+      <p:nvGrpSpPr>
+        <p:cNvPr id="1" name=""/>
+        <p:cNvGrpSpPr/>
+        <p:nvPr/>
+      </p:nvGrpSpPr>
+      <p:grpSpPr>
+        <a:xfrm>
+          <a:off x="0" y="0"/>
+          <a:ext cx="0" cy="0"/>
+          <a:chOff x="0" y="0"/>
+          <a:chExt cx="0" cy="0"/>
+        </a:xfrm>
+      </p:grpSpPr>
+      <p:sp>
+        <p:nvSpPr>
+          <p:cNvPr id="45058" name="Text Placeholder 2"/>
+          <p:cNvSpPr>
+            <a:spLocks noGrp="1"/>
+          </p:cNvSpPr>
+          <p:nvPr>
+            <p:ph type="body" sz="quarter" idx="12"/>
+          </p:nvPr>
+        </p:nvSpPr>
+        <p:spPr/>
+        <p:txBody>
+          <a:bodyPr/>
+          <a:lstStyle/>
+          <a:p>
+            <a:pPr marL="0" indent="0" eaLnBrk="1" hangingPunct="1"/>
+            <a:endParaRPr lang="en-ZA">
+              <a:ea typeface="ＭＳ Ｐゴシック" pitchFamily="34" charset="-128"/>
+            </a:endParaRPr>
+          </a:p>
+        </p:txBody>
+      </p:sp>
+      <p:sp>
+        <p:nvSpPr>
+          <p:cNvPr id="45059" name="Title 1"/>
+          <p:cNvSpPr>
+            <a:spLocks noGrp="1"/>
+          </p:cNvSpPr>
+          <p:nvPr>
+            <p:ph type="title"/>
+          </p:nvPr>
+        </p:nvSpPr>
+        <p:spPr/>
+        <p:txBody>
+          <a:bodyPr/>
+          <a:lstStyle/>
+          <a:p>
+            <a:pPr eaLnBrk="1" hangingPunct="1"/>
+            <a:r>
+              <a:rPr lang="en-ZA">
+                <a:ea typeface="ＭＳ Ｐゴシック" pitchFamily="34" charset="-128"/>
+              </a:rPr>
+              <a:t>Example of pie chart</a:t>
+            </a:r>
+          </a:p>
+        </p:txBody>
+      </p:sp>
+      <p:graphicFrame>
+        <p:nvGraphicFramePr>
+          <p:cNvPr id="45060" name="Chart Placeholder 3"/>
+          <p:cNvGraphicFramePr>
+            <a:graphicFrameLocks noGrp="1"/>
+          </p:cNvGraphicFramePr>
+          <p:nvPr>
+            <p:ph type="chart" sz="quarter" idx="11"/>
+          </p:nvPr>
+        </p:nvGraphicFramePr>
+        <p:xfrm>
+          <a:off x="639763" y="1673225"/>
+          <a:ext cx="7866062" cy="4579938"/>
+        </p:xfrm>
+        <a:graphic>
+          <a:graphicData uri="http://schemas.openxmlformats.org/presentationml/2006/ole">
+            <mc:AlternateContent xmlns:mc="http://schemas.openxmlformats.org/markup-compatibility/2006">
+              <mc:Choice xmlns:v="urn:schemas-microsoft-com:vml" Requires="v">
+                <p:oleObj spid="_x0000_s45086" r:id="rId3" imgW="8039959" imgH="4681341" progId="Excel.Chart.8">
+                  <p:embed/>
+                </p:oleObj>
+              </mc:Choice>
+              <mc:Fallback>
+                <p:oleObj r:id="rId3" imgW="8039959" imgH="4681341" progId="Excel.Chart.8">
+                  <p:embed/>
+                  <p:pic>
+                    <p:nvPicPr>
+                      <p:cNvPr id="0" name="Chart Placeholder 3"/>
+                      <p:cNvPicPr>
+                        <a:picLocks noGrp="1" noChangeArrowheads="1"/>
+                      </p:cNvPicPr>
+                      <p:nvPr/>
+                    </p:nvPicPr>
+                    <p:blipFill>
+                      <a:blip r:embed="rId4">
+                        <a:extLst>
+                          <a:ext uri="{28A0092B-C50C-407E-A947-70E740481C1C}">
+                            <a14:useLocalDpi xmlns:a14="http://schemas.microsoft.com/office/drawing/2010/main" val="0"/>
+                          </a:ext>
+                        </a:extLst>
+                      </a:blip>
+                      <a:srcRect/>
+                      <a:stretch>
+                        <a:fillRect/>
+                      </a:stretch>
+                    </p:blipFill>
+                    <p:spPr bwMode="auto">
+                      <a:xfrm>
+                        <a:off x="639763" y="1673225"/>
+                        <a:ext cx="7866062" cy="4579938"/>
+                      </a:xfrm>
+                      <a:prstGeom prst="rect">
+                        <a:avLst/>
+                      </a:prstGeom>
+                      <a:noFill/>
+                      <a:ln>
+                        <a:noFill/>
+                      </a:ln>
+                      <a:extLst>
+                        <a:ext uri="{909E8E84-426E-40DD-AFC4-6F175D3DCCD1}">
+                          <a14:hiddenFill xmlns:a14="http://schemas.microsoft.com/office/drawing/2010/main">
+                            <a:solidFill>
+                              <a:srgbClr val="FFFFFF"/>
+                            </a:solidFill>
+                          </a14:hiddenFill>
+                        </a:ext>
+                        <a:ext uri="{91240B29-F687-4F45-9708-019B960494DF}">
+                          <a14:hiddenLine xmlns:a14="http://schemas.microsoft.com/office/drawing/2010/main" w="9525">
+                            <a:solidFill>
+                              <a:srgbClr val="000000"/>
+                            </a:solidFill>
+                            <a:miter lim="800000"/>
+                            <a:headEnd/>
+                            <a:tailEnd/>
+                          </a14:hiddenLine>
+                        </a:ext>
+                      </a:extLst>
+                    </p:spPr>
+                  </p:pic>
+                </p:oleObj>
+              </mc:Fallback>
+            </mc:AlternateContent>
+          </a:graphicData>
+        </a:graphic>
+      </p:graphicFrame>
+    </p:spTree>
+  </p:cSld>
+  <p:clrMapOvr>
+    <a:masterClrMapping/>
+  </p:clrMapOvr>
+</p:sld>
+</file>
+
+<file path=ppt/slides/slide28.xml><?xml version="1.0" encoding="utf-8"?>
 <p:sld xmlns:a="http://schemas.openxmlformats.org/drawingml/2006/main" xmlns:r="http://schemas.openxmlformats.org/officeDocument/2006/relationships" xmlns:p="http://schemas.openxmlformats.org/presentationml/2006/main">
   <p:cSld>
     <p:spTree>
@@ -18906,7 +18799,7 @@
 </p:sld>
 </file>
 
-<file path=ppt/slides/slide28.xml><?xml version="1.0" encoding="utf-8"?>
+<file path=ppt/slides/slide29.xml><?xml version="1.0" encoding="utf-8"?>
 <p:sld xmlns:a="http://schemas.openxmlformats.org/drawingml/2006/main" xmlns:r="http://schemas.openxmlformats.org/officeDocument/2006/relationships" xmlns:p="http://schemas.openxmlformats.org/presentationml/2006/main">
   <p:cSld>
     <p:spTree>
@@ -19059,7 +18952,132 @@
 </p:sld>
 </file>
 
-<file path=ppt/slides/slide29.xml><?xml version="1.0" encoding="utf-8"?>
+<file path=ppt/slides/slide3.xml><?xml version="1.0" encoding="utf-8"?>
+<p:sld xmlns:a="http://schemas.openxmlformats.org/drawingml/2006/main" xmlns:r="http://schemas.openxmlformats.org/officeDocument/2006/relationships" xmlns:p="http://schemas.openxmlformats.org/presentationml/2006/main">
+  <p:cSld>
+    <p:spTree>
+      <p:nvGrpSpPr>
+        <p:cNvPr id="1" name=""/>
+        <p:cNvGrpSpPr/>
+        <p:nvPr/>
+      </p:nvGrpSpPr>
+      <p:grpSpPr>
+        <a:xfrm>
+          <a:off x="0" y="0"/>
+          <a:ext cx="0" cy="0"/>
+          <a:chOff x="0" y="0"/>
+          <a:chExt cx="0" cy="0"/>
+        </a:xfrm>
+      </p:grpSpPr>
+      <p:sp>
+        <p:nvSpPr>
+          <p:cNvPr id="2" name="Title 1"/>
+          <p:cNvSpPr>
+            <a:spLocks noGrp="1"/>
+          </p:cNvSpPr>
+          <p:nvPr>
+            <p:ph type="title"/>
+          </p:nvPr>
+        </p:nvSpPr>
+        <p:spPr/>
+        <p:txBody>
+          <a:bodyPr/>
+          <a:lstStyle/>
+          <a:p>
+            <a:r>
+              <a:rPr lang="en-US" dirty="0"/>
+              <a:t>What</a:t>
+            </a:r>
+          </a:p>
+        </p:txBody>
+      </p:sp>
+      <p:sp>
+        <p:nvSpPr>
+          <p:cNvPr id="3" name="Content Placeholder 2"/>
+          <p:cNvSpPr>
+            <a:spLocks noGrp="1"/>
+          </p:cNvSpPr>
+          <p:nvPr>
+            <p:ph idx="1"/>
+          </p:nvPr>
+        </p:nvSpPr>
+        <p:spPr/>
+        <p:txBody>
+          <a:bodyPr/>
+          <a:lstStyle/>
+          <a:p>
+            <a:pPr>
+              <a:lnSpc>
+                <a:spcPct val="150000"/>
+              </a:lnSpc>
+            </a:pPr>
+            <a:r>
+              <a:rPr lang="en-US" sz="1800" dirty="0"/>
+              <a:t>What is PowerShell?</a:t>
+            </a:r>
+          </a:p>
+          <a:p>
+            <a:pPr lvl="1">
+              <a:lnSpc>
+                <a:spcPct val="150000"/>
+              </a:lnSpc>
+              <a:buFont typeface="Arial" panose="020B0604020202020204" pitchFamily="34" charset="0"/>
+              <a:buChar char="•"/>
+            </a:pPr>
+            <a:r>
+              <a:rPr lang="en-US" sz="1800" dirty="0"/>
+              <a:t>An object oriented scripting and shell language.</a:t>
+            </a:r>
+          </a:p>
+          <a:p>
+            <a:pPr lvl="1">
+              <a:lnSpc>
+                <a:spcPct val="150000"/>
+              </a:lnSpc>
+              <a:buFont typeface="Arial" panose="020B0604020202020204" pitchFamily="34" charset="0"/>
+              <a:buChar char="•"/>
+            </a:pPr>
+            <a:r>
+              <a:rPr lang="en-US" sz="1800" dirty="0"/>
+              <a:t>Designed for task automation and configuration management.</a:t>
+            </a:r>
+          </a:p>
+          <a:p>
+            <a:pPr lvl="1">
+              <a:lnSpc>
+                <a:spcPct val="150000"/>
+              </a:lnSpc>
+              <a:buFont typeface="Arial" panose="020B0604020202020204" pitchFamily="34" charset="0"/>
+              <a:buChar char="•"/>
+            </a:pPr>
+            <a:r>
+              <a:rPr lang="en-US" sz="1800" dirty="0"/>
+              <a:t>Based on the .NET framework where cmdlets represent small classes as system commands.</a:t>
+            </a:r>
+          </a:p>
+          <a:p>
+            <a:pPr>
+              <a:buFont typeface="Arial" panose="020B0604020202020204" pitchFamily="34" charset="0"/>
+              <a:buChar char="•"/>
+            </a:pPr>
+            <a:endParaRPr lang="en-US" dirty="0"/>
+          </a:p>
+        </p:txBody>
+      </p:sp>
+    </p:spTree>
+    <p:extLst>
+      <p:ext uri="{BB962C8B-B14F-4D97-AF65-F5344CB8AC3E}">
+        <p14:creationId xmlns:p14="http://schemas.microsoft.com/office/powerpoint/2010/main" val="867939493"/>
+      </p:ext>
+    </p:extLst>
+  </p:cSld>
+  <p:clrMapOvr>
+    <a:masterClrMapping/>
+  </p:clrMapOvr>
+</p:sld>
+</file>
+
+<file path=ppt/slides/slide30.xml><?xml version="1.0" encoding="utf-8"?>
 <p:sld xmlns:a="http://schemas.openxmlformats.org/drawingml/2006/main" xmlns:r="http://schemas.openxmlformats.org/officeDocument/2006/relationships" xmlns:p="http://schemas.openxmlformats.org/presentationml/2006/main">
   <p:cSld>
     <p:spTree>
@@ -19827,132 +19845,7 @@
 </p:sld>
 </file>
 
-<file path=ppt/slides/slide3.xml><?xml version="1.0" encoding="utf-8"?>
-<p:sld xmlns:a="http://schemas.openxmlformats.org/drawingml/2006/main" xmlns:r="http://schemas.openxmlformats.org/officeDocument/2006/relationships" xmlns:p="http://schemas.openxmlformats.org/presentationml/2006/main">
-  <p:cSld>
-    <p:spTree>
-      <p:nvGrpSpPr>
-        <p:cNvPr id="1" name=""/>
-        <p:cNvGrpSpPr/>
-        <p:nvPr/>
-      </p:nvGrpSpPr>
-      <p:grpSpPr>
-        <a:xfrm>
-          <a:off x="0" y="0"/>
-          <a:ext cx="0" cy="0"/>
-          <a:chOff x="0" y="0"/>
-          <a:chExt cx="0" cy="0"/>
-        </a:xfrm>
-      </p:grpSpPr>
-      <p:sp>
-        <p:nvSpPr>
-          <p:cNvPr id="2" name="Title 1"/>
-          <p:cNvSpPr>
-            <a:spLocks noGrp="1"/>
-          </p:cNvSpPr>
-          <p:nvPr>
-            <p:ph type="title"/>
-          </p:nvPr>
-        </p:nvSpPr>
-        <p:spPr/>
-        <p:txBody>
-          <a:bodyPr/>
-          <a:lstStyle/>
-          <a:p>
-            <a:r>
-              <a:rPr lang="en-US" dirty="0"/>
-              <a:t>What</a:t>
-            </a:r>
-          </a:p>
-        </p:txBody>
-      </p:sp>
-      <p:sp>
-        <p:nvSpPr>
-          <p:cNvPr id="3" name="Content Placeholder 2"/>
-          <p:cNvSpPr>
-            <a:spLocks noGrp="1"/>
-          </p:cNvSpPr>
-          <p:nvPr>
-            <p:ph idx="1"/>
-          </p:nvPr>
-        </p:nvSpPr>
-        <p:spPr/>
-        <p:txBody>
-          <a:bodyPr/>
-          <a:lstStyle/>
-          <a:p>
-            <a:pPr>
-              <a:lnSpc>
-                <a:spcPct val="150000"/>
-              </a:lnSpc>
-            </a:pPr>
-            <a:r>
-              <a:rPr lang="en-US" sz="1800" dirty="0"/>
-              <a:t>What is PowerShell?</a:t>
-            </a:r>
-          </a:p>
-          <a:p>
-            <a:pPr lvl="1">
-              <a:lnSpc>
-                <a:spcPct val="150000"/>
-              </a:lnSpc>
-              <a:buFont typeface="Arial" panose="020B0604020202020204" pitchFamily="34" charset="0"/>
-              <a:buChar char="•"/>
-            </a:pPr>
-            <a:r>
-              <a:rPr lang="en-US" sz="1800" dirty="0"/>
-              <a:t>An object oriented scripting and shell language.</a:t>
-            </a:r>
-          </a:p>
-          <a:p>
-            <a:pPr lvl="1">
-              <a:lnSpc>
-                <a:spcPct val="150000"/>
-              </a:lnSpc>
-              <a:buFont typeface="Arial" panose="020B0604020202020204" pitchFamily="34" charset="0"/>
-              <a:buChar char="•"/>
-            </a:pPr>
-            <a:r>
-              <a:rPr lang="en-US" sz="1800" dirty="0"/>
-              <a:t>Designed for task automation and configuration management.</a:t>
-            </a:r>
-          </a:p>
-          <a:p>
-            <a:pPr lvl="1">
-              <a:lnSpc>
-                <a:spcPct val="150000"/>
-              </a:lnSpc>
-              <a:buFont typeface="Arial" panose="020B0604020202020204" pitchFamily="34" charset="0"/>
-              <a:buChar char="•"/>
-            </a:pPr>
-            <a:r>
-              <a:rPr lang="en-US" sz="1800" dirty="0"/>
-              <a:t>Based on the .NET framework where cmdlets represent small classes as system commands.</a:t>
-            </a:r>
-          </a:p>
-          <a:p>
-            <a:pPr>
-              <a:buFont typeface="Arial" panose="020B0604020202020204" pitchFamily="34" charset="0"/>
-              <a:buChar char="•"/>
-            </a:pPr>
-            <a:endParaRPr lang="en-US" dirty="0"/>
-          </a:p>
-        </p:txBody>
-      </p:sp>
-    </p:spTree>
-    <p:extLst>
-      <p:ext uri="{BB962C8B-B14F-4D97-AF65-F5344CB8AC3E}">
-        <p14:creationId xmlns:p14="http://schemas.microsoft.com/office/powerpoint/2010/main" val="867939493"/>
-      </p:ext>
-    </p:extLst>
-  </p:cSld>
-  <p:clrMapOvr>
-    <a:masterClrMapping/>
-  </p:clrMapOvr>
-</p:sld>
-</file>
-
-<file path=ppt/slides/slide30.xml><?xml version="1.0" encoding="utf-8"?>
+<file path=ppt/slides/slide31.xml><?xml version="1.0" encoding="utf-8"?>
 <p:sld xmlns:a="http://schemas.openxmlformats.org/drawingml/2006/main" xmlns:r="http://schemas.openxmlformats.org/officeDocument/2006/relationships" xmlns:p="http://schemas.openxmlformats.org/presentationml/2006/main">
   <p:cSld>
     <p:spTree>
@@ -20623,7 +20516,7 @@
 </p:sld>
 </file>
 
-<file path=ppt/slides/slide31.xml><?xml version="1.0" encoding="utf-8"?>
+<file path=ppt/slides/slide32.xml><?xml version="1.0" encoding="utf-8"?>
 <p:sld xmlns:a="http://schemas.openxmlformats.org/drawingml/2006/main" xmlns:r="http://schemas.openxmlformats.org/officeDocument/2006/relationships" xmlns:p="http://schemas.openxmlformats.org/presentationml/2006/main">
   <p:cSld>
     <p:spTree>
@@ -20808,7 +20701,7 @@
 </p:sld>
 </file>
 
-<file path=ppt/slides/slide32.xml><?xml version="1.0" encoding="utf-8"?>
+<file path=ppt/slides/slide33.xml><?xml version="1.0" encoding="utf-8"?>
 <p:sld xmlns:a="http://schemas.openxmlformats.org/drawingml/2006/main" xmlns:r="http://schemas.openxmlformats.org/officeDocument/2006/relationships" xmlns:p="http://schemas.openxmlformats.org/presentationml/2006/main">
   <p:cSld>
     <p:spTree>
@@ -21673,43 +21566,6 @@
 </p:sld>
 </file>
 
-<file path=ppt/slides/slide33.xml><?xml version="1.0" encoding="utf-8"?>
-<p:sld xmlns:a="http://schemas.openxmlformats.org/drawingml/2006/main" xmlns:r="http://schemas.openxmlformats.org/officeDocument/2006/relationships" xmlns:p="http://schemas.openxmlformats.org/presentationml/2006/main">
-  <p:cSld>
-    <p:spTree>
-      <p:nvGrpSpPr>
-        <p:cNvPr id="1" name=""/>
-        <p:cNvGrpSpPr/>
-        <p:nvPr/>
-      </p:nvGrpSpPr>
-      <p:grpSpPr>
-        <a:xfrm>
-          <a:off x="0" y="0"/>
-          <a:ext cx="0" cy="0"/>
-          <a:chOff x="0" y="0"/>
-          <a:chExt cx="0" cy="0"/>
-        </a:xfrm>
-      </p:grpSpPr>
-      <p:sp>
-        <p:nvSpPr>
-          <p:cNvPr id="52226" name="Picture Placeholder 1"/>
-          <p:cNvSpPr>
-            <a:spLocks noGrp="1" noTextEdit="1"/>
-          </p:cNvSpPr>
-          <p:nvPr>
-            <p:ph type="pic" sz="quarter" idx="11"/>
-          </p:nvPr>
-        </p:nvSpPr>
-        <p:spPr/>
-      </p:sp>
-    </p:spTree>
-  </p:cSld>
-  <p:clrMapOvr>
-    <a:masterClrMapping/>
-  </p:clrMapOvr>
-</p:sld>
-</file>
-
 <file path=ppt/slides/slide34.xml><?xml version="1.0" encoding="utf-8"?>
 <p:sld xmlns:a="http://schemas.openxmlformats.org/drawingml/2006/main" xmlns:r="http://schemas.openxmlformats.org/officeDocument/2006/relationships" xmlns:p="http://schemas.openxmlformats.org/presentationml/2006/main">
   <p:cSld>
@@ -21729,65 +21585,15 @@
       </p:grpSpPr>
       <p:sp>
         <p:nvSpPr>
-          <p:cNvPr id="53250" name="Picture Placeholder 5"/>
+          <p:cNvPr id="52226" name="Picture Placeholder 1"/>
           <p:cNvSpPr>
             <a:spLocks noGrp="1" noTextEdit="1"/>
           </p:cNvSpPr>
           <p:nvPr>
-            <p:ph type="pic" sz="quarter" idx="12"/>
+            <p:ph type="pic" sz="quarter" idx="11"/>
           </p:nvPr>
         </p:nvSpPr>
         <p:spPr/>
-      </p:sp>
-      <p:sp>
-        <p:nvSpPr>
-          <p:cNvPr id="53251" name="Title 8"/>
-          <p:cNvSpPr>
-            <a:spLocks noGrp="1"/>
-          </p:cNvSpPr>
-          <p:nvPr>
-            <p:ph type="ctrTitle"/>
-          </p:nvPr>
-        </p:nvSpPr>
-        <p:spPr/>
-        <p:txBody>
-          <a:bodyPr/>
-          <a:lstStyle/>
-          <a:p>
-            <a:pPr eaLnBrk="1" hangingPunct="1"/>
-            <a:r>
-              <a:rPr lang="en-ZA">
-                <a:ea typeface="ＭＳ Ｐゴシック" pitchFamily="34" charset="-128"/>
-              </a:rPr>
-              <a:t>Full page image with caption</a:t>
-            </a:r>
-          </a:p>
-        </p:txBody>
-      </p:sp>
-      <p:sp>
-        <p:nvSpPr>
-          <p:cNvPr id="53252" name="Subtitle 9"/>
-          <p:cNvSpPr>
-            <a:spLocks noGrp="1"/>
-          </p:cNvSpPr>
-          <p:nvPr>
-            <p:ph type="subTitle" idx="1"/>
-          </p:nvPr>
-        </p:nvSpPr>
-        <p:spPr/>
-        <p:txBody>
-          <a:bodyPr/>
-          <a:lstStyle/>
-          <a:p>
-            <a:pPr eaLnBrk="1" hangingPunct="1"/>
-            <a:r>
-              <a:rPr lang="en-ZA">
-                <a:ea typeface="ＭＳ Ｐゴシック" pitchFamily="34" charset="-128"/>
-              </a:rPr>
-              <a:t>Click on icon to add picture – example on following page</a:t>
-            </a:r>
-          </a:p>
-        </p:txBody>
       </p:sp>
     </p:spTree>
   </p:cSld>
@@ -21798,6 +21604,93 @@
 </file>
 
 <file path=ppt/slides/slide35.xml><?xml version="1.0" encoding="utf-8"?>
+<p:sld xmlns:a="http://schemas.openxmlformats.org/drawingml/2006/main" xmlns:r="http://schemas.openxmlformats.org/officeDocument/2006/relationships" xmlns:p="http://schemas.openxmlformats.org/presentationml/2006/main">
+  <p:cSld>
+    <p:spTree>
+      <p:nvGrpSpPr>
+        <p:cNvPr id="1" name=""/>
+        <p:cNvGrpSpPr/>
+        <p:nvPr/>
+      </p:nvGrpSpPr>
+      <p:grpSpPr>
+        <a:xfrm>
+          <a:off x="0" y="0"/>
+          <a:ext cx="0" cy="0"/>
+          <a:chOff x="0" y="0"/>
+          <a:chExt cx="0" cy="0"/>
+        </a:xfrm>
+      </p:grpSpPr>
+      <p:sp>
+        <p:nvSpPr>
+          <p:cNvPr id="53250" name="Picture Placeholder 5"/>
+          <p:cNvSpPr>
+            <a:spLocks noGrp="1" noTextEdit="1"/>
+          </p:cNvSpPr>
+          <p:nvPr>
+            <p:ph type="pic" sz="quarter" idx="12"/>
+          </p:nvPr>
+        </p:nvSpPr>
+        <p:spPr/>
+      </p:sp>
+      <p:sp>
+        <p:nvSpPr>
+          <p:cNvPr id="53251" name="Title 8"/>
+          <p:cNvSpPr>
+            <a:spLocks noGrp="1"/>
+          </p:cNvSpPr>
+          <p:nvPr>
+            <p:ph type="ctrTitle"/>
+          </p:nvPr>
+        </p:nvSpPr>
+        <p:spPr/>
+        <p:txBody>
+          <a:bodyPr/>
+          <a:lstStyle/>
+          <a:p>
+            <a:pPr eaLnBrk="1" hangingPunct="1"/>
+            <a:r>
+              <a:rPr lang="en-ZA">
+                <a:ea typeface="ＭＳ Ｐゴシック" pitchFamily="34" charset="-128"/>
+              </a:rPr>
+              <a:t>Full page image with caption</a:t>
+            </a:r>
+          </a:p>
+        </p:txBody>
+      </p:sp>
+      <p:sp>
+        <p:nvSpPr>
+          <p:cNvPr id="53252" name="Subtitle 9"/>
+          <p:cNvSpPr>
+            <a:spLocks noGrp="1"/>
+          </p:cNvSpPr>
+          <p:nvPr>
+            <p:ph type="subTitle" idx="1"/>
+          </p:nvPr>
+        </p:nvSpPr>
+        <p:spPr/>
+        <p:txBody>
+          <a:bodyPr/>
+          <a:lstStyle/>
+          <a:p>
+            <a:pPr eaLnBrk="1" hangingPunct="1"/>
+            <a:r>
+              <a:rPr lang="en-ZA">
+                <a:ea typeface="ＭＳ Ｐゴシック" pitchFamily="34" charset="-128"/>
+              </a:rPr>
+              <a:t>Click on icon to add picture – example on following page</a:t>
+            </a:r>
+          </a:p>
+        </p:txBody>
+      </p:sp>
+    </p:spTree>
+  </p:cSld>
+  <p:clrMapOvr>
+    <a:masterClrMapping/>
+  </p:clrMapOvr>
+</p:sld>
+</file>
+
+<file path=ppt/slides/slide36.xml><?xml version="1.0" encoding="utf-8"?>
 <p:sld xmlns:a="http://schemas.openxmlformats.org/drawingml/2006/main" xmlns:r="http://schemas.openxmlformats.org/officeDocument/2006/relationships" xmlns:p="http://schemas.openxmlformats.org/presentationml/2006/main">
   <p:cSld>
     <p:spTree>
@@ -21906,117 +21799,6 @@
 </p:sld>
 </file>
 
-<file path=ppt/slides/slide36.xml><?xml version="1.0" encoding="utf-8"?>
-<p:sld xmlns:a="http://schemas.openxmlformats.org/drawingml/2006/main" xmlns:r="http://schemas.openxmlformats.org/officeDocument/2006/relationships" xmlns:p="http://schemas.openxmlformats.org/presentationml/2006/main">
-  <p:cSld>
-    <p:spTree>
-      <p:nvGrpSpPr>
-        <p:cNvPr id="1" name=""/>
-        <p:cNvGrpSpPr/>
-        <p:nvPr/>
-      </p:nvGrpSpPr>
-      <p:grpSpPr>
-        <a:xfrm>
-          <a:off x="0" y="0"/>
-          <a:ext cx="0" cy="0"/>
-          <a:chOff x="0" y="0"/>
-          <a:chExt cx="0" cy="0"/>
-        </a:xfrm>
-      </p:grpSpPr>
-      <p:sp>
-        <p:nvSpPr>
-          <p:cNvPr id="55298" name="Title 3"/>
-          <p:cNvSpPr>
-            <a:spLocks noGrp="1"/>
-          </p:cNvSpPr>
-          <p:nvPr>
-            <p:ph type="title"/>
-          </p:nvPr>
-        </p:nvSpPr>
-        <p:spPr/>
-        <p:txBody>
-          <a:bodyPr/>
-          <a:lstStyle/>
-          <a:p>
-            <a:pPr eaLnBrk="1" hangingPunct="1"/>
-            <a:r>
-              <a:rPr lang="en-ZA">
-                <a:ea typeface="ＭＳ Ｐゴシック" pitchFamily="34" charset="-128"/>
-              </a:rPr>
-              <a:t>Main title</a:t>
-            </a:r>
-          </a:p>
-        </p:txBody>
-      </p:sp>
-      <p:sp>
-        <p:nvSpPr>
-          <p:cNvPr id="55299" name="Content Placeholder 4"/>
-          <p:cNvSpPr>
-            <a:spLocks noGrp="1"/>
-          </p:cNvSpPr>
-          <p:nvPr>
-            <p:ph type="body" sz="quarter" idx="12"/>
-          </p:nvPr>
-        </p:nvSpPr>
-        <p:spPr/>
-        <p:txBody>
-          <a:bodyPr/>
-          <a:lstStyle/>
-          <a:p>
-            <a:pPr marL="0" indent="0" eaLnBrk="1" hangingPunct="1"/>
-            <a:r>
-              <a:rPr lang="en-ZA">
-                <a:ea typeface="ＭＳ Ｐゴシック" pitchFamily="34" charset="-128"/>
-              </a:rPr>
-              <a:t>Introduction level</a:t>
-            </a:r>
-          </a:p>
-          <a:p>
-            <a:pPr lvl="1" eaLnBrk="1" hangingPunct="1"/>
-            <a:r>
-              <a:rPr lang="en-ZA">
-                <a:ea typeface="ＭＳ Ｐゴシック" pitchFamily="34" charset="-128"/>
-              </a:rPr>
-              <a:t>First level bullet</a:t>
-            </a:r>
-          </a:p>
-          <a:p>
-            <a:pPr lvl="2" eaLnBrk="1" hangingPunct="1"/>
-            <a:r>
-              <a:rPr lang="en-ZA">
-                <a:ea typeface="ＭＳ Ｐゴシック" pitchFamily="34" charset="-128"/>
-              </a:rPr>
-              <a:t>Second level bullet</a:t>
-            </a:r>
-          </a:p>
-          <a:p>
-            <a:pPr lvl="3" eaLnBrk="1" hangingPunct="1"/>
-            <a:r>
-              <a:rPr lang="en-ZA">
-                <a:ea typeface="ＭＳ Ｐゴシック" pitchFamily="34" charset="-128"/>
-              </a:rPr>
-              <a:t>Third level bullet</a:t>
-            </a:r>
-          </a:p>
-          <a:p>
-            <a:pPr marL="0" indent="0" eaLnBrk="1" hangingPunct="1"/>
-            <a:r>
-              <a:rPr lang="en-ZA">
-                <a:ea typeface="ＭＳ Ｐゴシック" pitchFamily="34" charset="-128"/>
-              </a:rPr>
-              <a:t>I have amended this sizing a little from the old template, as this is more practical for everyday, typical Dimension Data content – this is my recommendation!</a:t>
-            </a:r>
-          </a:p>
-        </p:txBody>
-      </p:sp>
-    </p:spTree>
-  </p:cSld>
-  <p:clrMapOvr>
-    <a:masterClrMapping/>
-  </p:clrMapOvr>
-</p:sld>
-</file>
-
 <file path=ppt/slides/slide37.xml><?xml version="1.0" encoding="utf-8"?>
 <p:sld xmlns:a="http://schemas.openxmlformats.org/drawingml/2006/main" xmlns:r="http://schemas.openxmlformats.org/officeDocument/2006/relationships" xmlns:p="http://schemas.openxmlformats.org/presentationml/2006/main">
   <p:cSld>
@@ -22036,7 +21818,7 @@
       </p:grpSpPr>
       <p:sp>
         <p:nvSpPr>
-          <p:cNvPr id="56322" name="Title 3"/>
+          <p:cNvPr id="55298" name="Title 3"/>
           <p:cNvSpPr>
             <a:spLocks noGrp="1"/>
           </p:cNvSpPr>
@@ -22061,7 +21843,7 @@
       </p:sp>
       <p:sp>
         <p:nvSpPr>
-          <p:cNvPr id="56323" name="Content Placeholder 4"/>
+          <p:cNvPr id="55299" name="Content Placeholder 4"/>
           <p:cNvSpPr>
             <a:spLocks noGrp="1"/>
           </p:cNvSpPr>
@@ -22117,71 +21899,6 @@
               </a:rPr>
               <a:t>I have amended this sizing a little from the old template, as this is more practical for everyday, typical Dimension Data content – this is my recommendation!</a:t>
             </a:r>
-          </a:p>
-        </p:txBody>
-      </p:sp>
-      <p:sp>
-        <p:nvSpPr>
-          <p:cNvPr id="68611" name="Text Placeholder 2"/>
-          <p:cNvSpPr>
-            <a:spLocks noGrp="1"/>
-          </p:cNvSpPr>
-          <p:nvPr>
-            <p:ph type="body" sz="quarter" idx="14"/>
-          </p:nvPr>
-        </p:nvSpPr>
-        <p:spPr>
-          <a:ln w="9525"/>
-          <a:extLst>
-            <a:ext uri="{91240B29-F687-4F45-9708-019B960494DF}">
-              <a14:hiddenLine xmlns:a14="http://schemas.microsoft.com/office/drawing/2010/main" w="25400" cap="flat">
-                <a:solidFill>
-                  <a:srgbClr val="000000"/>
-                </a:solidFill>
-                <a:round/>
-                <a:headEnd/>
-                <a:tailEnd/>
-              </a14:hiddenLine>
-            </a:ext>
-          </a:extLst>
-        </p:spPr>
-        <p:txBody>
-          <a:bodyPr/>
-          <a:lstStyle/>
-          <a:p>
-            <a:pPr marL="0" indent="0" eaLnBrk="1" hangingPunct="1">
-              <a:buFont typeface="Arial" pitchFamily="34" charset="0"/>
-              <a:buNone/>
-              <a:defRPr/>
-            </a:pPr>
-            <a:endParaRPr lang="en-ZA">
-              <a:solidFill>
-                <a:srgbClr val="FFFFFF"/>
-              </a:solidFill>
-              <a:ea typeface="ＭＳ Ｐゴシック" pitchFamily="34" charset="-128"/>
-            </a:endParaRPr>
-          </a:p>
-        </p:txBody>
-      </p:sp>
-      <p:sp>
-        <p:nvSpPr>
-          <p:cNvPr id="56325" name="Content Placeholder 5"/>
-          <p:cNvSpPr>
-            <a:spLocks noGrp="1"/>
-          </p:cNvSpPr>
-          <p:nvPr>
-            <p:ph sz="quarter" idx="15"/>
-          </p:nvPr>
-        </p:nvSpPr>
-        <p:spPr/>
-        <p:txBody>
-          <a:bodyPr/>
-          <a:lstStyle/>
-          <a:p>
-            <a:pPr marL="0" indent="0" eaLnBrk="1" hangingPunct="1"/>
-            <a:endParaRPr lang="en-ZA">
-              <a:ea typeface="ＭＳ Ｐゴシック" pitchFamily="34" charset="-128"/>
-            </a:endParaRPr>
           </a:p>
         </p:txBody>
       </p:sp>
@@ -22212,7 +21929,7 @@
       </p:grpSpPr>
       <p:sp>
         <p:nvSpPr>
-          <p:cNvPr id="57346" name="Title 1"/>
+          <p:cNvPr id="56322" name="Title 3"/>
           <p:cNvSpPr>
             <a:spLocks noGrp="1"/>
           </p:cNvSpPr>
@@ -22230,29 +21947,142 @@
               <a:rPr lang="en-ZA">
                 <a:ea typeface="ＭＳ Ｐゴシック" pitchFamily="34" charset="-128"/>
               </a:rPr>
-              <a:t>Click on icon to add picture – example on following page</a:t>
-            </a:r>
-          </a:p>
-        </p:txBody>
-      </p:sp>
-      <p:sp>
-        <p:nvSpPr>
-          <p:cNvPr id="57347" name="Picture Placeholder 2"/>
+              <a:t>Main title</a:t>
+            </a:r>
+          </a:p>
+        </p:txBody>
+      </p:sp>
+      <p:sp>
+        <p:nvSpPr>
+          <p:cNvPr id="56323" name="Content Placeholder 4"/>
           <p:cNvSpPr>
-            <a:spLocks noGrp="1" noTextEdit="1"/>
+            <a:spLocks noGrp="1"/>
           </p:cNvSpPr>
           <p:nvPr>
-            <p:ph type="pic" sz="quarter" idx="11"/>
+            <p:ph type="body" sz="quarter" idx="12"/>
           </p:nvPr>
         </p:nvSpPr>
         <p:spPr/>
+        <p:txBody>
+          <a:bodyPr/>
+          <a:lstStyle/>
+          <a:p>
+            <a:pPr marL="0" indent="0" eaLnBrk="1" hangingPunct="1"/>
+            <a:r>
+              <a:rPr lang="en-ZA">
+                <a:ea typeface="ＭＳ Ｐゴシック" pitchFamily="34" charset="-128"/>
+              </a:rPr>
+              <a:t>Introduction level</a:t>
+            </a:r>
+          </a:p>
+          <a:p>
+            <a:pPr lvl="1" eaLnBrk="1" hangingPunct="1"/>
+            <a:r>
+              <a:rPr lang="en-ZA">
+                <a:ea typeface="ＭＳ Ｐゴシック" pitchFamily="34" charset="-128"/>
+              </a:rPr>
+              <a:t>First level bullet</a:t>
+            </a:r>
+          </a:p>
+          <a:p>
+            <a:pPr lvl="2" eaLnBrk="1" hangingPunct="1"/>
+            <a:r>
+              <a:rPr lang="en-ZA">
+                <a:ea typeface="ＭＳ Ｐゴシック" pitchFamily="34" charset="-128"/>
+              </a:rPr>
+              <a:t>Second level bullet</a:t>
+            </a:r>
+          </a:p>
+          <a:p>
+            <a:pPr lvl="3" eaLnBrk="1" hangingPunct="1"/>
+            <a:r>
+              <a:rPr lang="en-ZA">
+                <a:ea typeface="ＭＳ Ｐゴシック" pitchFamily="34" charset="-128"/>
+              </a:rPr>
+              <a:t>Third level bullet</a:t>
+            </a:r>
+          </a:p>
+          <a:p>
+            <a:pPr marL="0" indent="0" eaLnBrk="1" hangingPunct="1"/>
+            <a:r>
+              <a:rPr lang="en-ZA">
+                <a:ea typeface="ＭＳ Ｐゴシック" pitchFamily="34" charset="-128"/>
+              </a:rPr>
+              <a:t>I have amended this sizing a little from the old template, as this is more practical for everyday, typical Dimension Data content – this is my recommendation!</a:t>
+            </a:r>
+          </a:p>
+        </p:txBody>
+      </p:sp>
+      <p:sp>
+        <p:nvSpPr>
+          <p:cNvPr id="68611" name="Text Placeholder 2"/>
+          <p:cNvSpPr>
+            <a:spLocks noGrp="1"/>
+          </p:cNvSpPr>
+          <p:nvPr>
+            <p:ph type="body" sz="quarter" idx="14"/>
+          </p:nvPr>
+        </p:nvSpPr>
+        <p:spPr>
+          <a:ln w="9525"/>
+          <a:extLst>
+            <a:ext uri="{91240B29-F687-4F45-9708-019B960494DF}">
+              <a14:hiddenLine xmlns:a14="http://schemas.microsoft.com/office/drawing/2010/main" w="25400" cap="flat">
+                <a:solidFill>
+                  <a:srgbClr val="000000"/>
+                </a:solidFill>
+                <a:round/>
+                <a:headEnd/>
+                <a:tailEnd/>
+              </a14:hiddenLine>
+            </a:ext>
+          </a:extLst>
+        </p:spPr>
+        <p:txBody>
+          <a:bodyPr/>
+          <a:lstStyle/>
+          <a:p>
+            <a:pPr marL="0" indent="0" eaLnBrk="1" hangingPunct="1">
+              <a:buFont typeface="Arial" pitchFamily="34" charset="0"/>
+              <a:buNone/>
+              <a:defRPr/>
+            </a:pPr>
+            <a:endParaRPr lang="en-ZA">
+              <a:solidFill>
+                <a:srgbClr val="FFFFFF"/>
+              </a:solidFill>
+              <a:ea typeface="ＭＳ Ｐゴシック" pitchFamily="34" charset="-128"/>
+            </a:endParaRPr>
+          </a:p>
+        </p:txBody>
+      </p:sp>
+      <p:sp>
+        <p:nvSpPr>
+          <p:cNvPr id="56325" name="Content Placeholder 5"/>
+          <p:cNvSpPr>
+            <a:spLocks noGrp="1"/>
+          </p:cNvSpPr>
+          <p:nvPr>
+            <p:ph sz="quarter" idx="15"/>
+          </p:nvPr>
+        </p:nvSpPr>
+        <p:spPr/>
+        <p:txBody>
+          <a:bodyPr/>
+          <a:lstStyle/>
+          <a:p>
+            <a:pPr marL="0" indent="0" eaLnBrk="1" hangingPunct="1"/>
+            <a:endParaRPr lang="en-ZA">
+              <a:ea typeface="ＭＳ Ｐゴシック" pitchFamily="34" charset="-128"/>
+            </a:endParaRPr>
+          </a:p>
+        </p:txBody>
       </p:sp>
     </p:spTree>
   </p:cSld>
   <p:clrMapOvr>
     <a:masterClrMapping/>
   </p:clrMapOvr>
-  <p:transition spd="slow"/>
 </p:sld>
 </file>
 
@@ -22275,19 +22105,7 @@
       </p:grpSpPr>
       <p:sp>
         <p:nvSpPr>
-          <p:cNvPr id="58371" name="Picture Placeholder 1"/>
-          <p:cNvSpPr>
-            <a:spLocks noGrp="1" noTextEdit="1"/>
-          </p:cNvSpPr>
-          <p:nvPr>
-            <p:ph type="pic" sz="quarter" idx="12"/>
-          </p:nvPr>
-        </p:nvSpPr>
-        <p:spPr/>
-      </p:sp>
-      <p:sp>
-        <p:nvSpPr>
-          <p:cNvPr id="58370" name="Title 2"/>
+          <p:cNvPr id="57346" name="Title 1"/>
           <p:cNvSpPr>
             <a:spLocks noGrp="1"/>
           </p:cNvSpPr>
@@ -22310,11 +22128,24 @@
           </a:p>
         </p:txBody>
       </p:sp>
+      <p:sp>
+        <p:nvSpPr>
+          <p:cNvPr id="57347" name="Picture Placeholder 2"/>
+          <p:cNvSpPr>
+            <a:spLocks noGrp="1" noTextEdit="1"/>
+          </p:cNvSpPr>
+          <p:nvPr>
+            <p:ph type="pic" sz="quarter" idx="11"/>
+          </p:nvPr>
+        </p:nvSpPr>
+        <p:spPr/>
+      </p:sp>
     </p:spTree>
   </p:cSld>
   <p:clrMapOvr>
     <a:masterClrMapping/>
   </p:clrMapOvr>
+  <p:transition spd="slow"/>
 </p:sld>
 </file>
 
@@ -22399,7 +22230,7 @@
         </p:blipFill>
         <p:spPr>
           <a:xfrm>
-            <a:off x="287611" y="2276872"/>
+            <a:off x="251520" y="2276872"/>
             <a:ext cx="8650684" cy="2929415"/>
           </a:xfrm>
           <a:prstGeom prst="rect">
@@ -22415,7 +22246,7 @@
         </p:nvSpPr>
         <p:spPr>
           <a:xfrm>
-            <a:off x="680765" y="3556913"/>
+            <a:off x="644674" y="3556913"/>
             <a:ext cx="1008112" cy="369332"/>
           </a:xfrm>
           <a:prstGeom prst="rect">
@@ -22453,7 +22284,7 @@
         </p:nvSpPr>
         <p:spPr>
           <a:xfrm>
-            <a:off x="2170758" y="3556913"/>
+            <a:off x="2134667" y="3556913"/>
             <a:ext cx="742255" cy="369332"/>
           </a:xfrm>
           <a:prstGeom prst="rect">
@@ -22491,7 +22322,7 @@
         </p:nvSpPr>
         <p:spPr>
           <a:xfrm>
-            <a:off x="3500016" y="3546222"/>
+            <a:off x="3463925" y="3546222"/>
             <a:ext cx="742255" cy="369332"/>
           </a:xfrm>
           <a:prstGeom prst="rect">
@@ -22529,7 +22360,7 @@
         </p:nvSpPr>
         <p:spPr>
           <a:xfrm>
-            <a:off x="5001245" y="3556913"/>
+            <a:off x="4965154" y="3556913"/>
             <a:ext cx="742255" cy="369332"/>
           </a:xfrm>
           <a:prstGeom prst="rect">
@@ -22567,7 +22398,7 @@
         </p:nvSpPr>
         <p:spPr>
           <a:xfrm>
-            <a:off x="6368343" y="3535531"/>
+            <a:off x="6332252" y="3535531"/>
             <a:ext cx="742255" cy="369332"/>
           </a:xfrm>
           <a:prstGeom prst="rect">
@@ -22605,7 +22436,7 @@
         </p:nvSpPr>
         <p:spPr>
           <a:xfrm>
-            <a:off x="7831472" y="3535531"/>
+            <a:off x="7795381" y="3535531"/>
             <a:ext cx="742255" cy="369332"/>
           </a:xfrm>
           <a:prstGeom prst="rect">
@@ -22643,7 +22474,7 @@
         </p:nvSpPr>
         <p:spPr>
           <a:xfrm>
-            <a:off x="376176" y="1947079"/>
+            <a:off x="340085" y="1947079"/>
             <a:ext cx="1312701" cy="276999"/>
           </a:xfrm>
           <a:prstGeom prst="rect">
@@ -22672,7 +22503,7 @@
         </p:nvSpPr>
         <p:spPr>
           <a:xfrm>
-            <a:off x="1885534" y="5206286"/>
+            <a:off x="1849443" y="5206286"/>
             <a:ext cx="1312701" cy="461665"/>
           </a:xfrm>
           <a:prstGeom prst="rect">
@@ -22708,7 +22539,7 @@
         </p:nvSpPr>
         <p:spPr>
           <a:xfrm>
-            <a:off x="3256496" y="1947079"/>
+            <a:off x="3220405" y="1947079"/>
             <a:ext cx="1312701" cy="276999"/>
           </a:xfrm>
           <a:prstGeom prst="rect">
@@ -22738,7 +22569,7 @@
         </p:nvSpPr>
         <p:spPr>
           <a:xfrm>
-            <a:off x="4796158" y="5206286"/>
+            <a:off x="4760067" y="5206286"/>
             <a:ext cx="1312701" cy="276999"/>
           </a:xfrm>
           <a:prstGeom prst="rect">
@@ -22768,7 +22599,7 @@
         </p:nvSpPr>
         <p:spPr>
           <a:xfrm>
-            <a:off x="6030646" y="1947078"/>
+            <a:off x="5994555" y="1947078"/>
             <a:ext cx="1312701" cy="276999"/>
           </a:xfrm>
           <a:prstGeom prst="rect">
@@ -22798,7 +22629,7 @@
         </p:nvSpPr>
         <p:spPr>
           <a:xfrm>
-            <a:off x="7343347" y="5206286"/>
+            <a:off x="7307256" y="5206286"/>
             <a:ext cx="1797849" cy="276999"/>
           </a:xfrm>
           <a:prstGeom prst="rect">
@@ -22852,6 +22683,170 @@
           </a:p>
           <a:p>
             <a:endParaRPr lang="nl-BE" sz="1200" dirty="0"/>
+          </a:p>
+        </p:txBody>
+      </p:sp>
+      <p:sp>
+        <p:nvSpPr>
+          <p:cNvPr id="18" name="TextBox 17"/>
+          <p:cNvSpPr txBox="1"/>
+          <p:nvPr/>
+        </p:nvSpPr>
+        <p:spPr>
+          <a:xfrm>
+            <a:off x="1040718" y="2448600"/>
+            <a:ext cx="1224136" cy="276999"/>
+          </a:xfrm>
+          <a:prstGeom prst="rect">
+            <a:avLst/>
+          </a:prstGeom>
+          <a:noFill/>
+        </p:spPr>
+        <p:txBody>
+          <a:bodyPr wrap="square" rtlCol="0">
+            <a:spAutoFit/>
+          </a:bodyPr>
+          <a:lstStyle/>
+          <a:p>
+            <a:r>
+              <a:rPr lang="en-US" sz="1200" dirty="0"/>
+              <a:t>Server 2008</a:t>
+            </a:r>
+            <a:endParaRPr lang="en-BE" sz="1200" dirty="0"/>
+          </a:p>
+        </p:txBody>
+      </p:sp>
+      <p:sp>
+        <p:nvSpPr>
+          <p:cNvPr id="19" name="TextBox 18"/>
+          <p:cNvSpPr txBox="1"/>
+          <p:nvPr/>
+        </p:nvSpPr>
+        <p:spPr>
+          <a:xfrm>
+            <a:off x="2550075" y="4147645"/>
+            <a:ext cx="1265753" cy="461665"/>
+          </a:xfrm>
+          <a:prstGeom prst="rect">
+            <a:avLst/>
+          </a:prstGeom>
+          <a:noFill/>
+        </p:spPr>
+        <p:txBody>
+          <a:bodyPr wrap="square" rtlCol="0">
+            <a:spAutoFit/>
+          </a:bodyPr>
+          <a:lstStyle/>
+          <a:p>
+            <a:r>
+              <a:rPr lang="en-US" sz="1200" dirty="0"/>
+              <a:t>Win 7</a:t>
+            </a:r>
+          </a:p>
+          <a:p>
+            <a:r>
+              <a:rPr lang="en-US" sz="1200" dirty="0"/>
+              <a:t>Server 2008 R2</a:t>
+            </a:r>
+          </a:p>
+        </p:txBody>
+      </p:sp>
+      <p:sp>
+        <p:nvSpPr>
+          <p:cNvPr id="20" name="TextBox 19"/>
+          <p:cNvSpPr txBox="1"/>
+          <p:nvPr/>
+        </p:nvSpPr>
+        <p:spPr>
+          <a:xfrm>
+            <a:off x="3900229" y="2448600"/>
+            <a:ext cx="1265753" cy="461665"/>
+          </a:xfrm>
+          <a:prstGeom prst="rect">
+            <a:avLst/>
+          </a:prstGeom>
+          <a:noFill/>
+        </p:spPr>
+        <p:txBody>
+          <a:bodyPr wrap="square" rtlCol="0">
+            <a:spAutoFit/>
+          </a:bodyPr>
+          <a:lstStyle/>
+          <a:p>
+            <a:r>
+              <a:rPr lang="en-US" sz="1200" dirty="0"/>
+              <a:t>Win 8</a:t>
+            </a:r>
+          </a:p>
+          <a:p>
+            <a:r>
+              <a:rPr lang="en-US" sz="1200" dirty="0"/>
+              <a:t>Server 2012</a:t>
+            </a:r>
+          </a:p>
+        </p:txBody>
+      </p:sp>
+      <p:sp>
+        <p:nvSpPr>
+          <p:cNvPr id="21" name="TextBox 20"/>
+          <p:cNvSpPr txBox="1"/>
+          <p:nvPr/>
+        </p:nvSpPr>
+        <p:spPr>
+          <a:xfrm>
+            <a:off x="5385152" y="4165215"/>
+            <a:ext cx="1265753" cy="461665"/>
+          </a:xfrm>
+          <a:prstGeom prst="rect">
+            <a:avLst/>
+          </a:prstGeom>
+          <a:noFill/>
+        </p:spPr>
+        <p:txBody>
+          <a:bodyPr wrap="square" rtlCol="0">
+            <a:spAutoFit/>
+          </a:bodyPr>
+          <a:lstStyle/>
+          <a:p>
+            <a:r>
+              <a:rPr lang="en-US" sz="1200" dirty="0"/>
+              <a:t>Win 8.1</a:t>
+            </a:r>
+          </a:p>
+          <a:p>
+            <a:r>
+              <a:rPr lang="en-US" sz="1200" dirty="0"/>
+              <a:t>Server 2012 R2</a:t>
+            </a:r>
+          </a:p>
+        </p:txBody>
+      </p:sp>
+      <p:sp>
+        <p:nvSpPr>
+          <p:cNvPr id="22" name="TextBox 21"/>
+          <p:cNvSpPr txBox="1"/>
+          <p:nvPr/>
+        </p:nvSpPr>
+        <p:spPr>
+          <a:xfrm>
+            <a:off x="6796193" y="2456929"/>
+            <a:ext cx="1265753" cy="276999"/>
+          </a:xfrm>
+          <a:prstGeom prst="rect">
+            <a:avLst/>
+          </a:prstGeom>
+          <a:noFill/>
+        </p:spPr>
+        <p:txBody>
+          <a:bodyPr wrap="square" rtlCol="0">
+            <a:spAutoFit/>
+          </a:bodyPr>
+          <a:lstStyle/>
+          <a:p>
+            <a:r>
+              <a:rPr lang="en-US" sz="1200" dirty="0"/>
+              <a:t>Win 10</a:t>
+            </a:r>
           </a:p>
         </p:txBody>
       </p:sp>
@@ -22869,6 +22864,68 @@
 </file>
 
 <file path=ppt/slides/slide40.xml><?xml version="1.0" encoding="utf-8"?>
+<p:sld xmlns:a="http://schemas.openxmlformats.org/drawingml/2006/main" xmlns:r="http://schemas.openxmlformats.org/officeDocument/2006/relationships" xmlns:p="http://schemas.openxmlformats.org/presentationml/2006/main">
+  <p:cSld>
+    <p:spTree>
+      <p:nvGrpSpPr>
+        <p:cNvPr id="1" name=""/>
+        <p:cNvGrpSpPr/>
+        <p:nvPr/>
+      </p:nvGrpSpPr>
+      <p:grpSpPr>
+        <a:xfrm>
+          <a:off x="0" y="0"/>
+          <a:ext cx="0" cy="0"/>
+          <a:chOff x="0" y="0"/>
+          <a:chExt cx="0" cy="0"/>
+        </a:xfrm>
+      </p:grpSpPr>
+      <p:sp>
+        <p:nvSpPr>
+          <p:cNvPr id="58371" name="Picture Placeholder 1"/>
+          <p:cNvSpPr>
+            <a:spLocks noGrp="1" noTextEdit="1"/>
+          </p:cNvSpPr>
+          <p:nvPr>
+            <p:ph type="pic" sz="quarter" idx="12"/>
+          </p:nvPr>
+        </p:nvSpPr>
+        <p:spPr/>
+      </p:sp>
+      <p:sp>
+        <p:nvSpPr>
+          <p:cNvPr id="58370" name="Title 2"/>
+          <p:cNvSpPr>
+            <a:spLocks noGrp="1"/>
+          </p:cNvSpPr>
+          <p:nvPr>
+            <p:ph type="title"/>
+          </p:nvPr>
+        </p:nvSpPr>
+        <p:spPr/>
+        <p:txBody>
+          <a:bodyPr/>
+          <a:lstStyle/>
+          <a:p>
+            <a:pPr eaLnBrk="1" hangingPunct="1"/>
+            <a:r>
+              <a:rPr lang="en-ZA">
+                <a:ea typeface="ＭＳ Ｐゴシック" pitchFamily="34" charset="-128"/>
+              </a:rPr>
+              <a:t>Click on icon to add picture – example on following page</a:t>
+            </a:r>
+          </a:p>
+        </p:txBody>
+      </p:sp>
+    </p:spTree>
+  </p:cSld>
+  <p:clrMapOvr>
+    <a:masterClrMapping/>
+  </p:clrMapOvr>
+</p:sld>
+</file>
+
+<file path=ppt/slides/slide41.xml><?xml version="1.0" encoding="utf-8"?>
 <p:sld xmlns:a="http://schemas.openxmlformats.org/drawingml/2006/main" xmlns:r="http://schemas.openxmlformats.org/officeDocument/2006/relationships" xmlns:p="http://schemas.openxmlformats.org/presentationml/2006/main">
   <p:cSld>
     <p:spTree>
@@ -22940,7 +22997,7 @@
 </p:sld>
 </file>
 
-<file path=ppt/slides/slide41.xml><?xml version="1.0" encoding="utf-8"?>
+<file path=ppt/slides/slide42.xml><?xml version="1.0" encoding="utf-8"?>
 <p:sld xmlns:a="http://schemas.openxmlformats.org/drawingml/2006/main" xmlns:r="http://schemas.openxmlformats.org/officeDocument/2006/relationships" xmlns:p="http://schemas.openxmlformats.org/presentationml/2006/main">
   <p:cSld>
     <p:spTree>
@@ -23004,7 +23061,7 @@
 </p:sld>
 </file>
 
-<file path=ppt/slides/slide42.xml><?xml version="1.0" encoding="utf-8"?>
+<file path=ppt/slides/slide43.xml><?xml version="1.0" encoding="utf-8"?>
 <p:sld xmlns:a="http://schemas.openxmlformats.org/drawingml/2006/main" xmlns:r="http://schemas.openxmlformats.org/officeDocument/2006/relationships" xmlns:p="http://schemas.openxmlformats.org/presentationml/2006/main">
   <p:cSld>
     <p:spTree>
@@ -23081,78 +23138,6 @@
 </p:sld>
 </file>
 
-<file path=ppt/slides/slide43.xml><?xml version="1.0" encoding="utf-8"?>
-<p:sld xmlns:a="http://schemas.openxmlformats.org/drawingml/2006/main" xmlns:r="http://schemas.openxmlformats.org/officeDocument/2006/relationships" xmlns:p="http://schemas.openxmlformats.org/presentationml/2006/main">
-  <p:cSld>
-    <p:spTree>
-      <p:nvGrpSpPr>
-        <p:cNvPr id="1" name=""/>
-        <p:cNvGrpSpPr/>
-        <p:nvPr/>
-      </p:nvGrpSpPr>
-      <p:grpSpPr>
-        <a:xfrm>
-          <a:off x="0" y="0"/>
-          <a:ext cx="0" cy="0"/>
-          <a:chOff x="0" y="0"/>
-          <a:chExt cx="0" cy="0"/>
-        </a:xfrm>
-      </p:grpSpPr>
-      <p:sp>
-        <p:nvSpPr>
-          <p:cNvPr id="62466" name="Title 1"/>
-          <p:cNvSpPr>
-            <a:spLocks noGrp="1"/>
-          </p:cNvSpPr>
-          <p:nvPr>
-            <p:ph type="title"/>
-          </p:nvPr>
-        </p:nvSpPr>
-        <p:spPr/>
-        <p:txBody>
-          <a:bodyPr/>
-          <a:lstStyle/>
-          <a:p>
-            <a:pPr eaLnBrk="1" hangingPunct="1"/>
-            <a:endParaRPr lang="en-ZA">
-              <a:ea typeface="ＭＳ Ｐゴシック" pitchFamily="34" charset="-128"/>
-            </a:endParaRPr>
-          </a:p>
-        </p:txBody>
-      </p:sp>
-      <p:sp>
-        <p:nvSpPr>
-          <p:cNvPr id="62467" name="Text Placeholder 2"/>
-          <p:cNvSpPr>
-            <a:spLocks noGrp="1"/>
-          </p:cNvSpPr>
-          <p:nvPr>
-            <p:ph type="body" sz="quarter" idx="12"/>
-          </p:nvPr>
-        </p:nvSpPr>
-        <p:spPr/>
-        <p:txBody>
-          <a:bodyPr/>
-          <a:lstStyle/>
-          <a:p>
-            <a:pPr lvl="1" eaLnBrk="1" hangingPunct="1"/>
-            <a:r>
-              <a:rPr lang="en-ZA">
-                <a:ea typeface="ＭＳ Ｐゴシック" pitchFamily="34" charset="-128"/>
-              </a:rPr>
-              <a:t>Text to describe image or diagram on left hand side</a:t>
-            </a:r>
-          </a:p>
-        </p:txBody>
-      </p:sp>
-    </p:spTree>
-  </p:cSld>
-  <p:clrMapOvr>
-    <a:masterClrMapping/>
-  </p:clrMapOvr>
-</p:sld>
-</file>
-
 <file path=ppt/slides/slide44.xml><?xml version="1.0" encoding="utf-8"?>
 <p:sld xmlns:a="http://schemas.openxmlformats.org/drawingml/2006/main" xmlns:r="http://schemas.openxmlformats.org/officeDocument/2006/relationships" xmlns:p="http://schemas.openxmlformats.org/presentationml/2006/main">
   <p:cSld>
@@ -23172,79 +23157,47 @@
       </p:grpSpPr>
       <p:sp>
         <p:nvSpPr>
-          <p:cNvPr id="63490" name="Content Placeholder 3"/>
+          <p:cNvPr id="62466" name="Title 1"/>
           <p:cNvSpPr>
             <a:spLocks noGrp="1"/>
           </p:cNvSpPr>
           <p:nvPr>
-            <p:ph idx="1"/>
+            <p:ph type="title"/>
           </p:nvPr>
         </p:nvSpPr>
-        <p:spPr bwMode="white"/>
+        <p:spPr/>
         <p:txBody>
           <a:bodyPr/>
           <a:lstStyle/>
           <a:p>
-            <a:pPr marL="149225" indent="-149225" eaLnBrk="1" hangingPunct="1">
-              <a:buFont typeface="Arial" charset="0"/>
-              <a:buNone/>
-            </a:pPr>
-            <a:r>
-              <a:rPr lang="en-ZA" altLang="en-US">
-                <a:ea typeface="ＭＳ Ｐゴシック" pitchFamily="34" charset="-128"/>
-              </a:rPr>
-              <a:t>“</a:t>
-            </a:r>
+            <a:pPr eaLnBrk="1" hangingPunct="1"/>
+            <a:endParaRPr lang="en-ZA">
+              <a:ea typeface="ＭＳ Ｐゴシック" pitchFamily="34" charset="-128"/>
+            </a:endParaRPr>
+          </a:p>
+        </p:txBody>
+      </p:sp>
+      <p:sp>
+        <p:nvSpPr>
+          <p:cNvPr id="62467" name="Text Placeholder 2"/>
+          <p:cNvSpPr>
+            <a:spLocks noGrp="1"/>
+          </p:cNvSpPr>
+          <p:nvPr>
+            <p:ph type="body" sz="quarter" idx="12"/>
+          </p:nvPr>
+        </p:nvSpPr>
+        <p:spPr/>
+        <p:txBody>
+          <a:bodyPr/>
+          <a:lstStyle/>
+          <a:p>
+            <a:pPr lvl="1" eaLnBrk="1" hangingPunct="1"/>
             <a:r>
               <a:rPr lang="en-ZA">
                 <a:ea typeface="ＭＳ Ｐゴシック" pitchFamily="34" charset="-128"/>
               </a:rPr>
-              <a:t>First line of pullout quote or introduction with a </a:t>
-            </a:r>
-            <a:r>
-              <a:rPr lang="en-ZA" b="1">
-                <a:ea typeface="ＭＳ Ｐゴシック" pitchFamily="34" charset="-128"/>
-              </a:rPr>
-              <a:t>key word </a:t>
-            </a:r>
-            <a:r>
-              <a:rPr lang="en-ZA">
-                <a:ea typeface="ＭＳ Ｐゴシック" pitchFamily="34" charset="-128"/>
-              </a:rPr>
-              <a:t>highlighted</a:t>
-            </a:r>
-            <a:r>
-              <a:rPr lang="en-ZA" altLang="en-US">
-                <a:ea typeface="ＭＳ Ｐゴシック" pitchFamily="34" charset="-128"/>
-              </a:rPr>
-              <a:t>”</a:t>
-            </a:r>
-            <a:endParaRPr lang="en-ZA">
-              <a:ea typeface="ＭＳ Ｐゴシック" pitchFamily="34" charset="-128"/>
-            </a:endParaRPr>
-          </a:p>
-          <a:p>
-            <a:pPr lvl="1" eaLnBrk="1" hangingPunct="1">
-              <a:buFont typeface="Arial" charset="0"/>
-              <a:buNone/>
-            </a:pPr>
-            <a:r>
-              <a:rPr lang="en-ZA">
-                <a:solidFill>
-                  <a:srgbClr val="E1E1E1"/>
-                </a:solidFill>
-                <a:ea typeface="ＭＳ Ｐゴシック" pitchFamily="34" charset="-128"/>
-              </a:rPr>
-              <a:t>First level bullet indented with </a:t>
-            </a:r>
-            <a:r>
-              <a:rPr lang="en-ZA" b="1">
-                <a:solidFill>
-                  <a:srgbClr val="E1E1E1"/>
-                </a:solidFill>
-                <a:ea typeface="ＭＳ Ｐゴシック" pitchFamily="34" charset="-128"/>
-              </a:rPr>
-              <a:t>key word</a:t>
+              <a:t>Text to describe image or diagram on left hand side</a:t>
             </a:r>
           </a:p>
         </p:txBody>
@@ -23276,6 +23229,110 @@
       </p:grpSpPr>
       <p:sp>
         <p:nvSpPr>
+          <p:cNvPr id="63490" name="Content Placeholder 3"/>
+          <p:cNvSpPr>
+            <a:spLocks noGrp="1"/>
+          </p:cNvSpPr>
+          <p:nvPr>
+            <p:ph idx="1"/>
+          </p:nvPr>
+        </p:nvSpPr>
+        <p:spPr bwMode="white"/>
+        <p:txBody>
+          <a:bodyPr/>
+          <a:lstStyle/>
+          <a:p>
+            <a:pPr marL="149225" indent="-149225" eaLnBrk="1" hangingPunct="1">
+              <a:buFont typeface="Arial" charset="0"/>
+              <a:buNone/>
+            </a:pPr>
+            <a:r>
+              <a:rPr lang="en-ZA" altLang="en-US">
+                <a:ea typeface="ＭＳ Ｐゴシック" pitchFamily="34" charset="-128"/>
+              </a:rPr>
+              <a:t>“</a:t>
+            </a:r>
+            <a:r>
+              <a:rPr lang="en-ZA">
+                <a:ea typeface="ＭＳ Ｐゴシック" pitchFamily="34" charset="-128"/>
+              </a:rPr>
+              <a:t>First line of pullout quote or introduction with a </a:t>
+            </a:r>
+            <a:r>
+              <a:rPr lang="en-ZA" b="1">
+                <a:ea typeface="ＭＳ Ｐゴシック" pitchFamily="34" charset="-128"/>
+              </a:rPr>
+              <a:t>key word </a:t>
+            </a:r>
+            <a:r>
+              <a:rPr lang="en-ZA">
+                <a:ea typeface="ＭＳ Ｐゴシック" pitchFamily="34" charset="-128"/>
+              </a:rPr>
+              <a:t>highlighted</a:t>
+            </a:r>
+            <a:r>
+              <a:rPr lang="en-ZA" altLang="en-US">
+                <a:ea typeface="ＭＳ Ｐゴシック" pitchFamily="34" charset="-128"/>
+              </a:rPr>
+              <a:t>”</a:t>
+            </a:r>
+            <a:endParaRPr lang="en-ZA">
+              <a:ea typeface="ＭＳ Ｐゴシック" pitchFamily="34" charset="-128"/>
+            </a:endParaRPr>
+          </a:p>
+          <a:p>
+            <a:pPr lvl="1" eaLnBrk="1" hangingPunct="1">
+              <a:buFont typeface="Arial" charset="0"/>
+              <a:buNone/>
+            </a:pPr>
+            <a:r>
+              <a:rPr lang="en-ZA">
+                <a:solidFill>
+                  <a:srgbClr val="E1E1E1"/>
+                </a:solidFill>
+                <a:ea typeface="ＭＳ Ｐゴシック" pitchFamily="34" charset="-128"/>
+              </a:rPr>
+              <a:t>First level bullet indented with </a:t>
+            </a:r>
+            <a:r>
+              <a:rPr lang="en-ZA" b="1">
+                <a:solidFill>
+                  <a:srgbClr val="E1E1E1"/>
+                </a:solidFill>
+                <a:ea typeface="ＭＳ Ｐゴシック" pitchFamily="34" charset="-128"/>
+              </a:rPr>
+              <a:t>key word</a:t>
+            </a:r>
+          </a:p>
+        </p:txBody>
+      </p:sp>
+    </p:spTree>
+  </p:cSld>
+  <p:clrMapOvr>
+    <a:masterClrMapping/>
+  </p:clrMapOvr>
+</p:sld>
+</file>
+
+<file path=ppt/slides/slide46.xml><?xml version="1.0" encoding="utf-8"?>
+<p:sld xmlns:a="http://schemas.openxmlformats.org/drawingml/2006/main" xmlns:r="http://schemas.openxmlformats.org/officeDocument/2006/relationships" xmlns:p="http://schemas.openxmlformats.org/presentationml/2006/main">
+  <p:cSld>
+    <p:spTree>
+      <p:nvGrpSpPr>
+        <p:cNvPr id="1" name=""/>
+        <p:cNvGrpSpPr/>
+        <p:nvPr/>
+      </p:nvGrpSpPr>
+      <p:grpSpPr>
+        <a:xfrm>
+          <a:off x="0" y="0"/>
+          <a:ext cx="0" cy="0"/>
+          <a:chOff x="0" y="0"/>
+          <a:chExt cx="0" cy="0"/>
+        </a:xfrm>
+      </p:grpSpPr>
+      <p:sp>
+        <p:nvSpPr>
           <p:cNvPr id="64514" name="Content Placeholder 3"/>
           <p:cNvSpPr>
             <a:spLocks noGrp="1"/>
@@ -23453,7 +23510,6 @@
               <a:rPr lang="en-US" dirty="0"/>
               <a:t>Copy selected text with Ctrl + C  or by pressing enter.</a:t>
             </a:r>
-            <a:endParaRPr lang="en-US" dirty="0"/>
           </a:p>
           <a:p>
             <a:pPr>
@@ -24185,6 +24241,65 @@
       </p:grpSpPr>
       <p:sp>
         <p:nvSpPr>
+          <p:cNvPr id="5" name="Text Placeholder 4"/>
+          <p:cNvSpPr>
+            <a:spLocks noGrp="1"/>
+          </p:cNvSpPr>
+          <p:nvPr>
+            <p:ph type="body" sz="quarter" idx="14"/>
+          </p:nvPr>
+        </p:nvSpPr>
+        <p:spPr>
+          <a:xfrm>
+            <a:off x="297520" y="2132855"/>
+            <a:ext cx="8550275" cy="4120307"/>
+          </a:xfrm>
+        </p:spPr>
+        <p:txBody>
+          <a:bodyPr/>
+          <a:lstStyle/>
+          <a:p>
+            <a:endParaRPr lang="en-BE" dirty="0"/>
+          </a:p>
+        </p:txBody>
+      </p:sp>
+      <p:sp>
+        <p:nvSpPr>
+          <p:cNvPr id="3" name="Content Placeholder 2"/>
+          <p:cNvSpPr>
+            <a:spLocks noGrp="1"/>
+          </p:cNvSpPr>
+          <p:nvPr>
+            <p:ph type="body" sz="quarter" idx="12"/>
+          </p:nvPr>
+        </p:nvSpPr>
+        <p:spPr>
+          <a:xfrm>
+            <a:off x="296863" y="1357377"/>
+            <a:ext cx="8550275" cy="631420"/>
+          </a:xfrm>
+        </p:spPr>
+        <p:txBody>
+          <a:bodyPr/>
+          <a:lstStyle/>
+          <a:p>
+            <a:pPr algn="l"/>
+            <a:r>
+              <a:rPr lang="en-US" dirty="0"/>
+              <a:t>Piping works virtually everywhere in PowerShell. </a:t>
+            </a:r>
+          </a:p>
+          <a:p>
+            <a:pPr algn="l"/>
+            <a:r>
+              <a:rPr lang="en-US" dirty="0"/>
+              <a:t>Windows PowerShell does not pipe text between commands. it pipes objects.</a:t>
+            </a:r>
+          </a:p>
+        </p:txBody>
+      </p:sp>
+      <p:sp>
+        <p:nvSpPr>
           <p:cNvPr id="2" name="Title 1"/>
           <p:cNvSpPr>
             <a:spLocks noGrp="1"/>
@@ -24208,64 +24323,615 @@
       </p:sp>
       <p:sp>
         <p:nvSpPr>
-          <p:cNvPr id="3" name="Content Placeholder 2"/>
-          <p:cNvSpPr>
-            <a:spLocks noGrp="1"/>
-          </p:cNvSpPr>
-          <p:nvPr>
-            <p:ph idx="1"/>
-          </p:nvPr>
-        </p:nvSpPr>
-        <p:spPr/>
-        <p:txBody>
-          <a:bodyPr/>
+          <p:cNvPr id="6" name="Rectangle 5"/>
+          <p:cNvSpPr/>
+          <p:nvPr/>
+        </p:nvSpPr>
+        <p:spPr>
+          <a:xfrm>
+            <a:off x="278560" y="2155464"/>
+            <a:ext cx="8568578" cy="3647152"/>
+          </a:xfrm>
+          <a:prstGeom prst="rect">
+            <a:avLst/>
+          </a:prstGeom>
+        </p:spPr>
+        <p:txBody>
+          <a:bodyPr wrap="square">
+            <a:spAutoFit/>
+          </a:bodyPr>
           <a:lstStyle/>
           <a:p>
-            <a:r>
-              <a:rPr lang="en-US" dirty="0"/>
-              <a:t>Piping works virtually everywhere in PowerShell. </a:t>
-            </a:r>
-          </a:p>
-          <a:p>
-            <a:r>
-              <a:rPr lang="en-US" dirty="0"/>
-              <a:t>Windows PowerShell does not pipe text between commands. it pipes objects.</a:t>
-            </a:r>
-          </a:p>
-          <a:p>
-            <a:endParaRPr lang="en-US" dirty="0"/>
-          </a:p>
-          <a:p>
-            <a:r>
-              <a:rPr lang="en-US" dirty="0"/>
-              <a:t>Get-</a:t>
-            </a:r>
-            <a:r>
-              <a:rPr lang="en-US" dirty="0" err="1"/>
+            <a:pPr>
+              <a:lnSpc>
+                <a:spcPct val="150000"/>
+              </a:lnSpc>
+            </a:pPr>
+            <a:r>
+              <a:rPr lang="en-US" sz="1400" i="1" dirty="0">
+                <a:latin typeface="Lucida Console" panose="020B0609040504020204" pitchFamily="49" charset="0"/>
+              </a:rPr>
+              <a:t>Examples:</a:t>
+            </a:r>
+          </a:p>
+          <a:p>
+            <a:pPr>
+              <a:lnSpc>
+                <a:spcPct val="150000"/>
+              </a:lnSpc>
+            </a:pPr>
+            <a:r>
+              <a:rPr lang="en-US" sz="1400" dirty="0">
+                <a:latin typeface="Lucida Console" panose="020B0609040504020204" pitchFamily="49" charset="0"/>
+              </a:rPr>
+              <a:t>Get child items as paged output in the terminal:</a:t>
+            </a:r>
+          </a:p>
+          <a:p>
+            <a:pPr>
+              <a:lnSpc>
+                <a:spcPct val="150000"/>
+              </a:lnSpc>
+            </a:pPr>
+            <a:r>
+              <a:rPr lang="en-US" sz="1400" dirty="0">
+                <a:solidFill>
+                  <a:srgbClr val="0000FF"/>
+                </a:solidFill>
+                <a:latin typeface="Lucida Console" panose="020B0609040504020204" pitchFamily="49" charset="0"/>
+              </a:rPr>
+              <a:t>  Get-</a:t>
+            </a:r>
+            <a:r>
+              <a:rPr lang="en-US" sz="1400" dirty="0" err="1">
+                <a:solidFill>
+                  <a:srgbClr val="0000FF"/>
+                </a:solidFill>
+                <a:latin typeface="Lucida Console" panose="020B0609040504020204" pitchFamily="49" charset="0"/>
+              </a:rPr>
               <a:t>ChildItem</a:t>
             </a:r>
             <a:r>
-              <a:rPr lang="en-US" dirty="0"/>
-              <a:t> -Path C:\WINDOWS\System32</a:t>
-            </a:r>
-          </a:p>
-          <a:p>
-            <a:endParaRPr lang="en-US" dirty="0"/>
-          </a:p>
-          <a:p>
-            <a:r>
-              <a:rPr lang="en-US" dirty="0"/>
-              <a:t>Get-</a:t>
-            </a:r>
-            <a:r>
-              <a:rPr lang="en-US" dirty="0" err="1"/>
+              <a:rPr lang="en-US" sz="1400" dirty="0">
+                <a:solidFill>
+                  <a:prstClr val="black"/>
+                </a:solidFill>
+                <a:latin typeface="Lucida Console" panose="020B0609040504020204" pitchFamily="49" charset="0"/>
+              </a:rPr>
+              <a:t> </a:t>
+            </a:r>
+            <a:r>
+              <a:rPr lang="en-US" sz="1400" dirty="0">
+                <a:solidFill>
+                  <a:srgbClr val="000080"/>
+                </a:solidFill>
+                <a:latin typeface="Lucida Console" panose="020B0609040504020204" pitchFamily="49" charset="0"/>
+              </a:rPr>
+              <a:t>-Path</a:t>
+            </a:r>
+            <a:r>
+              <a:rPr lang="en-US" sz="1400" dirty="0">
+                <a:solidFill>
+                  <a:prstClr val="black"/>
+                </a:solidFill>
+                <a:latin typeface="Lucida Console" panose="020B0609040504020204" pitchFamily="49" charset="0"/>
+              </a:rPr>
+              <a:t> </a:t>
+            </a:r>
+            <a:r>
+              <a:rPr lang="en-US" sz="1400" dirty="0">
+                <a:solidFill>
+                  <a:srgbClr val="8A2BE2"/>
+                </a:solidFill>
+                <a:latin typeface="Lucida Console" panose="020B0609040504020204" pitchFamily="49" charset="0"/>
+              </a:rPr>
+              <a:t>C:\WINDOWS\System32</a:t>
+            </a:r>
+            <a:r>
+              <a:rPr lang="en-US" sz="1400" dirty="0">
+                <a:solidFill>
+                  <a:prstClr val="black"/>
+                </a:solidFill>
+                <a:latin typeface="Lucida Console" panose="020B0609040504020204" pitchFamily="49" charset="0"/>
+              </a:rPr>
+              <a:t> </a:t>
+            </a:r>
+            <a:r>
+              <a:rPr lang="en-US" sz="1400" dirty="0">
+                <a:solidFill>
+                  <a:srgbClr val="A9A9A9"/>
+                </a:solidFill>
+                <a:latin typeface="Lucida Console" panose="020B0609040504020204" pitchFamily="49" charset="0"/>
+              </a:rPr>
+              <a:t>|</a:t>
+            </a:r>
+            <a:r>
+              <a:rPr lang="en-US" sz="1400" dirty="0">
+                <a:solidFill>
+                  <a:prstClr val="black"/>
+                </a:solidFill>
+                <a:latin typeface="Lucida Console" panose="020B0609040504020204" pitchFamily="49" charset="0"/>
+              </a:rPr>
+              <a:t> </a:t>
+            </a:r>
+            <a:r>
+              <a:rPr lang="en-US" sz="1400" dirty="0">
+                <a:solidFill>
+                  <a:srgbClr val="0000FF"/>
+                </a:solidFill>
+                <a:latin typeface="Lucida Console" panose="020B0609040504020204" pitchFamily="49" charset="0"/>
+              </a:rPr>
+              <a:t>Out-Host</a:t>
+            </a:r>
+            <a:r>
+              <a:rPr lang="en-US" sz="1400" dirty="0">
+                <a:solidFill>
+                  <a:prstClr val="black"/>
+                </a:solidFill>
+                <a:latin typeface="Lucida Console" panose="020B0609040504020204" pitchFamily="49" charset="0"/>
+              </a:rPr>
+              <a:t> </a:t>
+            </a:r>
+            <a:r>
+              <a:rPr lang="en-US" sz="1400" dirty="0">
+                <a:solidFill>
+                  <a:srgbClr val="000080"/>
+                </a:solidFill>
+                <a:latin typeface="Lucida Console" panose="020B0609040504020204" pitchFamily="49" charset="0"/>
+              </a:rPr>
+              <a:t>-Paging</a:t>
+            </a:r>
+            <a:endParaRPr lang="en-US" sz="1400" dirty="0">
+              <a:solidFill>
+                <a:prstClr val="black"/>
+              </a:solidFill>
+              <a:latin typeface="Lucida Console" panose="020B0609040504020204" pitchFamily="49" charset="0"/>
+            </a:endParaRPr>
+          </a:p>
+          <a:p>
+            <a:pPr>
+              <a:lnSpc>
+                <a:spcPct val="150000"/>
+              </a:lnSpc>
+            </a:pPr>
+            <a:endParaRPr lang="nl-BE" sz="1400" dirty="0">
+              <a:solidFill>
+                <a:srgbClr val="0000FF"/>
+              </a:solidFill>
+              <a:latin typeface="Lucida Console" panose="020B0609040504020204" pitchFamily="49" charset="0"/>
+            </a:endParaRPr>
+          </a:p>
+          <a:p>
+            <a:pPr>
+              <a:lnSpc>
+                <a:spcPct val="150000"/>
+              </a:lnSpc>
+            </a:pPr>
+            <a:r>
+              <a:rPr lang="nl-BE" sz="1400" dirty="0">
+                <a:latin typeface="Lucida Console" panose="020B0609040504020204" pitchFamily="49" charset="0"/>
+              </a:rPr>
+              <a:t>Show child items as grid view:</a:t>
+            </a:r>
+            <a:br>
+              <a:rPr lang="nl-BE" sz="1400" dirty="0">
+                <a:latin typeface="Lucida Console" panose="020B0609040504020204" pitchFamily="49" charset="0"/>
+              </a:rPr>
+            </a:br>
+            <a:r>
+              <a:rPr lang="nl-BE" sz="1400" dirty="0">
+                <a:solidFill>
+                  <a:srgbClr val="0000FF"/>
+                </a:solidFill>
+                <a:latin typeface="Lucida Console" panose="020B0609040504020204" pitchFamily="49" charset="0"/>
+              </a:rPr>
+              <a:t>  Get-ChildItem</a:t>
+            </a:r>
+            <a:r>
+              <a:rPr lang="nl-BE" sz="1400" dirty="0">
+                <a:solidFill>
+                  <a:prstClr val="black"/>
+                </a:solidFill>
+                <a:latin typeface="Lucida Console" panose="020B0609040504020204" pitchFamily="49" charset="0"/>
+              </a:rPr>
+              <a:t> </a:t>
+            </a:r>
+            <a:r>
+              <a:rPr lang="nl-BE" sz="1400" dirty="0">
+                <a:solidFill>
+                  <a:srgbClr val="8A2BE2"/>
+                </a:solidFill>
+                <a:latin typeface="Lucida Console" panose="020B0609040504020204" pitchFamily="49" charset="0"/>
+              </a:rPr>
+              <a:t>.\</a:t>
+            </a:r>
+            <a:r>
+              <a:rPr lang="nl-BE" sz="1400" dirty="0">
+                <a:solidFill>
+                  <a:prstClr val="black"/>
+                </a:solidFill>
+                <a:latin typeface="Lucida Console" panose="020B0609040504020204" pitchFamily="49" charset="0"/>
+              </a:rPr>
+              <a:t> </a:t>
+            </a:r>
+            <a:r>
+              <a:rPr lang="nl-BE" sz="1400" dirty="0">
+                <a:solidFill>
+                  <a:srgbClr val="000080"/>
+                </a:solidFill>
+                <a:latin typeface="Lucida Console" panose="020B0609040504020204" pitchFamily="49" charset="0"/>
+              </a:rPr>
+              <a:t>-Recurse</a:t>
+            </a:r>
+            <a:r>
+              <a:rPr lang="nl-BE" sz="1400" dirty="0">
+                <a:solidFill>
+                  <a:prstClr val="black"/>
+                </a:solidFill>
+                <a:latin typeface="Lucida Console" panose="020B0609040504020204" pitchFamily="49" charset="0"/>
+              </a:rPr>
+              <a:t> </a:t>
+            </a:r>
+            <a:r>
+              <a:rPr lang="nl-BE" sz="1400" dirty="0">
+                <a:solidFill>
+                  <a:srgbClr val="A9A9A9"/>
+                </a:solidFill>
+                <a:latin typeface="Lucida Console" panose="020B0609040504020204" pitchFamily="49" charset="0"/>
+              </a:rPr>
+              <a:t>|</a:t>
+            </a:r>
+            <a:r>
+              <a:rPr lang="nl-BE" sz="1400" dirty="0">
+                <a:solidFill>
+                  <a:prstClr val="black"/>
+                </a:solidFill>
+                <a:latin typeface="Lucida Console" panose="020B0609040504020204" pitchFamily="49" charset="0"/>
+              </a:rPr>
+              <a:t> </a:t>
+            </a:r>
+            <a:r>
+              <a:rPr lang="nl-BE" sz="1400" dirty="0">
+                <a:solidFill>
+                  <a:srgbClr val="0000FF"/>
+                </a:solidFill>
+                <a:latin typeface="Lucida Console" panose="020B0609040504020204" pitchFamily="49" charset="0"/>
+              </a:rPr>
+              <a:t>Out-GridView </a:t>
+            </a:r>
+          </a:p>
+          <a:p>
+            <a:pPr>
+              <a:lnSpc>
+                <a:spcPct val="150000"/>
+              </a:lnSpc>
+            </a:pPr>
+            <a:endParaRPr lang="nl-BE" sz="1400" dirty="0">
+              <a:solidFill>
+                <a:srgbClr val="0000FF"/>
+              </a:solidFill>
+              <a:latin typeface="Lucida Console" panose="020B0609040504020204" pitchFamily="49" charset="0"/>
+            </a:endParaRPr>
+          </a:p>
+          <a:p>
+            <a:pPr>
+              <a:lnSpc>
+                <a:spcPct val="150000"/>
+              </a:lnSpc>
+            </a:pPr>
+            <a:r>
+              <a:rPr lang="nl-BE" sz="1400" dirty="0">
+                <a:latin typeface="Lucida Console" panose="020B0609040504020204" pitchFamily="49" charset="0"/>
+              </a:rPr>
+              <a:t>Get child items of directory, visualise and print the made selections name:</a:t>
+            </a:r>
+          </a:p>
+          <a:p>
+            <a:r>
+              <a:rPr lang="en-US" sz="1400" dirty="0">
+                <a:solidFill>
+                  <a:srgbClr val="0000FF"/>
+                </a:solidFill>
+                <a:latin typeface="Lucida Console" panose="020B0609040504020204" pitchFamily="49" charset="0"/>
+              </a:rPr>
+              <a:t>  Get-</a:t>
+            </a:r>
+            <a:r>
+              <a:rPr lang="en-US" sz="1400" dirty="0" err="1">
+                <a:solidFill>
+                  <a:srgbClr val="0000FF"/>
+                </a:solidFill>
+                <a:latin typeface="Lucida Console" panose="020B0609040504020204" pitchFamily="49" charset="0"/>
+              </a:rPr>
               <a:t>ChildItem</a:t>
             </a:r>
             <a:r>
-              <a:rPr lang="en-US" dirty="0"/>
-              <a:t> -Path C:\WINDOWS\System32 | Out-Host -Paging</a:t>
-            </a:r>
-            <a:endParaRPr lang="en-BE" dirty="0"/>
+              <a:rPr lang="en-US" sz="1400" dirty="0">
+                <a:solidFill>
+                  <a:prstClr val="black"/>
+                </a:solidFill>
+                <a:latin typeface="Lucida Console" panose="020B0609040504020204" pitchFamily="49" charset="0"/>
+              </a:rPr>
+              <a:t> </a:t>
+            </a:r>
+            <a:r>
+              <a:rPr lang="en-US" sz="1400" dirty="0">
+                <a:solidFill>
+                  <a:srgbClr val="8A2BE2"/>
+                </a:solidFill>
+                <a:latin typeface="Lucida Console" panose="020B0609040504020204" pitchFamily="49" charset="0"/>
+              </a:rPr>
+              <a:t>.\</a:t>
+            </a:r>
+            <a:r>
+              <a:rPr lang="en-US" sz="1400" dirty="0">
+                <a:solidFill>
+                  <a:prstClr val="black"/>
+                </a:solidFill>
+                <a:latin typeface="Lucida Console" panose="020B0609040504020204" pitchFamily="49" charset="0"/>
+              </a:rPr>
+              <a:t> </a:t>
+            </a:r>
+            <a:r>
+              <a:rPr lang="en-US" sz="1400" dirty="0">
+                <a:solidFill>
+                  <a:srgbClr val="000080"/>
+                </a:solidFill>
+                <a:latin typeface="Lucida Console" panose="020B0609040504020204" pitchFamily="49" charset="0"/>
+              </a:rPr>
+              <a:t>-</a:t>
+            </a:r>
+            <a:r>
+              <a:rPr lang="en-US" sz="1400" dirty="0" err="1">
+                <a:solidFill>
+                  <a:srgbClr val="000080"/>
+                </a:solidFill>
+                <a:latin typeface="Lucida Console" panose="020B0609040504020204" pitchFamily="49" charset="0"/>
+              </a:rPr>
+              <a:t>Recurse</a:t>
+            </a:r>
+            <a:r>
+              <a:rPr lang="en-US" sz="1400" dirty="0">
+                <a:solidFill>
+                  <a:prstClr val="black"/>
+                </a:solidFill>
+                <a:latin typeface="Lucida Console" panose="020B0609040504020204" pitchFamily="49" charset="0"/>
+              </a:rPr>
+              <a:t> </a:t>
+            </a:r>
+            <a:r>
+              <a:rPr lang="en-US" sz="1400" dirty="0">
+                <a:solidFill>
+                  <a:srgbClr val="A9A9A9"/>
+                </a:solidFill>
+                <a:latin typeface="Lucida Console" panose="020B0609040504020204" pitchFamily="49" charset="0"/>
+              </a:rPr>
+              <a:t>|</a:t>
+            </a:r>
+            <a:r>
+              <a:rPr lang="en-US" sz="1400" dirty="0">
+                <a:solidFill>
+                  <a:prstClr val="black"/>
+                </a:solidFill>
+                <a:latin typeface="Lucida Console" panose="020B0609040504020204" pitchFamily="49" charset="0"/>
+              </a:rPr>
+              <a:t> </a:t>
+            </a:r>
+          </a:p>
+          <a:p>
+            <a:r>
+              <a:rPr lang="en-US" sz="1400" dirty="0">
+                <a:solidFill>
+                  <a:prstClr val="black"/>
+                </a:solidFill>
+                <a:latin typeface="Lucida Console" panose="020B0609040504020204" pitchFamily="49" charset="0"/>
+              </a:rPr>
+              <a:t>	</a:t>
+            </a:r>
+            <a:r>
+              <a:rPr lang="en-US" sz="1400" dirty="0">
+                <a:solidFill>
+                  <a:srgbClr val="0000FF"/>
+                </a:solidFill>
+                <a:latin typeface="Lucida Console" panose="020B0609040504020204" pitchFamily="49" charset="0"/>
+              </a:rPr>
+              <a:t>Out-</a:t>
+            </a:r>
+            <a:r>
+              <a:rPr lang="en-US" sz="1400" dirty="0" err="1">
+                <a:solidFill>
+                  <a:srgbClr val="0000FF"/>
+                </a:solidFill>
+                <a:latin typeface="Lucida Console" panose="020B0609040504020204" pitchFamily="49" charset="0"/>
+              </a:rPr>
+              <a:t>GridView</a:t>
+            </a:r>
+            <a:r>
+              <a:rPr lang="en-US" sz="1400" dirty="0">
+                <a:solidFill>
+                  <a:prstClr val="black"/>
+                </a:solidFill>
+                <a:latin typeface="Lucida Console" panose="020B0609040504020204" pitchFamily="49" charset="0"/>
+              </a:rPr>
+              <a:t> </a:t>
+            </a:r>
+            <a:r>
+              <a:rPr lang="en-US" sz="1400" dirty="0">
+                <a:solidFill>
+                  <a:srgbClr val="000080"/>
+                </a:solidFill>
+                <a:latin typeface="Lucida Console" panose="020B0609040504020204" pitchFamily="49" charset="0"/>
+              </a:rPr>
+              <a:t>-</a:t>
+            </a:r>
+            <a:r>
+              <a:rPr lang="en-US" sz="1400" dirty="0" err="1">
+                <a:solidFill>
+                  <a:srgbClr val="000080"/>
+                </a:solidFill>
+                <a:latin typeface="Lucida Console" panose="020B0609040504020204" pitchFamily="49" charset="0"/>
+              </a:rPr>
+              <a:t>PassThru</a:t>
+            </a:r>
+            <a:r>
+              <a:rPr lang="en-US" sz="1400" dirty="0">
+                <a:solidFill>
+                  <a:prstClr val="black"/>
+                </a:solidFill>
+                <a:latin typeface="Lucida Console" panose="020B0609040504020204" pitchFamily="49" charset="0"/>
+              </a:rPr>
+              <a:t> </a:t>
+            </a:r>
+            <a:r>
+              <a:rPr lang="en-US" sz="1400" dirty="0">
+                <a:solidFill>
+                  <a:srgbClr val="A9A9A9"/>
+                </a:solidFill>
+                <a:latin typeface="Lucida Console" panose="020B0609040504020204" pitchFamily="49" charset="0"/>
+              </a:rPr>
+              <a:t>|</a:t>
+            </a:r>
+            <a:r>
+              <a:rPr lang="en-US" sz="1400" dirty="0">
+                <a:solidFill>
+                  <a:prstClr val="black"/>
+                </a:solidFill>
+                <a:latin typeface="Lucida Console" panose="020B0609040504020204" pitchFamily="49" charset="0"/>
+              </a:rPr>
+              <a:t> </a:t>
+            </a:r>
+          </a:p>
+          <a:p>
+            <a:r>
+              <a:rPr lang="en-US" sz="1400" dirty="0">
+                <a:solidFill>
+                  <a:prstClr val="black"/>
+                </a:solidFill>
+                <a:latin typeface="Lucida Console" panose="020B0609040504020204" pitchFamily="49" charset="0"/>
+              </a:rPr>
+              <a:t>	</a:t>
+            </a:r>
+            <a:r>
+              <a:rPr lang="en-US" sz="1400" dirty="0" err="1">
+                <a:solidFill>
+                  <a:srgbClr val="0000FF"/>
+                </a:solidFill>
+                <a:latin typeface="Lucida Console" panose="020B0609040504020204" pitchFamily="49" charset="0"/>
+              </a:rPr>
+              <a:t>foreach</a:t>
+            </a:r>
+            <a:r>
+              <a:rPr lang="en-US" sz="1400" dirty="0">
+                <a:solidFill>
+                  <a:prstClr val="black"/>
+                </a:solidFill>
+                <a:latin typeface="Lucida Console" panose="020B0609040504020204" pitchFamily="49" charset="0"/>
+              </a:rPr>
+              <a:t> { </a:t>
+            </a:r>
+            <a:r>
+              <a:rPr lang="en-US" sz="1400" dirty="0">
+                <a:solidFill>
+                  <a:srgbClr val="0000FF"/>
+                </a:solidFill>
+                <a:latin typeface="Lucida Console" panose="020B0609040504020204" pitchFamily="49" charset="0"/>
+              </a:rPr>
+              <a:t>Write-Host</a:t>
+            </a:r>
+            <a:r>
+              <a:rPr lang="en-US" sz="1400" dirty="0">
+                <a:solidFill>
+                  <a:prstClr val="black"/>
+                </a:solidFill>
+                <a:latin typeface="Lucida Console" panose="020B0609040504020204" pitchFamily="49" charset="0"/>
+              </a:rPr>
+              <a:t> </a:t>
+            </a:r>
+            <a:r>
+              <a:rPr lang="en-US" sz="1400" dirty="0">
+                <a:solidFill>
+                  <a:srgbClr val="FF4500"/>
+                </a:solidFill>
+                <a:latin typeface="Lucida Console" panose="020B0609040504020204" pitchFamily="49" charset="0"/>
+              </a:rPr>
+              <a:t>$_</a:t>
+            </a:r>
+            <a:r>
+              <a:rPr lang="en-US" sz="1400" dirty="0">
+                <a:solidFill>
+                  <a:srgbClr val="A9A9A9"/>
+                </a:solidFill>
+                <a:latin typeface="Lucida Console" panose="020B0609040504020204" pitchFamily="49" charset="0"/>
+              </a:rPr>
+              <a:t>.</a:t>
+            </a:r>
+            <a:r>
+              <a:rPr lang="en-US" sz="1400" dirty="0">
+                <a:solidFill>
+                  <a:prstClr val="black"/>
+                </a:solidFill>
+                <a:latin typeface="Lucida Console" panose="020B0609040504020204" pitchFamily="49" charset="0"/>
+              </a:rPr>
+              <a:t>Name </a:t>
+            </a:r>
+            <a:r>
+              <a:rPr lang="en-US" sz="1400" dirty="0">
+                <a:solidFill>
+                  <a:srgbClr val="000080"/>
+                </a:solidFill>
+                <a:latin typeface="Lucida Console" panose="020B0609040504020204" pitchFamily="49" charset="0"/>
+              </a:rPr>
+              <a:t>-</a:t>
+            </a:r>
+            <a:r>
+              <a:rPr lang="en-US" sz="1400" dirty="0" err="1">
+                <a:solidFill>
+                  <a:srgbClr val="000080"/>
+                </a:solidFill>
+                <a:latin typeface="Lucida Console" panose="020B0609040504020204" pitchFamily="49" charset="0"/>
+              </a:rPr>
+              <a:t>ForegroundColor</a:t>
+            </a:r>
+            <a:r>
+              <a:rPr lang="en-US" sz="1400" dirty="0">
+                <a:solidFill>
+                  <a:prstClr val="black"/>
+                </a:solidFill>
+                <a:latin typeface="Lucida Console" panose="020B0609040504020204" pitchFamily="49" charset="0"/>
+              </a:rPr>
+              <a:t> </a:t>
+            </a:r>
+            <a:r>
+              <a:rPr lang="en-US" sz="1400" dirty="0">
+                <a:solidFill>
+                  <a:srgbClr val="8A2BE2"/>
+                </a:solidFill>
+                <a:latin typeface="Lucida Console" panose="020B0609040504020204" pitchFamily="49" charset="0"/>
+              </a:rPr>
+              <a:t>Green</a:t>
+            </a:r>
+            <a:r>
+              <a:rPr lang="en-US" sz="1400" dirty="0">
+                <a:solidFill>
+                  <a:prstClr val="black"/>
+                </a:solidFill>
+                <a:latin typeface="Lucida Console" panose="020B0609040504020204" pitchFamily="49" charset="0"/>
+              </a:rPr>
+              <a:t> } </a:t>
+            </a:r>
+          </a:p>
+          <a:p>
+            <a:pPr>
+              <a:lnSpc>
+                <a:spcPct val="150000"/>
+              </a:lnSpc>
+            </a:pPr>
+            <a:endParaRPr lang="nl-BE" sz="1400" dirty="0">
+              <a:solidFill>
+                <a:srgbClr val="0000FF"/>
+              </a:solidFill>
+              <a:latin typeface="Lucida Console" panose="020B0609040504020204" pitchFamily="49" charset="0"/>
+            </a:endParaRPr>
           </a:p>
         </p:txBody>
       </p:sp>
@@ -24316,7 +24982,7 @@
           <a:p>
             <a:r>
               <a:rPr lang="en-US" dirty="0"/>
-              <a:t>Functions and Variable</a:t>
+              <a:t>Basic Functions and Variables</a:t>
             </a:r>
           </a:p>
         </p:txBody>
@@ -24337,8 +25003,20 @@
           <a:lstStyle/>
           <a:p>
             <a:r>
+              <a:rPr lang="en-US" dirty="0">
+                <a:hlinkClick r:id="rId2"/>
+              </a:rPr>
+              <a:t>https://stacktoheap.com/blog/2013/06/15/things-that-trip-newbies-in-powershell-pipeline-output/</a:t>
+            </a:r>
+            <a:endParaRPr lang="en-US" dirty="0"/>
+          </a:p>
+          <a:p>
+            <a:endParaRPr lang="en-US" dirty="0"/>
+          </a:p>
+          <a:p>
+            <a:r>
               <a:rPr lang="en-US" dirty="0"/>
-              <a:t>https://stacktoheap.com/blog/2013/06/15/things-that-trip-newbies-in-powershell-pipeline-output/</a:t>
+              <a:t>https://ss64.com/ps/syntax-automatic-variables.html</a:t>
             </a:r>
             <a:endParaRPr lang="en-US" dirty="0"/>
           </a:p>
@@ -24391,7 +25069,7 @@
           <a:p>
             <a:r>
               <a:rPr lang="en-US" dirty="0"/>
-              <a:t>Modules</a:t>
+              <a:t>Creating functions</a:t>
             </a:r>
             <a:endParaRPr lang="en-BE" dirty="0"/>
           </a:p>
@@ -24419,7 +25097,7 @@
     </p:spTree>
     <p:extLst>
       <p:ext uri="{BB962C8B-B14F-4D97-AF65-F5344CB8AC3E}">
-        <p14:creationId xmlns:p14="http://schemas.microsoft.com/office/powerpoint/2010/main" val="1476788318"/>
+        <p14:creationId xmlns:p14="http://schemas.microsoft.com/office/powerpoint/2010/main" val="3533605638"/>
       </p:ext>
     </p:extLst>
   </p:cSld>
@@ -25325,16 +26003,25 @@
 </file>
 
 <file path=customXml/item1.xml><?xml version="1.0" encoding="utf-8"?>
+<LongProperties xmlns="http://schemas.microsoft.com/office/2006/metadata/longProperties"/>
+</file>
+
+<file path=customXml/item2.xml><?xml version="1.0" encoding="utf-8"?>
 <p:properties xmlns:p="http://schemas.microsoft.com/office/2006/metadata/properties" xmlns:xsi="http://www.w3.org/2001/XMLSchema-instance" xmlns:pc="http://schemas.microsoft.com/office/infopath/2007/PartnerControls">
   <documentManagement/>
 </p:properties>
 </file>
 
-<file path=customXml/item2.xml><?xml version="1.0" encoding="utf-8"?>
-<LongProperties xmlns="http://schemas.microsoft.com/office/2006/metadata/longProperties"/>
+<file path=customXml/item3.xml><?xml version="1.0" encoding="utf-8"?>
+<?mso-contentType ?>
+<FormTemplates xmlns="http://schemas.microsoft.com/sharepoint/v3/contenttype/forms">
+  <Display>DocumentLibraryForm</Display>
+  <Edit>DocumentLibraryForm</Edit>
+  <New>DocumentLibraryForm</New>
+</FormTemplates>
 </file>
 
-<file path=customXml/item3.xml><?xml version="1.0" encoding="utf-8"?>
+<file path=customXml/item4.xml><?xml version="1.0" encoding="utf-8"?>
 <ct:contentTypeSchema xmlns:ct="http://schemas.microsoft.com/office/2006/metadata/contentType" xmlns:ma="http://schemas.microsoft.com/office/2006/metadata/properties/metaAttributes" ct:_="" ma:_="" ma:contentTypeName="Document" ma:contentTypeID="0x010100959D33A83376F241B96FC317B2040BAF" ma:contentTypeVersion="5" ma:contentTypeDescription="Create a new document." ma:contentTypeScope="" ma:versionID="527b495c0104506c6ad0510e833307a8">
   <xsd:schema xmlns:xsd="http://www.w3.org/2001/XMLSchema" xmlns:xs="http://www.w3.org/2001/XMLSchema" xmlns:p="http://schemas.microsoft.com/office/2006/metadata/properties" xmlns:ns2="9c644b71-f2b7-4af3-8fc7-b12615162907" xmlns:ns3="54f3cedd-548f-4720-83cb-d6c05b93ad22" targetNamespace="http://schemas.microsoft.com/office/2006/metadata/properties" ma:root="true" ma:fieldsID="1d53989094b9f63e1bb90e8dea41e06b" ns2:_="" ns3:_="">
     <xsd:import namespace="9c644b71-f2b7-4af3-8fc7-b12615162907"/>
@@ -25505,16 +26192,15 @@
 </ct:contentTypeSchema>
 </file>
 
-<file path=customXml/item4.xml><?xml version="1.0" encoding="utf-8"?>
-<?mso-contentType ?>
-<FormTemplates xmlns="http://schemas.microsoft.com/sharepoint/v3/contenttype/forms">
-  <Display>DocumentLibraryForm</Display>
-  <Edit>DocumentLibraryForm</Edit>
-  <New>DocumentLibraryForm</New>
-</FormTemplates>
+<file path=customXml/itemProps1.xml><?xml version="1.0" encoding="utf-8"?>
+<ds:datastoreItem xmlns:ds="http://schemas.openxmlformats.org/officeDocument/2006/customXml" ds:itemID="{EB9CE09D-DA00-4FA2-BB57-12EE9217E1B2}">
+  <ds:schemaRefs>
+    <ds:schemaRef ds:uri="http://schemas.microsoft.com/office/2006/metadata/longProperties"/>
+  </ds:schemaRefs>
+</ds:datastoreItem>
 </file>
 
-<file path=customXml/itemProps1.xml><?xml version="1.0" encoding="utf-8"?>
+<file path=customXml/itemProps2.xml><?xml version="1.0" encoding="utf-8"?>
 <ds:datastoreItem xmlns:ds="http://schemas.openxmlformats.org/officeDocument/2006/customXml" ds:itemID="{A30766E2-1FB1-4DBC-A574-2B521885E1F0}">
   <ds:schemaRefs>
     <ds:schemaRef ds:uri="54f3cedd-548f-4720-83cb-d6c05b93ad22"/>
@@ -25531,15 +26217,15 @@
 </ds:datastoreItem>
 </file>
 
-<file path=customXml/itemProps2.xml><?xml version="1.0" encoding="utf-8"?>
-<ds:datastoreItem xmlns:ds="http://schemas.openxmlformats.org/officeDocument/2006/customXml" ds:itemID="{EB9CE09D-DA00-4FA2-BB57-12EE9217E1B2}">
+<file path=customXml/itemProps3.xml><?xml version="1.0" encoding="utf-8"?>
+<ds:datastoreItem xmlns:ds="http://schemas.openxmlformats.org/officeDocument/2006/customXml" ds:itemID="{8092415D-C017-446B-92E0-7A9E0F8F3446}">
   <ds:schemaRefs>
-    <ds:schemaRef ds:uri="http://schemas.microsoft.com/office/2006/metadata/longProperties"/>
+    <ds:schemaRef ds:uri="http://schemas.microsoft.com/sharepoint/v3/contenttype/forms"/>
   </ds:schemaRefs>
 </ds:datastoreItem>
 </file>
 
-<file path=customXml/itemProps3.xml><?xml version="1.0" encoding="utf-8"?>
+<file path=customXml/itemProps4.xml><?xml version="1.0" encoding="utf-8"?>
 <ds:datastoreItem xmlns:ds="http://schemas.openxmlformats.org/officeDocument/2006/customXml" ds:itemID="{B11E10F8-F53B-440E-A07C-4BE43F17767B}">
   <ds:schemaRefs>
     <ds:schemaRef ds:uri="http://schemas.microsoft.com/office/2006/metadata/contentType"/>
@@ -25556,12 +26242,4 @@
     <ds:schemaRef ds:uri="http://schemas.microsoft.com/internal/obd"/>
   </ds:schemaRefs>
 </ds:datastoreItem>
-</file>
-
-<file path=customXml/itemProps4.xml><?xml version="1.0" encoding="utf-8"?>
-<ds:datastoreItem xmlns:ds="http://schemas.openxmlformats.org/officeDocument/2006/customXml" ds:itemID="{8092415D-C017-446B-92E0-7A9E0F8F3446}">
-  <ds:schemaRefs>
-    <ds:schemaRef ds:uri="http://schemas.microsoft.com/sharepoint/v3/contenttype/forms"/>
-  </ds:schemaRefs>
-</ds:datastoreItem>
 </file>
</xml_diff>

<commit_message>
Added demo script commands and variables and functions section
</commit_message>
<xml_diff>
--- a/BasicPowerShell.pptx
+++ b/BasicPowerShell.pptx
@@ -320,7 +320,7 @@
               <a:pPr>
                 <a:defRPr/>
               </a:pPr>
-              <a:t>2017/09/14</a:t>
+              <a:t>2017/09/16</a:t>
             </a:fld>
             <a:endParaRPr lang="en-ZA"/>
           </a:p>
@@ -540,7 +540,7 @@
               <a:pPr>
                 <a:defRPr/>
               </a:pPr>
-              <a:t>2017/09/14</a:t>
+              <a:t>2017/09/16</a:t>
             </a:fld>
             <a:endParaRPr lang="en-ZA"/>
           </a:p>
@@ -2863,7 +2863,7 @@
                 <a:buNone/>
                 <a:defRPr/>
               </a:pPr>
-              <a:t>14 September 2017</a:t>
+              <a:t>16 September 2017</a:t>
             </a:fld>
             <a:endParaRPr lang="en-US" sz="1400">
               <a:solidFill>
@@ -4097,7 +4097,7 @@
                 </a:spcAft>
                 <a:defRPr/>
               </a:pPr>
-              <a:t>14 September 2017</a:t>
+              <a:t>16 September 2017</a:t>
             </a:fld>
             <a:endParaRPr lang="en-ZA">
               <a:solidFill>
@@ -4612,7 +4612,7 @@
                 </a:spcAft>
                 <a:defRPr/>
               </a:pPr>
-              <a:t>14 September 2017</a:t>
+              <a:t>16 September 2017</a:t>
             </a:fld>
             <a:endParaRPr lang="en-ZA">
               <a:solidFill>
@@ -6101,7 +6101,7 @@
                 <a:buNone/>
                 <a:defRPr/>
               </a:pPr>
-              <a:t>14 September 2017</a:t>
+              <a:t>16 September 2017</a:t>
             </a:fld>
             <a:endParaRPr lang="en-US" sz="1400">
               <a:solidFill>
@@ -6697,7 +6697,7 @@
                 </a:spcAft>
                 <a:defRPr/>
               </a:pPr>
-              <a:t>14 September 2017</a:t>
+              <a:t>16 September 2017</a:t>
             </a:fld>
             <a:endParaRPr lang="en-ZA">
               <a:solidFill>
@@ -7360,7 +7360,7 @@
                 </a:spcAft>
                 <a:defRPr/>
               </a:pPr>
-              <a:t>14 September 2017</a:t>
+              <a:t>16 September 2017</a:t>
             </a:fld>
             <a:endParaRPr lang="en-ZA">
               <a:solidFill>
@@ -8726,7 +8726,7 @@
                 </a:spcAft>
                 <a:defRPr/>
               </a:pPr>
-              <a:t>14 September 2017</a:t>
+              <a:t>16 September 2017</a:t>
             </a:fld>
             <a:endParaRPr lang="en-ZA">
               <a:solidFill>
@@ -9570,7 +9570,7 @@
                 </a:spcAft>
                 <a:defRPr/>
               </a:pPr>
-              <a:t>14 September 2017</a:t>
+              <a:t>16 September 2017</a:t>
             </a:fld>
             <a:endParaRPr lang="en-ZA">
               <a:solidFill>
@@ -10360,7 +10360,7 @@
                 </a:spcAft>
                 <a:defRPr/>
               </a:pPr>
-              <a:t>14 September 2017</a:t>
+              <a:t>16 September 2017</a:t>
             </a:fld>
             <a:endParaRPr lang="en-ZA">
               <a:solidFill>
@@ -12201,7 +12201,75 @@
           <a:bodyPr/>
           <a:lstStyle/>
           <a:p>
-            <a:endParaRPr lang="en-BE"/>
+            <a:pPr>
+              <a:buFont typeface="Arial" panose="020B0604020202020204" pitchFamily="34" charset="0"/>
+              <a:buChar char="•"/>
+            </a:pPr>
+            <a:r>
+              <a:rPr lang="en-US" dirty="0"/>
+              <a:t>For Loop</a:t>
+            </a:r>
+          </a:p>
+          <a:p>
+            <a:pPr>
+              <a:buFont typeface="Arial" panose="020B0604020202020204" pitchFamily="34" charset="0"/>
+              <a:buChar char="•"/>
+            </a:pPr>
+            <a:r>
+              <a:rPr lang="en-US" dirty="0"/>
+              <a:t>Do While</a:t>
+            </a:r>
+          </a:p>
+          <a:p>
+            <a:pPr>
+              <a:buFont typeface="Arial" panose="020B0604020202020204" pitchFamily="34" charset="0"/>
+              <a:buChar char="•"/>
+            </a:pPr>
+            <a:r>
+              <a:rPr lang="en-US" dirty="0"/>
+              <a:t>Do Until</a:t>
+            </a:r>
+          </a:p>
+          <a:p>
+            <a:pPr>
+              <a:buFont typeface="Arial" panose="020B0604020202020204" pitchFamily="34" charset="0"/>
+              <a:buChar char="•"/>
+            </a:pPr>
+            <a:r>
+              <a:rPr lang="en-US" dirty="0"/>
+              <a:t>While</a:t>
+            </a:r>
+          </a:p>
+          <a:p>
+            <a:pPr>
+              <a:buFont typeface="Arial" panose="020B0604020202020204" pitchFamily="34" charset="0"/>
+              <a:buChar char="•"/>
+            </a:pPr>
+            <a:r>
+              <a:rPr lang="en-US" dirty="0"/>
+              <a:t>For-each</a:t>
+            </a:r>
+          </a:p>
+          <a:p>
+            <a:pPr lvl="1">
+              <a:buFont typeface="Arial" panose="020B0604020202020204" pitchFamily="34" charset="0"/>
+              <a:buChar char="•"/>
+            </a:pPr>
+            <a:r>
+              <a:rPr lang="en-US" dirty="0"/>
+              <a:t>Inline</a:t>
+            </a:r>
+          </a:p>
+          <a:p>
+            <a:pPr lvl="1">
+              <a:buFont typeface="Arial" panose="020B0604020202020204" pitchFamily="34" charset="0"/>
+              <a:buChar char="•"/>
+            </a:pPr>
+            <a:r>
+              <a:rPr lang="en-US" dirty="0"/>
+              <a:t>Function</a:t>
+            </a:r>
+            <a:endParaRPr lang="en-BE" dirty="0"/>
           </a:p>
         </p:txBody>
       </p:sp>
@@ -12239,7 +12307,1029 @@
           <a:bodyPr/>
           <a:lstStyle/>
           <a:p>
-            <a:endParaRPr lang="en-BE"/>
+            <a:pPr>
+              <a:lnSpc>
+                <a:spcPct val="100000"/>
+              </a:lnSpc>
+            </a:pPr>
+            <a:r>
+              <a:rPr lang="nl-BE" sz="1050" dirty="0">
+                <a:latin typeface="Lucida Console" panose="020B0609040504020204" pitchFamily="49" charset="0"/>
+              </a:rPr>
+              <a:t> </a:t>
+            </a:r>
+            <a:r>
+              <a:rPr lang="nl-BE" sz="1050" dirty="0">
+                <a:solidFill>
+                  <a:srgbClr val="006400"/>
+                </a:solidFill>
+                <a:latin typeface="Lucida Console" panose="020B0609040504020204" pitchFamily="49" charset="0"/>
+              </a:rPr>
+              <a:t># For loop </a:t>
+            </a:r>
+            <a:endParaRPr lang="nn-NO" sz="1050" dirty="0">
+              <a:solidFill>
+                <a:srgbClr val="00008B"/>
+              </a:solidFill>
+              <a:latin typeface="Lucida Console" panose="020B0609040504020204" pitchFamily="49" charset="0"/>
+            </a:endParaRPr>
+          </a:p>
+          <a:p>
+            <a:pPr>
+              <a:lnSpc>
+                <a:spcPct val="100000"/>
+              </a:lnSpc>
+            </a:pPr>
+            <a:r>
+              <a:rPr lang="nn-NO" sz="1050" dirty="0">
+                <a:solidFill>
+                  <a:srgbClr val="00008B"/>
+                </a:solidFill>
+                <a:latin typeface="Lucida Console" panose="020B0609040504020204" pitchFamily="49" charset="0"/>
+              </a:rPr>
+              <a:t>for</a:t>
+            </a:r>
+            <a:r>
+              <a:rPr lang="nn-NO" sz="1050" dirty="0">
+                <a:solidFill>
+                  <a:prstClr val="black"/>
+                </a:solidFill>
+                <a:latin typeface="Lucida Console" panose="020B0609040504020204" pitchFamily="49" charset="0"/>
+              </a:rPr>
+              <a:t> (</a:t>
+            </a:r>
+            <a:r>
+              <a:rPr lang="nn-NO" sz="1050" dirty="0">
+                <a:solidFill>
+                  <a:srgbClr val="FF4500"/>
+                </a:solidFill>
+                <a:latin typeface="Lucida Console" panose="020B0609040504020204" pitchFamily="49" charset="0"/>
+              </a:rPr>
+              <a:t>$i</a:t>
+            </a:r>
+            <a:r>
+              <a:rPr lang="nn-NO" sz="1050" dirty="0">
+                <a:solidFill>
+                  <a:prstClr val="black"/>
+                </a:solidFill>
+                <a:latin typeface="Lucida Console" panose="020B0609040504020204" pitchFamily="49" charset="0"/>
+              </a:rPr>
+              <a:t> </a:t>
+            </a:r>
+            <a:r>
+              <a:rPr lang="nn-NO" sz="1050" dirty="0">
+                <a:solidFill>
+                  <a:srgbClr val="A9A9A9"/>
+                </a:solidFill>
+                <a:latin typeface="Lucida Console" panose="020B0609040504020204" pitchFamily="49" charset="0"/>
+              </a:rPr>
+              <a:t>=</a:t>
+            </a:r>
+            <a:r>
+              <a:rPr lang="nn-NO" sz="1050" dirty="0">
+                <a:solidFill>
+                  <a:prstClr val="black"/>
+                </a:solidFill>
+                <a:latin typeface="Lucida Console" panose="020B0609040504020204" pitchFamily="49" charset="0"/>
+              </a:rPr>
+              <a:t> </a:t>
+            </a:r>
+            <a:r>
+              <a:rPr lang="nn-NO" sz="1050" dirty="0">
+                <a:solidFill>
+                  <a:srgbClr val="800080"/>
+                </a:solidFill>
+                <a:latin typeface="Lucida Console" panose="020B0609040504020204" pitchFamily="49" charset="0"/>
+              </a:rPr>
+              <a:t>1</a:t>
+            </a:r>
+            <a:r>
+              <a:rPr lang="nn-NO" sz="1050" dirty="0">
+                <a:solidFill>
+                  <a:prstClr val="black"/>
+                </a:solidFill>
+                <a:latin typeface="Lucida Console" panose="020B0609040504020204" pitchFamily="49" charset="0"/>
+              </a:rPr>
+              <a:t>; </a:t>
+            </a:r>
+            <a:r>
+              <a:rPr lang="nn-NO" sz="1050" dirty="0">
+                <a:solidFill>
+                  <a:srgbClr val="FF4500"/>
+                </a:solidFill>
+                <a:latin typeface="Lucida Console" panose="020B0609040504020204" pitchFamily="49" charset="0"/>
+              </a:rPr>
+              <a:t>$i</a:t>
+            </a:r>
+            <a:r>
+              <a:rPr lang="nn-NO" sz="1050" dirty="0">
+                <a:solidFill>
+                  <a:prstClr val="black"/>
+                </a:solidFill>
+                <a:latin typeface="Lucida Console" panose="020B0609040504020204" pitchFamily="49" charset="0"/>
+              </a:rPr>
+              <a:t> </a:t>
+            </a:r>
+            <a:r>
+              <a:rPr lang="nn-NO" sz="1050" dirty="0">
+                <a:solidFill>
+                  <a:srgbClr val="A9A9A9"/>
+                </a:solidFill>
+                <a:latin typeface="Lucida Console" panose="020B0609040504020204" pitchFamily="49" charset="0"/>
+              </a:rPr>
+              <a:t>-lt</a:t>
+            </a:r>
+            <a:r>
+              <a:rPr lang="nn-NO" sz="1050" dirty="0">
+                <a:solidFill>
+                  <a:prstClr val="black"/>
+                </a:solidFill>
+                <a:latin typeface="Lucida Console" panose="020B0609040504020204" pitchFamily="49" charset="0"/>
+              </a:rPr>
+              <a:t> </a:t>
+            </a:r>
+            <a:r>
+              <a:rPr lang="nn-NO" sz="1050" dirty="0">
+                <a:solidFill>
+                  <a:srgbClr val="800080"/>
+                </a:solidFill>
+                <a:latin typeface="Lucida Console" panose="020B0609040504020204" pitchFamily="49" charset="0"/>
+              </a:rPr>
+              <a:t>5</a:t>
+            </a:r>
+            <a:r>
+              <a:rPr lang="nn-NO" sz="1050" dirty="0">
+                <a:solidFill>
+                  <a:prstClr val="black"/>
+                </a:solidFill>
+                <a:latin typeface="Lucida Console" panose="020B0609040504020204" pitchFamily="49" charset="0"/>
+              </a:rPr>
+              <a:t>; </a:t>
+            </a:r>
+            <a:r>
+              <a:rPr lang="nn-NO" sz="1050" dirty="0">
+                <a:solidFill>
+                  <a:srgbClr val="FF4500"/>
+                </a:solidFill>
+                <a:latin typeface="Lucida Console" panose="020B0609040504020204" pitchFamily="49" charset="0"/>
+              </a:rPr>
+              <a:t>$i</a:t>
+            </a:r>
+            <a:r>
+              <a:rPr lang="nn-NO" sz="1050" dirty="0">
+                <a:solidFill>
+                  <a:prstClr val="black"/>
+                </a:solidFill>
+                <a:latin typeface="Lucida Console" panose="020B0609040504020204" pitchFamily="49" charset="0"/>
+              </a:rPr>
+              <a:t> </a:t>
+            </a:r>
+            <a:r>
+              <a:rPr lang="nn-NO" sz="1050" dirty="0">
+                <a:solidFill>
+                  <a:srgbClr val="A9A9A9"/>
+                </a:solidFill>
+                <a:latin typeface="Lucida Console" panose="020B0609040504020204" pitchFamily="49" charset="0"/>
+              </a:rPr>
+              <a:t>+=</a:t>
+            </a:r>
+            <a:r>
+              <a:rPr lang="nn-NO" sz="1050" dirty="0">
+                <a:solidFill>
+                  <a:prstClr val="black"/>
+                </a:solidFill>
+                <a:latin typeface="Lucida Console" panose="020B0609040504020204" pitchFamily="49" charset="0"/>
+              </a:rPr>
+              <a:t> </a:t>
+            </a:r>
+            <a:r>
+              <a:rPr lang="nn-NO" sz="1050" dirty="0">
+                <a:solidFill>
+                  <a:srgbClr val="800080"/>
+                </a:solidFill>
+                <a:latin typeface="Lucida Console" panose="020B0609040504020204" pitchFamily="49" charset="0"/>
+              </a:rPr>
+              <a:t>1</a:t>
+            </a:r>
+            <a:r>
+              <a:rPr lang="nn-NO" sz="1050" dirty="0">
+                <a:solidFill>
+                  <a:prstClr val="black"/>
+                </a:solidFill>
+                <a:latin typeface="Lucida Console" panose="020B0609040504020204" pitchFamily="49" charset="0"/>
+              </a:rPr>
+              <a:t>) </a:t>
+            </a:r>
+          </a:p>
+          <a:p>
+            <a:pPr>
+              <a:lnSpc>
+                <a:spcPct val="100000"/>
+              </a:lnSpc>
+            </a:pPr>
+            <a:r>
+              <a:rPr lang="en-BE" sz="1050" dirty="0">
+                <a:solidFill>
+                  <a:prstClr val="black"/>
+                </a:solidFill>
+                <a:latin typeface="Lucida Console" panose="020B0609040504020204" pitchFamily="49" charset="0"/>
+              </a:rPr>
+              <a:t>{        </a:t>
+            </a:r>
+          </a:p>
+          <a:p>
+            <a:pPr>
+              <a:lnSpc>
+                <a:spcPct val="100000"/>
+              </a:lnSpc>
+            </a:pPr>
+            <a:r>
+              <a:rPr lang="nl-BE" sz="1050" dirty="0">
+                <a:solidFill>
+                  <a:prstClr val="black"/>
+                </a:solidFill>
+                <a:latin typeface="Lucida Console" panose="020B0609040504020204" pitchFamily="49" charset="0"/>
+              </a:rPr>
+              <a:t>  </a:t>
+            </a:r>
+            <a:r>
+              <a:rPr lang="nl-BE" sz="1050" dirty="0">
+                <a:solidFill>
+                  <a:srgbClr val="0000FF"/>
+                </a:solidFill>
+                <a:latin typeface="Lucida Console" panose="020B0609040504020204" pitchFamily="49" charset="0"/>
+              </a:rPr>
+              <a:t>Write-Host</a:t>
+            </a:r>
+            <a:r>
+              <a:rPr lang="nl-BE" sz="1050" dirty="0">
+                <a:solidFill>
+                  <a:prstClr val="black"/>
+                </a:solidFill>
+                <a:latin typeface="Lucida Console" panose="020B0609040504020204" pitchFamily="49" charset="0"/>
+              </a:rPr>
+              <a:t> </a:t>
+            </a:r>
+            <a:r>
+              <a:rPr lang="nl-BE" sz="1050" dirty="0">
+                <a:solidFill>
+                  <a:srgbClr val="FF4500"/>
+                </a:solidFill>
+                <a:latin typeface="Lucida Console" panose="020B0609040504020204" pitchFamily="49" charset="0"/>
+              </a:rPr>
+              <a:t>$i</a:t>
+            </a:r>
+            <a:endParaRPr lang="nl-BE" sz="1050" dirty="0">
+              <a:solidFill>
+                <a:prstClr val="black"/>
+              </a:solidFill>
+              <a:latin typeface="Lucida Console" panose="020B0609040504020204" pitchFamily="49" charset="0"/>
+            </a:endParaRPr>
+          </a:p>
+          <a:p>
+            <a:pPr>
+              <a:lnSpc>
+                <a:spcPct val="100000"/>
+              </a:lnSpc>
+            </a:pPr>
+            <a:r>
+              <a:rPr lang="en-BE" sz="1050" dirty="0">
+                <a:solidFill>
+                  <a:prstClr val="black"/>
+                </a:solidFill>
+                <a:latin typeface="Lucida Console" panose="020B0609040504020204" pitchFamily="49" charset="0"/>
+              </a:rPr>
+              <a:t>}  </a:t>
+            </a:r>
+            <a:endParaRPr lang="en-US" sz="1050" dirty="0">
+              <a:solidFill>
+                <a:prstClr val="black"/>
+              </a:solidFill>
+              <a:latin typeface="Lucida Console" panose="020B0609040504020204" pitchFamily="49" charset="0"/>
+            </a:endParaRPr>
+          </a:p>
+          <a:p>
+            <a:pPr>
+              <a:lnSpc>
+                <a:spcPct val="100000"/>
+              </a:lnSpc>
+            </a:pPr>
+            <a:endParaRPr lang="en-US" sz="1050" dirty="0">
+              <a:solidFill>
+                <a:prstClr val="black"/>
+              </a:solidFill>
+              <a:latin typeface="Lucida Console" panose="020B0609040504020204" pitchFamily="49" charset="0"/>
+            </a:endParaRPr>
+          </a:p>
+          <a:p>
+            <a:pPr>
+              <a:lnSpc>
+                <a:spcPct val="100000"/>
+              </a:lnSpc>
+            </a:pPr>
+            <a:r>
+              <a:rPr lang="nl-BE" sz="1050" dirty="0">
+                <a:latin typeface="Lucida Console" panose="020B0609040504020204" pitchFamily="49" charset="0"/>
+              </a:rPr>
+              <a:t> </a:t>
+            </a:r>
+            <a:r>
+              <a:rPr lang="nl-BE" sz="1050" dirty="0">
+                <a:solidFill>
+                  <a:srgbClr val="006400"/>
+                </a:solidFill>
+                <a:latin typeface="Lucida Console" panose="020B0609040504020204" pitchFamily="49" charset="0"/>
+              </a:rPr>
+              <a:t># Foreach loops </a:t>
+            </a:r>
+            <a:endParaRPr lang="en-US" sz="1050" dirty="0">
+              <a:solidFill>
+                <a:srgbClr val="0000FF"/>
+              </a:solidFill>
+              <a:latin typeface="Lucida Console" panose="020B0609040504020204" pitchFamily="49" charset="0"/>
+            </a:endParaRPr>
+          </a:p>
+          <a:p>
+            <a:pPr>
+              <a:lnSpc>
+                <a:spcPct val="100000"/>
+              </a:lnSpc>
+            </a:pPr>
+            <a:r>
+              <a:rPr lang="en-US" sz="1050" dirty="0">
+                <a:solidFill>
+                  <a:srgbClr val="0000FF"/>
+                </a:solidFill>
+                <a:latin typeface="Lucida Console" panose="020B0609040504020204" pitchFamily="49" charset="0"/>
+              </a:rPr>
+              <a:t>Get-</a:t>
+            </a:r>
+            <a:r>
+              <a:rPr lang="en-US" sz="1050" dirty="0" err="1">
+                <a:solidFill>
+                  <a:srgbClr val="0000FF"/>
+                </a:solidFill>
+                <a:latin typeface="Lucida Console" panose="020B0609040504020204" pitchFamily="49" charset="0"/>
+              </a:rPr>
+              <a:t>ChildItem</a:t>
+            </a:r>
+            <a:r>
+              <a:rPr lang="en-US" sz="1050" dirty="0">
+                <a:solidFill>
+                  <a:prstClr val="black"/>
+                </a:solidFill>
+                <a:latin typeface="Lucida Console" panose="020B0609040504020204" pitchFamily="49" charset="0"/>
+              </a:rPr>
+              <a:t> </a:t>
+            </a:r>
+            <a:r>
+              <a:rPr lang="en-US" sz="1050" dirty="0">
+                <a:solidFill>
+                  <a:srgbClr val="8A2BE2"/>
+                </a:solidFill>
+                <a:latin typeface="Lucida Console" panose="020B0609040504020204" pitchFamily="49" charset="0"/>
+              </a:rPr>
+              <a:t>.\</a:t>
+            </a:r>
+            <a:r>
+              <a:rPr lang="en-US" sz="1050" dirty="0">
+                <a:solidFill>
+                  <a:prstClr val="black"/>
+                </a:solidFill>
+                <a:latin typeface="Lucida Console" panose="020B0609040504020204" pitchFamily="49" charset="0"/>
+              </a:rPr>
+              <a:t> </a:t>
+            </a:r>
+            <a:r>
+              <a:rPr lang="en-US" sz="1050" dirty="0">
+                <a:solidFill>
+                  <a:srgbClr val="000080"/>
+                </a:solidFill>
+                <a:latin typeface="Lucida Console" panose="020B0609040504020204" pitchFamily="49" charset="0"/>
+              </a:rPr>
+              <a:t>-</a:t>
+            </a:r>
+            <a:r>
+              <a:rPr lang="en-US" sz="1050" dirty="0" err="1">
+                <a:solidFill>
+                  <a:srgbClr val="000080"/>
+                </a:solidFill>
+                <a:latin typeface="Lucida Console" panose="020B0609040504020204" pitchFamily="49" charset="0"/>
+              </a:rPr>
+              <a:t>Recurse</a:t>
+            </a:r>
+            <a:r>
+              <a:rPr lang="en-US" sz="1050" dirty="0">
+                <a:solidFill>
+                  <a:prstClr val="black"/>
+                </a:solidFill>
+                <a:latin typeface="Lucida Console" panose="020B0609040504020204" pitchFamily="49" charset="0"/>
+              </a:rPr>
+              <a:t> </a:t>
+            </a:r>
+            <a:r>
+              <a:rPr lang="en-US" sz="1050" dirty="0">
+                <a:solidFill>
+                  <a:srgbClr val="A9A9A9"/>
+                </a:solidFill>
+                <a:latin typeface="Lucida Console" panose="020B0609040504020204" pitchFamily="49" charset="0"/>
+              </a:rPr>
+              <a:t>|</a:t>
+            </a:r>
+            <a:r>
+              <a:rPr lang="en-US" sz="1050" dirty="0">
+                <a:solidFill>
+                  <a:prstClr val="black"/>
+                </a:solidFill>
+                <a:latin typeface="Lucida Console" panose="020B0609040504020204" pitchFamily="49" charset="0"/>
+              </a:rPr>
+              <a:t> </a:t>
+            </a:r>
+          </a:p>
+          <a:p>
+            <a:pPr>
+              <a:lnSpc>
+                <a:spcPct val="100000"/>
+              </a:lnSpc>
+            </a:pPr>
+            <a:r>
+              <a:rPr lang="en-US" sz="1050" dirty="0">
+                <a:solidFill>
+                  <a:prstClr val="black"/>
+                </a:solidFill>
+                <a:latin typeface="Lucida Console" panose="020B0609040504020204" pitchFamily="49" charset="0"/>
+              </a:rPr>
+              <a:t>	</a:t>
+            </a:r>
+            <a:r>
+              <a:rPr lang="en-US" sz="1050" dirty="0" err="1">
+                <a:solidFill>
+                  <a:srgbClr val="0000FF"/>
+                </a:solidFill>
+                <a:latin typeface="Lucida Console" panose="020B0609040504020204" pitchFamily="49" charset="0"/>
+              </a:rPr>
+              <a:t>foreach</a:t>
+            </a:r>
+            <a:r>
+              <a:rPr lang="en-US" sz="1050" dirty="0">
+                <a:solidFill>
+                  <a:prstClr val="black"/>
+                </a:solidFill>
+                <a:latin typeface="Lucida Console" panose="020B0609040504020204" pitchFamily="49" charset="0"/>
+              </a:rPr>
+              <a:t> { </a:t>
+            </a:r>
+            <a:r>
+              <a:rPr lang="en-US" sz="1050" dirty="0">
+                <a:solidFill>
+                  <a:srgbClr val="0000FF"/>
+                </a:solidFill>
+                <a:latin typeface="Lucida Console" panose="020B0609040504020204" pitchFamily="49" charset="0"/>
+              </a:rPr>
+              <a:t>Write-Host</a:t>
+            </a:r>
+            <a:r>
+              <a:rPr lang="en-US" sz="1050" dirty="0">
+                <a:solidFill>
+                  <a:prstClr val="black"/>
+                </a:solidFill>
+                <a:latin typeface="Lucida Console" panose="020B0609040504020204" pitchFamily="49" charset="0"/>
+              </a:rPr>
+              <a:t> </a:t>
+            </a:r>
+            <a:r>
+              <a:rPr lang="en-US" sz="1050" dirty="0">
+                <a:solidFill>
+                  <a:srgbClr val="FF4500"/>
+                </a:solidFill>
+                <a:latin typeface="Lucida Console" panose="020B0609040504020204" pitchFamily="49" charset="0"/>
+              </a:rPr>
+              <a:t>$_</a:t>
+            </a:r>
+            <a:r>
+              <a:rPr lang="en-US" sz="1050" dirty="0">
+                <a:solidFill>
+                  <a:srgbClr val="A9A9A9"/>
+                </a:solidFill>
+                <a:latin typeface="Lucida Console" panose="020B0609040504020204" pitchFamily="49" charset="0"/>
+              </a:rPr>
+              <a:t>.</a:t>
+            </a:r>
+            <a:r>
+              <a:rPr lang="en-US" sz="1050" dirty="0">
+                <a:solidFill>
+                  <a:prstClr val="black"/>
+                </a:solidFill>
+                <a:latin typeface="Lucida Console" panose="020B0609040504020204" pitchFamily="49" charset="0"/>
+              </a:rPr>
+              <a:t>Name </a:t>
+            </a:r>
+            <a:r>
+              <a:rPr lang="en-US" sz="1050" dirty="0">
+                <a:solidFill>
+                  <a:srgbClr val="000080"/>
+                </a:solidFill>
+                <a:latin typeface="Lucida Console" panose="020B0609040504020204" pitchFamily="49" charset="0"/>
+              </a:rPr>
+              <a:t>-</a:t>
+            </a:r>
+            <a:r>
+              <a:rPr lang="en-US" sz="1050" dirty="0" err="1">
+                <a:solidFill>
+                  <a:srgbClr val="000080"/>
+                </a:solidFill>
+                <a:latin typeface="Lucida Console" panose="020B0609040504020204" pitchFamily="49" charset="0"/>
+              </a:rPr>
+              <a:t>ForegroundColor</a:t>
+            </a:r>
+            <a:r>
+              <a:rPr lang="en-US" sz="1050" dirty="0">
+                <a:solidFill>
+                  <a:prstClr val="black"/>
+                </a:solidFill>
+                <a:latin typeface="Lucida Console" panose="020B0609040504020204" pitchFamily="49" charset="0"/>
+              </a:rPr>
+              <a:t> </a:t>
+            </a:r>
+            <a:r>
+              <a:rPr lang="en-US" sz="1050" dirty="0">
+                <a:solidFill>
+                  <a:srgbClr val="8A2BE2"/>
+                </a:solidFill>
+                <a:latin typeface="Lucida Console" panose="020B0609040504020204" pitchFamily="49" charset="0"/>
+              </a:rPr>
+              <a:t>Green</a:t>
+            </a:r>
+            <a:r>
+              <a:rPr lang="en-US" sz="1050" dirty="0">
+                <a:solidFill>
+                  <a:prstClr val="black"/>
+                </a:solidFill>
+                <a:latin typeface="Lucida Console" panose="020B0609040504020204" pitchFamily="49" charset="0"/>
+              </a:rPr>
+              <a:t> }</a:t>
+            </a:r>
+          </a:p>
+          <a:p>
+            <a:pPr>
+              <a:lnSpc>
+                <a:spcPct val="100000"/>
+              </a:lnSpc>
+            </a:pPr>
+            <a:r>
+              <a:rPr lang="en-US" sz="1050" dirty="0">
+                <a:solidFill>
+                  <a:srgbClr val="0000FF"/>
+                </a:solidFill>
+                <a:latin typeface="Lucida Console" panose="020B0609040504020204" pitchFamily="49" charset="0"/>
+              </a:rPr>
+              <a:t>Get-</a:t>
+            </a:r>
+            <a:r>
+              <a:rPr lang="en-US" sz="1050" dirty="0" err="1">
+                <a:solidFill>
+                  <a:srgbClr val="0000FF"/>
+                </a:solidFill>
+                <a:latin typeface="Lucida Console" panose="020B0609040504020204" pitchFamily="49" charset="0"/>
+              </a:rPr>
+              <a:t>ChildItem</a:t>
+            </a:r>
+            <a:r>
+              <a:rPr lang="en-US" sz="1050" dirty="0">
+                <a:solidFill>
+                  <a:prstClr val="black"/>
+                </a:solidFill>
+                <a:latin typeface="Lucida Console" panose="020B0609040504020204" pitchFamily="49" charset="0"/>
+              </a:rPr>
+              <a:t> </a:t>
+            </a:r>
+            <a:r>
+              <a:rPr lang="en-US" sz="1050" dirty="0">
+                <a:solidFill>
+                  <a:srgbClr val="8A2BE2"/>
+                </a:solidFill>
+                <a:latin typeface="Lucida Console" panose="020B0609040504020204" pitchFamily="49" charset="0"/>
+              </a:rPr>
+              <a:t>.\</a:t>
+            </a:r>
+            <a:r>
+              <a:rPr lang="en-US" sz="1050" dirty="0">
+                <a:solidFill>
+                  <a:prstClr val="black"/>
+                </a:solidFill>
+                <a:latin typeface="Lucida Console" panose="020B0609040504020204" pitchFamily="49" charset="0"/>
+              </a:rPr>
+              <a:t> </a:t>
+            </a:r>
+            <a:r>
+              <a:rPr lang="en-US" sz="1050" dirty="0">
+                <a:solidFill>
+                  <a:srgbClr val="000080"/>
+                </a:solidFill>
+                <a:latin typeface="Lucida Console" panose="020B0609040504020204" pitchFamily="49" charset="0"/>
+              </a:rPr>
+              <a:t>-</a:t>
+            </a:r>
+            <a:r>
+              <a:rPr lang="en-US" sz="1050" dirty="0" err="1">
+                <a:solidFill>
+                  <a:srgbClr val="000080"/>
+                </a:solidFill>
+                <a:latin typeface="Lucida Console" panose="020B0609040504020204" pitchFamily="49" charset="0"/>
+              </a:rPr>
+              <a:t>Recurse</a:t>
+            </a:r>
+            <a:r>
+              <a:rPr lang="en-US" sz="1050" dirty="0">
+                <a:solidFill>
+                  <a:prstClr val="black"/>
+                </a:solidFill>
+                <a:latin typeface="Lucida Console" panose="020B0609040504020204" pitchFamily="49" charset="0"/>
+              </a:rPr>
+              <a:t> </a:t>
+            </a:r>
+            <a:r>
+              <a:rPr lang="en-US" sz="1050" dirty="0">
+                <a:solidFill>
+                  <a:srgbClr val="A9A9A9"/>
+                </a:solidFill>
+                <a:latin typeface="Lucida Console" panose="020B0609040504020204" pitchFamily="49" charset="0"/>
+              </a:rPr>
+              <a:t>|</a:t>
+            </a:r>
+            <a:r>
+              <a:rPr lang="en-US" sz="1050" dirty="0">
+                <a:solidFill>
+                  <a:prstClr val="black"/>
+                </a:solidFill>
+                <a:latin typeface="Lucida Console" panose="020B0609040504020204" pitchFamily="49" charset="0"/>
+              </a:rPr>
+              <a:t> </a:t>
+            </a:r>
+          </a:p>
+          <a:p>
+            <a:pPr>
+              <a:lnSpc>
+                <a:spcPct val="100000"/>
+              </a:lnSpc>
+            </a:pPr>
+            <a:r>
+              <a:rPr lang="en-US" sz="1050" dirty="0">
+                <a:solidFill>
+                  <a:prstClr val="black"/>
+                </a:solidFill>
+                <a:latin typeface="Lucida Console" panose="020B0609040504020204" pitchFamily="49" charset="0"/>
+              </a:rPr>
+              <a:t>	</a:t>
+            </a:r>
+            <a:r>
+              <a:rPr lang="en-US" sz="1050" dirty="0">
+                <a:solidFill>
+                  <a:srgbClr val="0000FF"/>
+                </a:solidFill>
+                <a:latin typeface="Lucida Console" panose="020B0609040504020204" pitchFamily="49" charset="0"/>
+              </a:rPr>
+              <a:t>%</a:t>
+            </a:r>
+            <a:r>
+              <a:rPr lang="en-US" sz="1050" dirty="0">
+                <a:solidFill>
+                  <a:prstClr val="black"/>
+                </a:solidFill>
+                <a:latin typeface="Lucida Console" panose="020B0609040504020204" pitchFamily="49" charset="0"/>
+              </a:rPr>
+              <a:t>{ </a:t>
+            </a:r>
+            <a:r>
+              <a:rPr lang="en-US" sz="1050" dirty="0">
+                <a:solidFill>
+                  <a:srgbClr val="0000FF"/>
+                </a:solidFill>
+                <a:latin typeface="Lucida Console" panose="020B0609040504020204" pitchFamily="49" charset="0"/>
+              </a:rPr>
+              <a:t>Write-Host</a:t>
+            </a:r>
+            <a:r>
+              <a:rPr lang="en-US" sz="1050" dirty="0">
+                <a:solidFill>
+                  <a:prstClr val="black"/>
+                </a:solidFill>
+                <a:latin typeface="Lucida Console" panose="020B0609040504020204" pitchFamily="49" charset="0"/>
+              </a:rPr>
+              <a:t> </a:t>
+            </a:r>
+            <a:r>
+              <a:rPr lang="en-US" sz="1050" dirty="0">
+                <a:solidFill>
+                  <a:srgbClr val="FF4500"/>
+                </a:solidFill>
+                <a:latin typeface="Lucida Console" panose="020B0609040504020204" pitchFamily="49" charset="0"/>
+              </a:rPr>
+              <a:t>$_</a:t>
+            </a:r>
+            <a:r>
+              <a:rPr lang="en-US" sz="1050" dirty="0">
+                <a:solidFill>
+                  <a:srgbClr val="A9A9A9"/>
+                </a:solidFill>
+                <a:latin typeface="Lucida Console" panose="020B0609040504020204" pitchFamily="49" charset="0"/>
+              </a:rPr>
+              <a:t>.</a:t>
+            </a:r>
+            <a:r>
+              <a:rPr lang="en-US" sz="1050" dirty="0">
+                <a:solidFill>
+                  <a:prstClr val="black"/>
+                </a:solidFill>
+                <a:latin typeface="Lucida Console" panose="020B0609040504020204" pitchFamily="49" charset="0"/>
+              </a:rPr>
+              <a:t>Name </a:t>
+            </a:r>
+            <a:r>
+              <a:rPr lang="en-US" sz="1050" dirty="0">
+                <a:solidFill>
+                  <a:srgbClr val="000080"/>
+                </a:solidFill>
+                <a:latin typeface="Lucida Console" panose="020B0609040504020204" pitchFamily="49" charset="0"/>
+              </a:rPr>
+              <a:t>-</a:t>
+            </a:r>
+            <a:r>
+              <a:rPr lang="en-US" sz="1050" dirty="0" err="1">
+                <a:solidFill>
+                  <a:srgbClr val="000080"/>
+                </a:solidFill>
+                <a:latin typeface="Lucida Console" panose="020B0609040504020204" pitchFamily="49" charset="0"/>
+              </a:rPr>
+              <a:t>ForegroundColor</a:t>
+            </a:r>
+            <a:r>
+              <a:rPr lang="en-US" sz="1050" dirty="0">
+                <a:solidFill>
+                  <a:prstClr val="black"/>
+                </a:solidFill>
+                <a:latin typeface="Lucida Console" panose="020B0609040504020204" pitchFamily="49" charset="0"/>
+              </a:rPr>
+              <a:t> </a:t>
+            </a:r>
+            <a:r>
+              <a:rPr lang="en-US" sz="1050" dirty="0">
+                <a:solidFill>
+                  <a:srgbClr val="8A2BE2"/>
+                </a:solidFill>
+                <a:latin typeface="Lucida Console" panose="020B0609040504020204" pitchFamily="49" charset="0"/>
+              </a:rPr>
+              <a:t>Green</a:t>
+            </a:r>
+            <a:r>
+              <a:rPr lang="en-US" sz="1050" dirty="0">
+                <a:solidFill>
+                  <a:prstClr val="black"/>
+                </a:solidFill>
+                <a:latin typeface="Lucida Console" panose="020B0609040504020204" pitchFamily="49" charset="0"/>
+              </a:rPr>
+              <a:t> }</a:t>
+            </a:r>
+          </a:p>
+          <a:p>
+            <a:pPr>
+              <a:lnSpc>
+                <a:spcPct val="100000"/>
+              </a:lnSpc>
+            </a:pPr>
+            <a:endParaRPr lang="en-BE" sz="1050" dirty="0">
+              <a:solidFill>
+                <a:prstClr val="black"/>
+              </a:solidFill>
+              <a:latin typeface="Lucida Console" panose="020B0609040504020204" pitchFamily="49" charset="0"/>
+            </a:endParaRPr>
+          </a:p>
+          <a:p>
+            <a:pPr>
+              <a:lnSpc>
+                <a:spcPct val="100000"/>
+              </a:lnSpc>
+            </a:pPr>
+            <a:r>
+              <a:rPr lang="en-US" sz="1050" dirty="0" err="1">
+                <a:solidFill>
+                  <a:srgbClr val="00008B"/>
+                </a:solidFill>
+                <a:latin typeface="Lucida Console" panose="020B0609040504020204" pitchFamily="49" charset="0"/>
+              </a:rPr>
+              <a:t>foreach</a:t>
+            </a:r>
+            <a:r>
+              <a:rPr lang="en-US" sz="1050" dirty="0">
+                <a:solidFill>
+                  <a:prstClr val="black"/>
+                </a:solidFill>
+                <a:latin typeface="Lucida Console" panose="020B0609040504020204" pitchFamily="49" charset="0"/>
+              </a:rPr>
+              <a:t> (</a:t>
+            </a:r>
+            <a:r>
+              <a:rPr lang="en-US" sz="1050" dirty="0">
+                <a:solidFill>
+                  <a:srgbClr val="FF4500"/>
+                </a:solidFill>
+                <a:latin typeface="Lucida Console" panose="020B0609040504020204" pitchFamily="49" charset="0"/>
+              </a:rPr>
+              <a:t>$item</a:t>
+            </a:r>
+            <a:r>
+              <a:rPr lang="en-US" sz="1050" dirty="0">
+                <a:solidFill>
+                  <a:prstClr val="black"/>
+                </a:solidFill>
+                <a:latin typeface="Lucida Console" panose="020B0609040504020204" pitchFamily="49" charset="0"/>
+              </a:rPr>
+              <a:t> </a:t>
+            </a:r>
+            <a:r>
+              <a:rPr lang="en-US" sz="1050" dirty="0">
+                <a:solidFill>
+                  <a:srgbClr val="00008B"/>
+                </a:solidFill>
+                <a:latin typeface="Lucida Console" panose="020B0609040504020204" pitchFamily="49" charset="0"/>
+              </a:rPr>
+              <a:t>in</a:t>
+            </a:r>
+            <a:r>
+              <a:rPr lang="en-US" sz="1050" dirty="0">
+                <a:solidFill>
+                  <a:prstClr val="black"/>
+                </a:solidFill>
+                <a:latin typeface="Lucida Console" panose="020B0609040504020204" pitchFamily="49" charset="0"/>
+              </a:rPr>
+              <a:t> </a:t>
+            </a:r>
+            <a:r>
+              <a:rPr lang="en-US" sz="1050" dirty="0">
+                <a:solidFill>
+                  <a:srgbClr val="0000FF"/>
+                </a:solidFill>
+                <a:latin typeface="Lucida Console" panose="020B0609040504020204" pitchFamily="49" charset="0"/>
+              </a:rPr>
+              <a:t>Get-</a:t>
+            </a:r>
+            <a:r>
+              <a:rPr lang="en-US" sz="1050" dirty="0" err="1">
+                <a:solidFill>
+                  <a:srgbClr val="0000FF"/>
+                </a:solidFill>
+                <a:latin typeface="Lucida Console" panose="020B0609040504020204" pitchFamily="49" charset="0"/>
+              </a:rPr>
+              <a:t>ChildItem</a:t>
+            </a:r>
+            <a:r>
+              <a:rPr lang="en-US" sz="1050" dirty="0">
+                <a:solidFill>
+                  <a:prstClr val="black"/>
+                </a:solidFill>
+                <a:latin typeface="Lucida Console" panose="020B0609040504020204" pitchFamily="49" charset="0"/>
+              </a:rPr>
+              <a:t> </a:t>
+            </a:r>
+            <a:r>
+              <a:rPr lang="en-US" sz="1050" dirty="0">
+                <a:solidFill>
+                  <a:srgbClr val="8A2BE2"/>
+                </a:solidFill>
+                <a:latin typeface="Lucida Console" panose="020B0609040504020204" pitchFamily="49" charset="0"/>
+              </a:rPr>
+              <a:t>.\</a:t>
+            </a:r>
+            <a:r>
+              <a:rPr lang="en-US" sz="1050" dirty="0">
+                <a:solidFill>
+                  <a:prstClr val="black"/>
+                </a:solidFill>
+                <a:latin typeface="Lucida Console" panose="020B0609040504020204" pitchFamily="49" charset="0"/>
+              </a:rPr>
+              <a:t> </a:t>
+            </a:r>
+            <a:r>
+              <a:rPr lang="en-US" sz="1050" dirty="0">
+                <a:solidFill>
+                  <a:srgbClr val="000080"/>
+                </a:solidFill>
+                <a:latin typeface="Lucida Console" panose="020B0609040504020204" pitchFamily="49" charset="0"/>
+              </a:rPr>
+              <a:t>-</a:t>
+            </a:r>
+            <a:r>
+              <a:rPr lang="en-US" sz="1050" dirty="0" err="1">
+                <a:solidFill>
+                  <a:srgbClr val="000080"/>
+                </a:solidFill>
+                <a:latin typeface="Lucida Console" panose="020B0609040504020204" pitchFamily="49" charset="0"/>
+              </a:rPr>
+              <a:t>Recurse</a:t>
+            </a:r>
+            <a:r>
+              <a:rPr lang="en-US" sz="1050" dirty="0">
+                <a:solidFill>
+                  <a:prstClr val="black"/>
+                </a:solidFill>
+                <a:latin typeface="Lucida Console" panose="020B0609040504020204" pitchFamily="49" charset="0"/>
+              </a:rPr>
+              <a:t>)</a:t>
+            </a:r>
+          </a:p>
+          <a:p>
+            <a:pPr>
+              <a:lnSpc>
+                <a:spcPct val="100000"/>
+              </a:lnSpc>
+            </a:pPr>
+            <a:r>
+              <a:rPr lang="en-BE" sz="1050" dirty="0">
+                <a:solidFill>
+                  <a:prstClr val="black"/>
+                </a:solidFill>
+                <a:latin typeface="Lucida Console" panose="020B0609040504020204" pitchFamily="49" charset="0"/>
+              </a:rPr>
+              <a:t>{</a:t>
+            </a:r>
+          </a:p>
+          <a:p>
+            <a:pPr>
+              <a:lnSpc>
+                <a:spcPct val="100000"/>
+              </a:lnSpc>
+            </a:pPr>
+            <a:r>
+              <a:rPr lang="nl-BE" sz="1050" dirty="0">
+                <a:solidFill>
+                  <a:prstClr val="black"/>
+                </a:solidFill>
+                <a:latin typeface="Lucida Console" panose="020B0609040504020204" pitchFamily="49" charset="0"/>
+              </a:rPr>
+              <a:t>  </a:t>
+            </a:r>
+            <a:r>
+              <a:rPr lang="nl-BE" sz="1050" dirty="0">
+                <a:solidFill>
+                  <a:srgbClr val="0000FF"/>
+                </a:solidFill>
+                <a:latin typeface="Lucida Console" panose="020B0609040504020204" pitchFamily="49" charset="0"/>
+              </a:rPr>
+              <a:t>Write-Host</a:t>
+            </a:r>
+            <a:r>
+              <a:rPr lang="nl-BE" sz="1050" dirty="0">
+                <a:solidFill>
+                  <a:prstClr val="black"/>
+                </a:solidFill>
+                <a:latin typeface="Lucida Console" panose="020B0609040504020204" pitchFamily="49" charset="0"/>
+              </a:rPr>
+              <a:t> </a:t>
+            </a:r>
+            <a:r>
+              <a:rPr lang="nl-BE" sz="1050" dirty="0">
+                <a:solidFill>
+                  <a:srgbClr val="FF4500"/>
+                </a:solidFill>
+                <a:latin typeface="Lucida Console" panose="020B0609040504020204" pitchFamily="49" charset="0"/>
+              </a:rPr>
+              <a:t>$item</a:t>
+            </a:r>
+            <a:endParaRPr lang="nl-BE" sz="1050" dirty="0">
+              <a:solidFill>
+                <a:prstClr val="black"/>
+              </a:solidFill>
+              <a:latin typeface="Lucida Console" panose="020B0609040504020204" pitchFamily="49" charset="0"/>
+            </a:endParaRPr>
+          </a:p>
+          <a:p>
+            <a:pPr>
+              <a:lnSpc>
+                <a:spcPct val="100000"/>
+              </a:lnSpc>
+            </a:pPr>
+            <a:r>
+              <a:rPr lang="en-BE" sz="1050" dirty="0">
+                <a:solidFill>
+                  <a:prstClr val="black"/>
+                </a:solidFill>
+                <a:latin typeface="Lucida Console" panose="020B0609040504020204" pitchFamily="49" charset="0"/>
+              </a:rPr>
+              <a:t>} </a:t>
+            </a:r>
+          </a:p>
+          <a:p>
+            <a:pPr>
+              <a:lnSpc>
+                <a:spcPct val="100000"/>
+              </a:lnSpc>
+            </a:pPr>
+            <a:endParaRPr lang="en-BE" sz="1100" dirty="0">
+              <a:solidFill>
+                <a:prstClr val="black"/>
+              </a:solidFill>
+              <a:latin typeface="Lucida Console" panose="020B0609040504020204" pitchFamily="49" charset="0"/>
+            </a:endParaRPr>
           </a:p>
         </p:txBody>
       </p:sp>
@@ -12325,7 +13415,7 @@
           <a:p>
             <a:r>
               <a:rPr lang="en-US" dirty="0"/>
-              <a:t>Creating functions</a:t>
+              <a:t>Basic Functions</a:t>
             </a:r>
             <a:endParaRPr lang="en-BE" dirty="0"/>
           </a:p>
@@ -12346,7 +13436,126 @@
           <a:bodyPr/>
           <a:lstStyle/>
           <a:p>
-            <a:endParaRPr lang="en-BE"/>
+            <a:pPr marL="0" indent="0"/>
+            <a:r>
+              <a:rPr lang="en-US" dirty="0"/>
+              <a:t>Function names:</a:t>
+            </a:r>
+          </a:p>
+          <a:p>
+            <a:pPr marL="285750" indent="-285750">
+              <a:buFont typeface="Arial" panose="020B0604020202020204" pitchFamily="34" charset="0"/>
+              <a:buChar char="•"/>
+            </a:pPr>
+            <a:r>
+              <a:rPr lang="en-US" dirty="0"/>
+              <a:t>Public functions start with a Verb e.g. Write-HelloWorld</a:t>
+            </a:r>
+            <a:br>
+              <a:rPr lang="en-US" dirty="0"/>
+            </a:br>
+            <a:r>
+              <a:rPr lang="en-US" dirty="0"/>
+              <a:t>(</a:t>
+            </a:r>
+            <a:r>
+              <a:rPr lang="en-US" dirty="0">
+                <a:solidFill>
+                  <a:srgbClr val="0000FF"/>
+                </a:solidFill>
+                <a:latin typeface="Lucida Console" panose="020B0609040504020204" pitchFamily="49" charset="0"/>
+              </a:rPr>
+              <a:t>Get-Verb</a:t>
+            </a:r>
+            <a:r>
+              <a:rPr lang="en-US" dirty="0"/>
+              <a:t>: </a:t>
+            </a:r>
+            <a:r>
+              <a:rPr lang="en-US" dirty="0"/>
+              <a:t>gets verbs that are approved for use in Windows PowerShell commands.)</a:t>
+            </a:r>
+          </a:p>
+          <a:p>
+            <a:pPr marL="285750" indent="-285750">
+              <a:buFont typeface="Arial" panose="020B0604020202020204" pitchFamily="34" charset="0"/>
+              <a:buChar char="•"/>
+            </a:pPr>
+            <a:r>
+              <a:rPr lang="en-US" dirty="0"/>
+              <a:t>Private functions (functions net exposed by a modules) can have any name</a:t>
+            </a:r>
+          </a:p>
+          <a:p>
+            <a:pPr marL="285750" indent="-285750">
+              <a:buFont typeface="Arial" panose="020B0604020202020204" pitchFamily="34" charset="0"/>
+              <a:buChar char="•"/>
+            </a:pPr>
+            <a:endParaRPr lang="en-US" dirty="0"/>
+          </a:p>
+          <a:p>
+            <a:pPr marL="0" indent="0"/>
+            <a:r>
+              <a:rPr lang="en-US" dirty="0"/>
+              <a:t>Parameters:</a:t>
+            </a:r>
+          </a:p>
+          <a:p>
+            <a:pPr marL="285750" indent="-285750">
+              <a:buFont typeface="Arial" panose="020B0604020202020204" pitchFamily="34" charset="0"/>
+              <a:buChar char="•"/>
+            </a:pPr>
+            <a:r>
+              <a:rPr lang="en-US" dirty="0"/>
+              <a:t>Can be any type or typed</a:t>
+            </a:r>
+          </a:p>
+          <a:p>
+            <a:pPr marL="285750" indent="-285750">
+              <a:buFont typeface="Arial" panose="020B0604020202020204" pitchFamily="34" charset="0"/>
+              <a:buChar char="•"/>
+            </a:pPr>
+            <a:r>
+              <a:rPr lang="en-US" dirty="0"/>
+              <a:t>Can be called by name or by order</a:t>
+            </a:r>
+          </a:p>
+          <a:p>
+            <a:pPr marL="285750" indent="-285750">
+              <a:buFont typeface="Arial" panose="020B0604020202020204" pitchFamily="34" charset="0"/>
+              <a:buChar char="•"/>
+            </a:pPr>
+            <a:r>
+              <a:rPr lang="en-US" dirty="0"/>
+              <a:t>Additional parameters are available in $</a:t>
+            </a:r>
+            <a:r>
+              <a:rPr lang="en-US" dirty="0" err="1"/>
+              <a:t>args</a:t>
+            </a:r>
+            <a:endParaRPr lang="en-US" dirty="0"/>
+          </a:p>
+          <a:p>
+            <a:pPr marL="0" indent="0"/>
+            <a:endParaRPr lang="en-US" dirty="0"/>
+          </a:p>
+          <a:p>
+            <a:pPr marL="0" indent="0"/>
+            <a:r>
+              <a:rPr lang="en-US" dirty="0"/>
+              <a:t>Return data:</a:t>
+            </a:r>
+          </a:p>
+          <a:p>
+            <a:pPr>
+              <a:buFont typeface="Arial" panose="020B0604020202020204" pitchFamily="34" charset="0"/>
+              <a:buChar char="•"/>
+            </a:pPr>
+            <a:r>
+              <a:rPr lang="en-US" dirty="0"/>
+              <a:t>Every output that isn’t captured is returned to the pipeline</a:t>
+            </a:r>
+            <a:endParaRPr lang="en-BE" dirty="0"/>
           </a:p>
         </p:txBody>
       </p:sp>
@@ -12418,7 +13627,11 @@
           <a:bodyPr/>
           <a:lstStyle/>
           <a:p>
-            <a:endParaRPr lang="en-BE"/>
+            <a:r>
+              <a:rPr lang="en-US" dirty="0"/>
+              <a:t>PowerShell modules allows you to group and load multiple functions.</a:t>
+            </a:r>
+            <a:endParaRPr lang="en-BE" dirty="0"/>
           </a:p>
         </p:txBody>
       </p:sp>
@@ -16897,7 +18110,7 @@
           <a:graphicData uri="http://schemas.openxmlformats.org/presentationml/2006/ole">
             <mc:AlternateContent xmlns:mc="http://schemas.openxmlformats.org/markup-compatibility/2006">
               <mc:Choice xmlns:v="urn:schemas-microsoft-com:vml" Requires="v">
-                <p:oleObj spid="_x0000_s34857" r:id="rId3" imgW="8039959" imgH="4681341" progId="Excel.Chart.8">
+                <p:oleObj spid="_x0000_s34861" r:id="rId3" imgW="8039959" imgH="4681341" progId="Excel.Chart.8">
                   <p:embed/>
                 </p:oleObj>
               </mc:Choice>
@@ -17261,7 +18474,7 @@
           <a:graphicData uri="http://schemas.openxmlformats.org/presentationml/2006/ole">
             <mc:AlternateContent xmlns:mc="http://schemas.openxmlformats.org/markup-compatibility/2006">
               <mc:Choice xmlns:v="urn:schemas-microsoft-com:vml" Requires="v">
-                <p:oleObj spid="_x0000_s35882" r:id="rId3" imgW="8033864" imgH="4681341" progId="Excel.Chart.8">
+                <p:oleObj spid="_x0000_s35886" r:id="rId3" imgW="8033864" imgH="4681341" progId="Excel.Chart.8">
                   <p:embed/>
                 </p:oleObj>
               </mc:Choice>
@@ -17582,7 +18795,7 @@
           <a:graphicData uri="http://schemas.openxmlformats.org/presentationml/2006/ole">
             <mc:AlternateContent xmlns:mc="http://schemas.openxmlformats.org/markup-compatibility/2006">
               <mc:Choice xmlns:v="urn:schemas-microsoft-com:vml" Requires="v">
-                <p:oleObj spid="_x0000_s36905" r:id="rId3" imgW="8039959" imgH="4681341" progId="Excel.Chart.8">
+                <p:oleObj spid="_x0000_s36909" r:id="rId3" imgW="8039959" imgH="4681341" progId="Excel.Chart.8">
                   <p:embed/>
                 </p:oleObj>
               </mc:Choice>
@@ -17946,7 +19159,7 @@
           <a:graphicData uri="http://schemas.openxmlformats.org/presentationml/2006/ole">
             <mc:AlternateContent xmlns:mc="http://schemas.openxmlformats.org/markup-compatibility/2006">
               <mc:Choice xmlns:v="urn:schemas-microsoft-com:vml" Requires="v">
-                <p:oleObj spid="_x0000_s37930" r:id="rId3" imgW="8033864" imgH="4681341" progId="Excel.Chart.8">
+                <p:oleObj spid="_x0000_s37934" r:id="rId3" imgW="8033864" imgH="4681341" progId="Excel.Chart.8">
                   <p:embed/>
                 </p:oleObj>
               </mc:Choice>
@@ -18310,7 +19523,7 @@
           <a:graphicData uri="http://schemas.openxmlformats.org/presentationml/2006/ole">
             <mc:AlternateContent xmlns:mc="http://schemas.openxmlformats.org/markup-compatibility/2006">
               <mc:Choice xmlns:v="urn:schemas-microsoft-com:vml" Requires="v">
-                <p:oleObj spid="_x0000_s38954" r:id="rId3" imgW="8033864" imgH="4681341" progId="Excel.Chart.8">
+                <p:oleObj spid="_x0000_s38958" r:id="rId3" imgW="8033864" imgH="4681341" progId="Excel.Chart.8">
                   <p:embed/>
                 </p:oleObj>
               </mc:Choice>
@@ -18674,7 +19887,7 @@
           <a:graphicData uri="http://schemas.openxmlformats.org/presentationml/2006/ole">
             <mc:AlternateContent xmlns:mc="http://schemas.openxmlformats.org/markup-compatibility/2006">
               <mc:Choice xmlns:v="urn:schemas-microsoft-com:vml" Requires="v">
-                <p:oleObj spid="_x0000_s39978" r:id="rId3" imgW="8033864" imgH="4681341" progId="Excel.Chart.8">
+                <p:oleObj spid="_x0000_s39982" r:id="rId3" imgW="8033864" imgH="4681341" progId="Excel.Chart.8">
                   <p:embed/>
                 </p:oleObj>
               </mc:Choice>
@@ -19456,7 +20669,7 @@
           <a:graphicData uri="http://schemas.openxmlformats.org/presentationml/2006/ole">
             <mc:AlternateContent xmlns:mc="http://schemas.openxmlformats.org/markup-compatibility/2006">
               <mc:Choice xmlns:v="urn:schemas-microsoft-com:vml" Requires="v">
-                <p:oleObj spid="_x0000_s43048" r:id="rId3" imgW="8039959" imgH="4681341" progId="Excel.Chart.8">
+                <p:oleObj spid="_x0000_s43052" r:id="rId3" imgW="8039959" imgH="4681341" progId="Excel.Chart.8">
                   <p:embed/>
                 </p:oleObj>
               </mc:Choice>
@@ -19613,7 +20826,7 @@
           <a:graphicData uri="http://schemas.openxmlformats.org/presentationml/2006/ole">
             <mc:AlternateContent xmlns:mc="http://schemas.openxmlformats.org/markup-compatibility/2006">
               <mc:Choice xmlns:v="urn:schemas-microsoft-com:vml" Requires="v">
-                <p:oleObj spid="_x0000_s44072" r:id="rId3" imgW="8039959" imgH="4681341" progId="Excel.Chart.8">
+                <p:oleObj spid="_x0000_s44076" r:id="rId3" imgW="8039959" imgH="4681341" progId="Excel.Chart.8">
                   <p:embed/>
                 </p:oleObj>
               </mc:Choice>
@@ -19770,7 +20983,7 @@
           <a:graphicData uri="http://schemas.openxmlformats.org/presentationml/2006/ole">
             <mc:AlternateContent xmlns:mc="http://schemas.openxmlformats.org/markup-compatibility/2006">
               <mc:Choice xmlns:v="urn:schemas-microsoft-com:vml" Requires="v">
-                <p:oleObj spid="_x0000_s45096" r:id="rId3" imgW="8039959" imgH="4681341" progId="Excel.Chart.8">
+                <p:oleObj spid="_x0000_s45100" r:id="rId3" imgW="8039959" imgH="4681341" progId="Excel.Chart.8">
                   <p:embed/>
                 </p:oleObj>
               </mc:Choice>
@@ -28847,25 +30060,16 @@
 </file>
 
 <file path=customXml/item1.xml><?xml version="1.0" encoding="utf-8"?>
-<LongProperties xmlns="http://schemas.microsoft.com/office/2006/metadata/longProperties"/>
-</file>
-
-<file path=customXml/item2.xml><?xml version="1.0" encoding="utf-8"?>
 <p:properties xmlns:p="http://schemas.microsoft.com/office/2006/metadata/properties" xmlns:xsi="http://www.w3.org/2001/XMLSchema-instance" xmlns:pc="http://schemas.microsoft.com/office/infopath/2007/PartnerControls">
   <documentManagement/>
 </p:properties>
 </file>
 
-<file path=customXml/item3.xml><?xml version="1.0" encoding="utf-8"?>
-<?mso-contentType ?>
-<FormTemplates xmlns="http://schemas.microsoft.com/sharepoint/v3/contenttype/forms">
-  <Display>DocumentLibraryForm</Display>
-  <Edit>DocumentLibraryForm</Edit>
-  <New>DocumentLibraryForm</New>
-</FormTemplates>
+<file path=customXml/item2.xml><?xml version="1.0" encoding="utf-8"?>
+<LongProperties xmlns="http://schemas.microsoft.com/office/2006/metadata/longProperties"/>
 </file>
 
-<file path=customXml/item4.xml><?xml version="1.0" encoding="utf-8"?>
+<file path=customXml/item3.xml><?xml version="1.0" encoding="utf-8"?>
 <ct:contentTypeSchema xmlns:ct="http://schemas.microsoft.com/office/2006/metadata/contentType" xmlns:ma="http://schemas.microsoft.com/office/2006/metadata/properties/metaAttributes" ct:_="" ma:_="" ma:contentTypeName="Document" ma:contentTypeID="0x010100959D33A83376F241B96FC317B2040BAF" ma:contentTypeVersion="5" ma:contentTypeDescription="Create a new document." ma:contentTypeScope="" ma:versionID="527b495c0104506c6ad0510e833307a8">
   <xsd:schema xmlns:xsd="http://www.w3.org/2001/XMLSchema" xmlns:xs="http://www.w3.org/2001/XMLSchema" xmlns:p="http://schemas.microsoft.com/office/2006/metadata/properties" xmlns:ns2="9c644b71-f2b7-4af3-8fc7-b12615162907" xmlns:ns3="54f3cedd-548f-4720-83cb-d6c05b93ad22" targetNamespace="http://schemas.microsoft.com/office/2006/metadata/properties" ma:root="true" ma:fieldsID="1d53989094b9f63e1bb90e8dea41e06b" ns2:_="" ns3:_="">
     <xsd:import namespace="9c644b71-f2b7-4af3-8fc7-b12615162907"/>
@@ -29036,15 +30240,16 @@
 </ct:contentTypeSchema>
 </file>
 
-<file path=customXml/itemProps1.xml><?xml version="1.0" encoding="utf-8"?>
-<ds:datastoreItem xmlns:ds="http://schemas.openxmlformats.org/officeDocument/2006/customXml" ds:itemID="{EB9CE09D-DA00-4FA2-BB57-12EE9217E1B2}">
-  <ds:schemaRefs>
-    <ds:schemaRef ds:uri="http://schemas.microsoft.com/office/2006/metadata/longProperties"/>
-  </ds:schemaRefs>
-</ds:datastoreItem>
+<file path=customXml/item4.xml><?xml version="1.0" encoding="utf-8"?>
+<?mso-contentType ?>
+<FormTemplates xmlns="http://schemas.microsoft.com/sharepoint/v3/contenttype/forms">
+  <Display>DocumentLibraryForm</Display>
+  <Edit>DocumentLibraryForm</Edit>
+  <New>DocumentLibraryForm</New>
+</FormTemplates>
 </file>
 
-<file path=customXml/itemProps2.xml><?xml version="1.0" encoding="utf-8"?>
+<file path=customXml/itemProps1.xml><?xml version="1.0" encoding="utf-8"?>
 <ds:datastoreItem xmlns:ds="http://schemas.openxmlformats.org/officeDocument/2006/customXml" ds:itemID="{A30766E2-1FB1-4DBC-A574-2B521885E1F0}">
   <ds:schemaRefs>
     <ds:schemaRef ds:uri="54f3cedd-548f-4720-83cb-d6c05b93ad22"/>
@@ -29061,15 +30266,15 @@
 </ds:datastoreItem>
 </file>
 
-<file path=customXml/itemProps3.xml><?xml version="1.0" encoding="utf-8"?>
-<ds:datastoreItem xmlns:ds="http://schemas.openxmlformats.org/officeDocument/2006/customXml" ds:itemID="{8092415D-C017-446B-92E0-7A9E0F8F3446}">
+<file path=customXml/itemProps2.xml><?xml version="1.0" encoding="utf-8"?>
+<ds:datastoreItem xmlns:ds="http://schemas.openxmlformats.org/officeDocument/2006/customXml" ds:itemID="{EB9CE09D-DA00-4FA2-BB57-12EE9217E1B2}">
   <ds:schemaRefs>
-    <ds:schemaRef ds:uri="http://schemas.microsoft.com/sharepoint/v3/contenttype/forms"/>
+    <ds:schemaRef ds:uri="http://schemas.microsoft.com/office/2006/metadata/longProperties"/>
   </ds:schemaRefs>
 </ds:datastoreItem>
 </file>
 
-<file path=customXml/itemProps4.xml><?xml version="1.0" encoding="utf-8"?>
+<file path=customXml/itemProps3.xml><?xml version="1.0" encoding="utf-8"?>
 <ds:datastoreItem xmlns:ds="http://schemas.openxmlformats.org/officeDocument/2006/customXml" ds:itemID="{B11E10F8-F53B-440E-A07C-4BE43F17767B}">
   <ds:schemaRefs>
     <ds:schemaRef ds:uri="http://schemas.microsoft.com/office/2006/metadata/contentType"/>
@@ -29086,4 +30291,12 @@
     <ds:schemaRef ds:uri="http://schemas.microsoft.com/internal/obd"/>
   </ds:schemaRefs>
 </ds:datastoreItem>
+</file>
+
+<file path=customXml/itemProps4.xml><?xml version="1.0" encoding="utf-8"?>
+<ds:datastoreItem xmlns:ds="http://schemas.openxmlformats.org/officeDocument/2006/customXml" ds:itemID="{8092415D-C017-446B-92E0-7A9E0F8F3446}">
+  <ds:schemaRefs>
+    <ds:schemaRef ds:uri="http://schemas.microsoft.com/sharepoint/v3/contenttype/forms"/>
+  </ds:schemaRefs>
+</ds:datastoreItem>
 </file>
</xml_diff>